<commit_message>
GAN image processing visualization
</commit_message>
<xml_diff>
--- a/Presentation/Stage_1/stage_1_presentation.pptx
+++ b/Presentation/Stage_1/stage_1_presentation.pptx
@@ -5,10 +5,10 @@
     <p:sldMasterId id="2147483648" r:id="rId4"/>
   </p:sldMasterIdLst>
   <p:notesMasterIdLst>
-    <p:notesMasterId r:id="rId39"/>
+    <p:notesMasterId r:id="rId40"/>
   </p:notesMasterIdLst>
   <p:handoutMasterIdLst>
-    <p:handoutMasterId r:id="rId40"/>
+    <p:handoutMasterId r:id="rId41"/>
   </p:handoutMasterIdLst>
   <p:sldIdLst>
     <p:sldId id="256" r:id="rId5"/>
@@ -26,25 +26,26 @@
     <p:sldId id="278" r:id="rId17"/>
     <p:sldId id="279" r:id="rId18"/>
     <p:sldId id="281" r:id="rId19"/>
-    <p:sldId id="282" r:id="rId20"/>
-    <p:sldId id="283" r:id="rId21"/>
-    <p:sldId id="284" r:id="rId22"/>
-    <p:sldId id="290" r:id="rId23"/>
-    <p:sldId id="292" r:id="rId24"/>
-    <p:sldId id="293" r:id="rId25"/>
-    <p:sldId id="294" r:id="rId26"/>
-    <p:sldId id="295" r:id="rId27"/>
-    <p:sldId id="297" r:id="rId28"/>
-    <p:sldId id="300" r:id="rId29"/>
-    <p:sldId id="301" r:id="rId30"/>
-    <p:sldId id="304" r:id="rId31"/>
-    <p:sldId id="305" r:id="rId32"/>
-    <p:sldId id="306" r:id="rId33"/>
-    <p:sldId id="307" r:id="rId34"/>
-    <p:sldId id="268" r:id="rId35"/>
-    <p:sldId id="308" r:id="rId36"/>
-    <p:sldId id="302" r:id="rId37"/>
-    <p:sldId id="303" r:id="rId38"/>
+    <p:sldId id="309" r:id="rId20"/>
+    <p:sldId id="282" r:id="rId21"/>
+    <p:sldId id="283" r:id="rId22"/>
+    <p:sldId id="284" r:id="rId23"/>
+    <p:sldId id="290" r:id="rId24"/>
+    <p:sldId id="292" r:id="rId25"/>
+    <p:sldId id="293" r:id="rId26"/>
+    <p:sldId id="294" r:id="rId27"/>
+    <p:sldId id="295" r:id="rId28"/>
+    <p:sldId id="297" r:id="rId29"/>
+    <p:sldId id="300" r:id="rId30"/>
+    <p:sldId id="301" r:id="rId31"/>
+    <p:sldId id="304" r:id="rId32"/>
+    <p:sldId id="305" r:id="rId33"/>
+    <p:sldId id="306" r:id="rId34"/>
+    <p:sldId id="307" r:id="rId35"/>
+    <p:sldId id="268" r:id="rId36"/>
+    <p:sldId id="308" r:id="rId37"/>
+    <p:sldId id="302" r:id="rId38"/>
+    <p:sldId id="303" r:id="rId39"/>
   </p:sldIdLst>
   <p:sldSz cx="12192000" cy="6858000"/>
   <p:notesSz cx="6858000" cy="9144000"/>
@@ -6616,6 +6617,171 @@
       </p:grpSpPr>
       <p:sp>
         <p:nvSpPr>
+          <p:cNvPr id="2" name="Title 1">
+            <a:extLst>
+              <a:ext uri="{FF2B5EF4-FFF2-40B4-BE49-F238E27FC236}">
+                <a16:creationId xmlns:a16="http://schemas.microsoft.com/office/drawing/2014/main" id="{3D95BBF0-7B27-4961-A731-95E061171C97}"/>
+              </a:ext>
+            </a:extLst>
+          </p:cNvPr>
+          <p:cNvSpPr>
+            <a:spLocks noGrp="1"/>
+          </p:cNvSpPr>
+          <p:nvPr>
+            <p:ph type="title"/>
+          </p:nvPr>
+        </p:nvSpPr>
+        <p:spPr/>
+        <p:txBody>
+          <a:bodyPr/>
+          <a:lstStyle/>
+          <a:p>
+            <a:r>
+              <a:rPr lang="en-US" dirty="0"/>
+              <a:t>Block diagram of Project</a:t>
+            </a:r>
+          </a:p>
+        </p:txBody>
+      </p:sp>
+      <p:sp>
+        <p:nvSpPr>
+          <p:cNvPr id="4" name="Footer Placeholder 3">
+            <a:extLst>
+              <a:ext uri="{FF2B5EF4-FFF2-40B4-BE49-F238E27FC236}">
+                <a16:creationId xmlns:a16="http://schemas.microsoft.com/office/drawing/2014/main" id="{905E88C8-1178-4311-AD04-68537718ECF0}"/>
+              </a:ext>
+            </a:extLst>
+          </p:cNvPr>
+          <p:cNvSpPr>
+            <a:spLocks noGrp="1"/>
+          </p:cNvSpPr>
+          <p:nvPr>
+            <p:ph type="ftr" sz="quarter" idx="11"/>
+          </p:nvPr>
+        </p:nvSpPr>
+        <p:spPr/>
+        <p:txBody>
+          <a:bodyPr/>
+          <a:lstStyle/>
+          <a:p>
+            <a:r>
+              <a:rPr lang="en-US"/>
+              <a:t>Astronomical image colourisation and super-resolution using GANS</a:t>
+            </a:r>
+          </a:p>
+        </p:txBody>
+      </p:sp>
+      <p:pic>
+        <p:nvPicPr>
+          <p:cNvPr id="6" name="Picture 5">
+            <a:extLst>
+              <a:ext uri="{FF2B5EF4-FFF2-40B4-BE49-F238E27FC236}">
+                <a16:creationId xmlns:a16="http://schemas.microsoft.com/office/drawing/2014/main" id="{A5FC556F-F1BF-457C-A09C-6BC25B2F3762}"/>
+              </a:ext>
+            </a:extLst>
+          </p:cNvPr>
+          <p:cNvPicPr>
+            <a:picLocks noChangeAspect="1"/>
+          </p:cNvPicPr>
+          <p:nvPr/>
+        </p:nvPicPr>
+        <p:blipFill>
+          <a:blip r:embed="rId2"/>
+          <a:stretch>
+            <a:fillRect/>
+          </a:stretch>
+        </p:blipFill>
+        <p:spPr>
+          <a:xfrm>
+            <a:off x="389858" y="1600200"/>
+            <a:ext cx="11410765" cy="4331254"/>
+          </a:xfrm>
+          <a:prstGeom prst="rect">
+            <a:avLst/>
+          </a:prstGeom>
+        </p:spPr>
+      </p:pic>
+      <p:sp>
+        <p:nvSpPr>
+          <p:cNvPr id="7" name="TextBox 6">
+            <a:extLst>
+              <a:ext uri="{FF2B5EF4-FFF2-40B4-BE49-F238E27FC236}">
+                <a16:creationId xmlns:a16="http://schemas.microsoft.com/office/drawing/2014/main" id="{74FF393A-623B-4834-891E-01B8B663FAEF}"/>
+              </a:ext>
+            </a:extLst>
+          </p:cNvPr>
+          <p:cNvSpPr txBox="1"/>
+          <p:nvPr/>
+        </p:nvSpPr>
+        <p:spPr>
+          <a:xfrm>
+            <a:off x="3047980" y="5996377"/>
+            <a:ext cx="6094520" cy="246221"/>
+          </a:xfrm>
+          <a:prstGeom prst="rect">
+            <a:avLst/>
+          </a:prstGeom>
+          <a:noFill/>
+        </p:spPr>
+        <p:txBody>
+          <a:bodyPr wrap="square">
+            <a:spAutoFit/>
+          </a:bodyPr>
+          <a:lstStyle/>
+          <a:p>
+            <a:pPr algn="ctr"/>
+            <a:r>
+              <a:rPr lang="en-US" sz="1000" dirty="0"/>
+              <a:t>Figure 6: Image conversion by GAN</a:t>
+            </a:r>
+            <a:endParaRPr lang="en-IN" sz="1000" dirty="0"/>
+          </a:p>
+        </p:txBody>
+      </p:sp>
+    </p:spTree>
+    <p:extLst>
+      <p:ext uri="{BB962C8B-B14F-4D97-AF65-F5344CB8AC3E}">
+        <p14:creationId xmlns:p14="http://schemas.microsoft.com/office/powerpoint/2010/main" val="958700248"/>
+      </p:ext>
+    </p:extLst>
+  </p:cSld>
+  <p:clrMapOvr>
+    <a:masterClrMapping/>
+  </p:clrMapOvr>
+  <mc:AlternateContent xmlns:mc="http://schemas.openxmlformats.org/markup-compatibility/2006" xmlns:p14="http://schemas.microsoft.com/office/powerpoint/2010/main">
+    <mc:Choice Requires="p14">
+      <p:transition spd="med" p14:dur="700">
+        <p:fade/>
+      </p:transition>
+    </mc:Choice>
+    <mc:Fallback xmlns="">
+      <p:transition spd="med">
+        <p:fade/>
+      </p:transition>
+    </mc:Fallback>
+  </mc:AlternateContent>
+</p:sld>
+</file>
+
+<file path=ppt/slides/slide17.xml><?xml version="1.0" encoding="utf-8"?>
+<p:sld xmlns:a="http://schemas.openxmlformats.org/drawingml/2006/main" xmlns:r="http://schemas.openxmlformats.org/officeDocument/2006/relationships" xmlns:p="http://schemas.openxmlformats.org/presentationml/2006/main">
+  <p:cSld>
+    <p:spTree>
+      <p:nvGrpSpPr>
+        <p:cNvPr id="1" name=""/>
+        <p:cNvGrpSpPr/>
+        <p:nvPr/>
+      </p:nvGrpSpPr>
+      <p:grpSpPr>
+        <a:xfrm>
+          <a:off x="0" y="0"/>
+          <a:ext cx="0" cy="0"/>
+          <a:chOff x="0" y="0"/>
+          <a:chExt cx="0" cy="0"/>
+        </a:xfrm>
+      </p:grpSpPr>
+      <p:sp>
+        <p:nvSpPr>
           <p:cNvPr id="13" name="Title 12"/>
           <p:cNvSpPr>
             <a:spLocks noGrp="1"/>
@@ -6765,7 +6931,7 @@
             <a:pPr algn="ctr"/>
             <a:r>
               <a:rPr lang="en-US" sz="1000" dirty="0"/>
-              <a:t>Figure 6: Discriminator (</a:t>
+              <a:t>Figure 7: Discriminator (</a:t>
             </a:r>
             <a:r>
               <a:rPr lang="en-US" sz="1000" b="0" i="0" u="none" strike="noStrike" baseline="0" dirty="0" err="1"/>
@@ -6808,7 +6974,7 @@
 </p:sld>
 </file>
 
-<file path=ppt/slides/slide17.xml><?xml version="1.0" encoding="utf-8"?>
+<file path=ppt/slides/slide18.xml><?xml version="1.0" encoding="utf-8"?>
 <p:sld xmlns:a="http://schemas.openxmlformats.org/drawingml/2006/main" xmlns:r="http://schemas.openxmlformats.org/officeDocument/2006/relationships" xmlns:p="http://schemas.openxmlformats.org/presentationml/2006/main">
   <p:cSld>
     <p:spTree>
@@ -6975,7 +7141,7 @@
             <a:pPr algn="ctr"/>
             <a:r>
               <a:rPr lang="en-US" sz="1000" dirty="0"/>
-              <a:t>Figure 7: Encoder Decoder Generator (</a:t>
+              <a:t>Figure 8: Encoder Decoder Generator (</a:t>
             </a:r>
             <a:r>
               <a:rPr lang="en-US" sz="1000" b="0" i="0" u="none" strike="noStrike" baseline="0" dirty="0" err="1"/>
@@ -7014,7 +7180,7 @@
 </p:sld>
 </file>
 
-<file path=ppt/slides/slide18.xml><?xml version="1.0" encoding="utf-8"?>
+<file path=ppt/slides/slide19.xml><?xml version="1.0" encoding="utf-8"?>
 <p:sld xmlns:a="http://schemas.openxmlformats.org/drawingml/2006/main" xmlns:r="http://schemas.openxmlformats.org/officeDocument/2006/relationships" xmlns:p="http://schemas.openxmlformats.org/presentationml/2006/main">
   <p:cSld>
     <p:spTree>
@@ -7182,7 +7348,7 @@
             <a:pPr algn="ctr"/>
             <a:r>
               <a:rPr lang="en-US" sz="1000" dirty="0"/>
-              <a:t>Figure 8: </a:t>
+              <a:t>Figure 9: </a:t>
             </a:r>
             <a:r>
               <a:rPr lang="en-US" sz="1000" dirty="0" err="1"/>
@@ -7208,194 +7374,6 @@
     <p:extLst>
       <p:ext uri="{BB962C8B-B14F-4D97-AF65-F5344CB8AC3E}">
         <p14:creationId xmlns:p14="http://schemas.microsoft.com/office/powerpoint/2010/main" val="2432953026"/>
-      </p:ext>
-    </p:extLst>
-  </p:cSld>
-  <p:clrMapOvr>
-    <a:masterClrMapping/>
-  </p:clrMapOvr>
-  <mc:AlternateContent xmlns:mc="http://schemas.openxmlformats.org/markup-compatibility/2006" xmlns:p14="http://schemas.microsoft.com/office/powerpoint/2010/main">
-    <mc:Choice Requires="p14">
-      <p:transition spd="med" p14:dur="700">
-        <p:fade/>
-      </p:transition>
-    </mc:Choice>
-    <mc:Fallback xmlns="">
-      <p:transition spd="med">
-        <p:fade/>
-      </p:transition>
-    </mc:Fallback>
-  </mc:AlternateContent>
-</p:sld>
-</file>
-
-<file path=ppt/slides/slide19.xml><?xml version="1.0" encoding="utf-8"?>
-<p:sld xmlns:a="http://schemas.openxmlformats.org/drawingml/2006/main" xmlns:r="http://schemas.openxmlformats.org/officeDocument/2006/relationships" xmlns:p="http://schemas.openxmlformats.org/presentationml/2006/main">
-  <p:cSld>
-    <p:spTree>
-      <p:nvGrpSpPr>
-        <p:cNvPr id="1" name=""/>
-        <p:cNvGrpSpPr/>
-        <p:nvPr/>
-      </p:nvGrpSpPr>
-      <p:grpSpPr>
-        <a:xfrm>
-          <a:off x="0" y="0"/>
-          <a:ext cx="0" cy="0"/>
-          <a:chOff x="0" y="0"/>
-          <a:chExt cx="0" cy="0"/>
-        </a:xfrm>
-      </p:grpSpPr>
-      <p:sp>
-        <p:nvSpPr>
-          <p:cNvPr id="13" name="Title 12"/>
-          <p:cNvSpPr>
-            <a:spLocks noGrp="1"/>
-          </p:cNvSpPr>
-          <p:nvPr>
-            <p:ph type="title"/>
-          </p:nvPr>
-        </p:nvSpPr>
-        <p:spPr/>
-        <p:txBody>
-          <a:bodyPr/>
-          <a:lstStyle/>
-          <a:p>
-            <a:r>
-              <a:rPr lang="en-US" dirty="0"/>
-              <a:t>Methodology</a:t>
-            </a:r>
-          </a:p>
-        </p:txBody>
-      </p:sp>
-      <p:sp>
-        <p:nvSpPr>
-          <p:cNvPr id="14" name="Content Placeholder 13"/>
-          <p:cNvSpPr>
-            <a:spLocks noGrp="1"/>
-          </p:cNvSpPr>
-          <p:nvPr>
-            <p:ph idx="1"/>
-          </p:nvPr>
-        </p:nvSpPr>
-        <p:spPr/>
-        <p:txBody>
-          <a:bodyPr>
-            <a:normAutofit/>
-          </a:bodyPr>
-          <a:lstStyle/>
-          <a:p>
-            <a:r>
-              <a:rPr lang="en-US" dirty="0"/>
-              <a:t> Data gathering and processing:</a:t>
-            </a:r>
-          </a:p>
-          <a:p>
-            <a:pPr lvl="1"/>
-            <a:r>
-              <a:rPr lang="en-US" dirty="0"/>
-              <a:t>Data Scraping</a:t>
-            </a:r>
-          </a:p>
-          <a:p>
-            <a:pPr lvl="1"/>
-            <a:r>
-              <a:rPr lang="en-US" dirty="0"/>
-              <a:t>Data Cleaning</a:t>
-            </a:r>
-          </a:p>
-          <a:p>
-            <a:r>
-              <a:rPr lang="en-IN" dirty="0"/>
-              <a:t>Model Building</a:t>
-            </a:r>
-          </a:p>
-          <a:p>
-            <a:r>
-              <a:rPr lang="en-IN" dirty="0"/>
-              <a:t>Model Training</a:t>
-            </a:r>
-          </a:p>
-          <a:p>
-            <a:r>
-              <a:rPr lang="en-IN" dirty="0"/>
-              <a:t>Cost Optimization and tuning</a:t>
-            </a:r>
-          </a:p>
-          <a:p>
-            <a:r>
-              <a:rPr lang="en-IN" dirty="0"/>
-              <a:t>Performance Evaluation and Documentation</a:t>
-            </a:r>
-          </a:p>
-        </p:txBody>
-      </p:sp>
-      <p:sp>
-        <p:nvSpPr>
-          <p:cNvPr id="5" name="Footer Placeholder 4"/>
-          <p:cNvSpPr>
-            <a:spLocks noGrp="1"/>
-          </p:cNvSpPr>
-          <p:nvPr>
-            <p:ph type="ftr" sz="quarter" idx="11"/>
-          </p:nvPr>
-        </p:nvSpPr>
-        <p:spPr/>
-        <p:txBody>
-          <a:bodyPr/>
-          <a:lstStyle/>
-          <a:p>
-            <a:r>
-              <a:rPr lang="en-IN" sz="1200" dirty="0">
-                <a:cs typeface="Times New Roman" panose="02020603050405020304" pitchFamily="18" charset="0"/>
-              </a:rPr>
-              <a:t>Astronomical image colourisation and super-resolution using GANS</a:t>
-            </a:r>
-            <a:endParaRPr lang="en-IN" dirty="0"/>
-          </a:p>
-        </p:txBody>
-      </p:sp>
-      <p:pic>
-        <p:nvPicPr>
-          <p:cNvPr id="4" name="Picture 1"/>
-          <p:cNvPicPr>
-            <a:picLocks noChangeAspect="1" noChangeArrowheads="1"/>
-          </p:cNvPicPr>
-          <p:nvPr/>
-        </p:nvPicPr>
-        <p:blipFill>
-          <a:blip r:embed="rId2" cstate="print">
-            <a:extLst>
-              <a:ext uri="{28A0092B-C50C-407E-A947-70E740481C1C}">
-                <a14:useLocalDpi xmlns:a14="http://schemas.microsoft.com/office/drawing/2010/main" val="0"/>
-              </a:ext>
-            </a:extLst>
-          </a:blip>
-          <a:stretch>
-            <a:fillRect/>
-          </a:stretch>
-        </p:blipFill>
-        <p:spPr bwMode="auto">
-          <a:xfrm>
-            <a:off x="10919540" y="150750"/>
-            <a:ext cx="1233271" cy="1029803"/>
-          </a:xfrm>
-          <a:prstGeom prst="rect">
-            <a:avLst/>
-          </a:prstGeom>
-          <a:noFill/>
-          <a:ln w="9525">
-            <a:noFill/>
-            <a:miter lim="800000"/>
-            <a:headEnd/>
-            <a:tailEnd/>
-          </a:ln>
-        </p:spPr>
-      </p:pic>
-    </p:spTree>
-    <p:extLst>
-      <p:ext uri="{BB962C8B-B14F-4D97-AF65-F5344CB8AC3E}">
-        <p14:creationId xmlns:p14="http://schemas.microsoft.com/office/powerpoint/2010/main" val="261913967"/>
       </p:ext>
     </p:extLst>
   </p:cSld>
@@ -8221,6 +8199,194 @@
           <a:p>
             <a:r>
               <a:rPr lang="en-US" dirty="0"/>
+              <a:t>Methodology</a:t>
+            </a:r>
+          </a:p>
+        </p:txBody>
+      </p:sp>
+      <p:sp>
+        <p:nvSpPr>
+          <p:cNvPr id="14" name="Content Placeholder 13"/>
+          <p:cNvSpPr>
+            <a:spLocks noGrp="1"/>
+          </p:cNvSpPr>
+          <p:nvPr>
+            <p:ph idx="1"/>
+          </p:nvPr>
+        </p:nvSpPr>
+        <p:spPr/>
+        <p:txBody>
+          <a:bodyPr>
+            <a:normAutofit/>
+          </a:bodyPr>
+          <a:lstStyle/>
+          <a:p>
+            <a:r>
+              <a:rPr lang="en-US" dirty="0"/>
+              <a:t> Data gathering and processing:</a:t>
+            </a:r>
+          </a:p>
+          <a:p>
+            <a:pPr lvl="1"/>
+            <a:r>
+              <a:rPr lang="en-US" dirty="0"/>
+              <a:t>Data Scraping</a:t>
+            </a:r>
+          </a:p>
+          <a:p>
+            <a:pPr lvl="1"/>
+            <a:r>
+              <a:rPr lang="en-US" dirty="0"/>
+              <a:t>Data Cleaning</a:t>
+            </a:r>
+          </a:p>
+          <a:p>
+            <a:r>
+              <a:rPr lang="en-IN" dirty="0"/>
+              <a:t>Model Building</a:t>
+            </a:r>
+          </a:p>
+          <a:p>
+            <a:r>
+              <a:rPr lang="en-IN" dirty="0"/>
+              <a:t>Model Training</a:t>
+            </a:r>
+          </a:p>
+          <a:p>
+            <a:r>
+              <a:rPr lang="en-IN" dirty="0"/>
+              <a:t>Cost Optimization and tuning</a:t>
+            </a:r>
+          </a:p>
+          <a:p>
+            <a:r>
+              <a:rPr lang="en-IN" dirty="0"/>
+              <a:t>Performance Evaluation and Documentation</a:t>
+            </a:r>
+          </a:p>
+        </p:txBody>
+      </p:sp>
+      <p:sp>
+        <p:nvSpPr>
+          <p:cNvPr id="5" name="Footer Placeholder 4"/>
+          <p:cNvSpPr>
+            <a:spLocks noGrp="1"/>
+          </p:cNvSpPr>
+          <p:nvPr>
+            <p:ph type="ftr" sz="quarter" idx="11"/>
+          </p:nvPr>
+        </p:nvSpPr>
+        <p:spPr/>
+        <p:txBody>
+          <a:bodyPr/>
+          <a:lstStyle/>
+          <a:p>
+            <a:r>
+              <a:rPr lang="en-IN" sz="1200" dirty="0">
+                <a:cs typeface="Times New Roman" panose="02020603050405020304" pitchFamily="18" charset="0"/>
+              </a:rPr>
+              <a:t>Astronomical image colourisation and super-resolution using GANS</a:t>
+            </a:r>
+            <a:endParaRPr lang="en-IN" dirty="0"/>
+          </a:p>
+        </p:txBody>
+      </p:sp>
+      <p:pic>
+        <p:nvPicPr>
+          <p:cNvPr id="4" name="Picture 1"/>
+          <p:cNvPicPr>
+            <a:picLocks noChangeAspect="1" noChangeArrowheads="1"/>
+          </p:cNvPicPr>
+          <p:nvPr/>
+        </p:nvPicPr>
+        <p:blipFill>
+          <a:blip r:embed="rId2" cstate="print">
+            <a:extLst>
+              <a:ext uri="{28A0092B-C50C-407E-A947-70E740481C1C}">
+                <a14:useLocalDpi xmlns:a14="http://schemas.microsoft.com/office/drawing/2010/main" val="0"/>
+              </a:ext>
+            </a:extLst>
+          </a:blip>
+          <a:stretch>
+            <a:fillRect/>
+          </a:stretch>
+        </p:blipFill>
+        <p:spPr bwMode="auto">
+          <a:xfrm>
+            <a:off x="10919540" y="150750"/>
+            <a:ext cx="1233271" cy="1029803"/>
+          </a:xfrm>
+          <a:prstGeom prst="rect">
+            <a:avLst/>
+          </a:prstGeom>
+          <a:noFill/>
+          <a:ln w="9525">
+            <a:noFill/>
+            <a:miter lim="800000"/>
+            <a:headEnd/>
+            <a:tailEnd/>
+          </a:ln>
+        </p:spPr>
+      </p:pic>
+    </p:spTree>
+    <p:extLst>
+      <p:ext uri="{BB962C8B-B14F-4D97-AF65-F5344CB8AC3E}">
+        <p14:creationId xmlns:p14="http://schemas.microsoft.com/office/powerpoint/2010/main" val="261913967"/>
+      </p:ext>
+    </p:extLst>
+  </p:cSld>
+  <p:clrMapOvr>
+    <a:masterClrMapping/>
+  </p:clrMapOvr>
+  <mc:AlternateContent xmlns:mc="http://schemas.openxmlformats.org/markup-compatibility/2006" xmlns:p14="http://schemas.microsoft.com/office/powerpoint/2010/main">
+    <mc:Choice Requires="p14">
+      <p:transition spd="med" p14:dur="700">
+        <p:fade/>
+      </p:transition>
+    </mc:Choice>
+    <mc:Fallback xmlns="">
+      <p:transition spd="med">
+        <p:fade/>
+      </p:transition>
+    </mc:Fallback>
+  </mc:AlternateContent>
+</p:sld>
+</file>
+
+<file path=ppt/slides/slide21.xml><?xml version="1.0" encoding="utf-8"?>
+<p:sld xmlns:a="http://schemas.openxmlformats.org/drawingml/2006/main" xmlns:r="http://schemas.openxmlformats.org/officeDocument/2006/relationships" xmlns:p="http://schemas.openxmlformats.org/presentationml/2006/main">
+  <p:cSld>
+    <p:spTree>
+      <p:nvGrpSpPr>
+        <p:cNvPr id="1" name=""/>
+        <p:cNvGrpSpPr/>
+        <p:nvPr/>
+      </p:nvGrpSpPr>
+      <p:grpSpPr>
+        <a:xfrm>
+          <a:off x="0" y="0"/>
+          <a:ext cx="0" cy="0"/>
+          <a:chOff x="0" y="0"/>
+          <a:chExt cx="0" cy="0"/>
+        </a:xfrm>
+      </p:grpSpPr>
+      <p:sp>
+        <p:nvSpPr>
+          <p:cNvPr id="13" name="Title 12"/>
+          <p:cNvSpPr>
+            <a:spLocks noGrp="1"/>
+          </p:cNvSpPr>
+          <p:nvPr>
+            <p:ph type="title"/>
+          </p:nvPr>
+        </p:nvSpPr>
+        <p:spPr/>
+        <p:txBody>
+          <a:bodyPr/>
+          <a:lstStyle/>
+          <a:p>
+            <a:r>
+              <a:rPr lang="en-US" dirty="0"/>
               <a:t>Image Colorization</a:t>
             </a:r>
           </a:p>
@@ -8358,7 +8524,7 @@
 </p:sld>
 </file>
 
-<file path=ppt/slides/slide21.xml><?xml version="1.0" encoding="utf-8"?>
+<file path=ppt/slides/slide22.xml><?xml version="1.0" encoding="utf-8"?>
 <p:sld xmlns:a="http://schemas.openxmlformats.org/drawingml/2006/main" xmlns:r="http://schemas.openxmlformats.org/officeDocument/2006/relationships" xmlns:p="http://schemas.openxmlformats.org/presentationml/2006/main">
   <p:cSld>
     <p:spTree>
@@ -8511,7 +8677,7 @@
 </p:sld>
 </file>
 
-<file path=ppt/slides/slide22.xml><?xml version="1.0" encoding="utf-8"?>
+<file path=ppt/slides/slide23.xml><?xml version="1.0" encoding="utf-8"?>
 <p:sld xmlns:a="http://schemas.openxmlformats.org/drawingml/2006/main" xmlns:r="http://schemas.openxmlformats.org/officeDocument/2006/relationships" xmlns:p="http://schemas.openxmlformats.org/presentationml/2006/main">
   <p:cSld>
     <p:spTree>
@@ -8674,7 +8840,7 @@
 </p:sld>
 </file>
 
-<file path=ppt/slides/slide23.xml><?xml version="1.0" encoding="utf-8"?>
+<file path=ppt/slides/slide24.xml><?xml version="1.0" encoding="utf-8"?>
 <p:sld xmlns:a="http://schemas.openxmlformats.org/drawingml/2006/main" xmlns:r="http://schemas.openxmlformats.org/officeDocument/2006/relationships" xmlns:p="http://schemas.openxmlformats.org/presentationml/2006/main">
   <p:cSld>
     <p:spTree>
@@ -9122,7 +9288,7 @@
 </p:sld>
 </file>
 
-<file path=ppt/slides/slide24.xml><?xml version="1.0" encoding="utf-8"?>
+<file path=ppt/slides/slide25.xml><?xml version="1.0" encoding="utf-8"?>
 <p:sld xmlns:a="http://schemas.openxmlformats.org/drawingml/2006/main" xmlns:r="http://schemas.openxmlformats.org/officeDocument/2006/relationships" xmlns:p="http://schemas.openxmlformats.org/presentationml/2006/main">
   <p:cSld>
     <p:spTree>
@@ -9521,175 +9687,6 @@
 </p:sld>
 </file>
 
-<file path=ppt/slides/slide25.xml><?xml version="1.0" encoding="utf-8"?>
-<p:sld xmlns:a="http://schemas.openxmlformats.org/drawingml/2006/main" xmlns:r="http://schemas.openxmlformats.org/officeDocument/2006/relationships" xmlns:p="http://schemas.openxmlformats.org/presentationml/2006/main">
-  <p:cSld>
-    <p:spTree>
-      <p:nvGrpSpPr>
-        <p:cNvPr id="1" name=""/>
-        <p:cNvGrpSpPr/>
-        <p:nvPr/>
-      </p:nvGrpSpPr>
-      <p:grpSpPr>
-        <a:xfrm>
-          <a:off x="0" y="0"/>
-          <a:ext cx="0" cy="0"/>
-          <a:chOff x="0" y="0"/>
-          <a:chExt cx="0" cy="0"/>
-        </a:xfrm>
-      </p:grpSpPr>
-      <p:sp>
-        <p:nvSpPr>
-          <p:cNvPr id="2" name="Title 1">
-            <a:extLst>
-              <a:ext uri="{FF2B5EF4-FFF2-40B4-BE49-F238E27FC236}">
-                <a16:creationId xmlns:a16="http://schemas.microsoft.com/office/drawing/2014/main" id="{59CD8984-BC59-4734-B887-307E297C13F3}"/>
-              </a:ext>
-            </a:extLst>
-          </p:cNvPr>
-          <p:cNvSpPr>
-            <a:spLocks noGrp="1"/>
-          </p:cNvSpPr>
-          <p:nvPr>
-            <p:ph type="title"/>
-          </p:nvPr>
-        </p:nvSpPr>
-        <p:spPr/>
-        <p:txBody>
-          <a:bodyPr/>
-          <a:lstStyle/>
-          <a:p>
-            <a:r>
-              <a:rPr lang="en-US" dirty="0"/>
-              <a:t>Experimental Setup	</a:t>
-            </a:r>
-          </a:p>
-        </p:txBody>
-      </p:sp>
-      <p:sp>
-        <p:nvSpPr>
-          <p:cNvPr id="3" name="Content Placeholder 2">
-            <a:extLst>
-              <a:ext uri="{FF2B5EF4-FFF2-40B4-BE49-F238E27FC236}">
-                <a16:creationId xmlns:a16="http://schemas.microsoft.com/office/drawing/2014/main" id="{773222F5-2607-436A-B88E-0AC87CEC05E6}"/>
-              </a:ext>
-            </a:extLst>
-          </p:cNvPr>
-          <p:cNvSpPr>
-            <a:spLocks noGrp="1"/>
-          </p:cNvSpPr>
-          <p:nvPr>
-            <p:ph idx="1"/>
-          </p:nvPr>
-        </p:nvSpPr>
-        <p:spPr/>
-        <p:txBody>
-          <a:bodyPr/>
-          <a:lstStyle/>
-          <a:p>
-            <a:r>
-              <a:rPr lang="en-US" dirty="0"/>
-              <a:t>We aim to implement the neural network models in </a:t>
-            </a:r>
-            <a:r>
-              <a:rPr lang="en-US" dirty="0" err="1"/>
-              <a:t>Tensorflow</a:t>
-            </a:r>
-            <a:r>
-              <a:rPr lang="en-US" dirty="0"/>
-              <a:t> using </a:t>
-            </a:r>
-            <a:r>
-              <a:rPr lang="en-US" dirty="0" err="1"/>
-              <a:t>Jupyter</a:t>
-            </a:r>
-            <a:r>
-              <a:rPr lang="en-US" dirty="0"/>
-              <a:t> Notebook and python</a:t>
-            </a:r>
-          </a:p>
-          <a:p>
-            <a:r>
-              <a:rPr lang="en-US" dirty="0"/>
-              <a:t>As deep learning models require huge computational power for training, we plan to use Google </a:t>
-            </a:r>
-            <a:r>
-              <a:rPr lang="en-US" dirty="0" err="1"/>
-              <a:t>Colab</a:t>
-            </a:r>
-            <a:r>
-              <a:rPr lang="en-US" dirty="0"/>
-              <a:t> which provides a Tesla K80 GPU with memory ranging between 8GB to 16GB</a:t>
-            </a:r>
-          </a:p>
-          <a:p>
-            <a:r>
-              <a:rPr lang="en-US" dirty="0"/>
-              <a:t>The dataset has been scraped off the Hubble Heritage project and Hubble Legacy Archive</a:t>
-            </a:r>
-          </a:p>
-          <a:p>
-            <a:r>
-              <a:rPr lang="en-US" dirty="0"/>
-              <a:t>The processing on the dataset will be done using OpenCV and other image libraries in python and will be fed into the network</a:t>
-            </a:r>
-          </a:p>
-        </p:txBody>
-      </p:sp>
-      <p:sp>
-        <p:nvSpPr>
-          <p:cNvPr id="4" name="Footer Placeholder 3">
-            <a:extLst>
-              <a:ext uri="{FF2B5EF4-FFF2-40B4-BE49-F238E27FC236}">
-                <a16:creationId xmlns:a16="http://schemas.microsoft.com/office/drawing/2014/main" id="{4DD67FAB-2132-4737-A37B-527D9DF651D1}"/>
-              </a:ext>
-            </a:extLst>
-          </p:cNvPr>
-          <p:cNvSpPr>
-            <a:spLocks noGrp="1"/>
-          </p:cNvSpPr>
-          <p:nvPr>
-            <p:ph type="ftr" sz="quarter" idx="11"/>
-          </p:nvPr>
-        </p:nvSpPr>
-        <p:spPr/>
-        <p:txBody>
-          <a:bodyPr/>
-          <a:lstStyle/>
-          <a:p>
-            <a:r>
-              <a:rPr lang="en-US"/>
-              <a:t>Astronomical image colourisation and super-resolution using GANS</a:t>
-            </a:r>
-            <a:endParaRPr lang="en-IN" dirty="0"/>
-          </a:p>
-        </p:txBody>
-      </p:sp>
-    </p:spTree>
-    <p:extLst>
-      <p:ext uri="{BB962C8B-B14F-4D97-AF65-F5344CB8AC3E}">
-        <p14:creationId xmlns:p14="http://schemas.microsoft.com/office/powerpoint/2010/main" val="259787384"/>
-      </p:ext>
-    </p:extLst>
-  </p:cSld>
-  <p:clrMapOvr>
-    <a:masterClrMapping/>
-  </p:clrMapOvr>
-  <mc:AlternateContent xmlns:mc="http://schemas.openxmlformats.org/markup-compatibility/2006" xmlns:p14="http://schemas.microsoft.com/office/powerpoint/2010/main">
-    <mc:Choice Requires="p14">
-      <p:transition spd="med" p14:dur="700">
-        <p:fade/>
-      </p:transition>
-    </mc:Choice>
-    <mc:Fallback xmlns="">
-      <p:transition spd="med">
-        <p:fade/>
-      </p:transition>
-    </mc:Fallback>
-  </mc:AlternateContent>
-</p:sld>
-</file>
-
 <file path=ppt/slides/slide26.xml><?xml version="1.0" encoding="utf-8"?>
 <p:sld xmlns:a="http://schemas.openxmlformats.org/drawingml/2006/main" xmlns:r="http://schemas.openxmlformats.org/officeDocument/2006/relationships" xmlns:p="http://schemas.openxmlformats.org/presentationml/2006/main">
   <p:cSld>
@@ -9712,7 +9709,7 @@
           <p:cNvPr id="2" name="Title 1">
             <a:extLst>
               <a:ext uri="{FF2B5EF4-FFF2-40B4-BE49-F238E27FC236}">
-                <a16:creationId xmlns:a16="http://schemas.microsoft.com/office/drawing/2014/main" id="{20F02093-8C65-4A66-9FF3-86977B5BB43C}"/>
+                <a16:creationId xmlns:a16="http://schemas.microsoft.com/office/drawing/2014/main" id="{59CD8984-BC59-4734-B887-307E297C13F3}"/>
               </a:ext>
             </a:extLst>
           </p:cNvPr>
@@ -9730,7 +9727,7 @@
           <a:p>
             <a:r>
               <a:rPr lang="en-US" dirty="0"/>
-              <a:t>Performance Parameters</a:t>
+              <a:t>Experimental Setup	</a:t>
             </a:r>
           </a:p>
         </p:txBody>
@@ -9740,7 +9737,7 @@
           <p:cNvPr id="3" name="Content Placeholder 2">
             <a:extLst>
               <a:ext uri="{FF2B5EF4-FFF2-40B4-BE49-F238E27FC236}">
-                <a16:creationId xmlns:a16="http://schemas.microsoft.com/office/drawing/2014/main" id="{570F2C5F-8D2D-4704-A718-EAD3E1D10EC6}"/>
+                <a16:creationId xmlns:a16="http://schemas.microsoft.com/office/drawing/2014/main" id="{773222F5-2607-436A-B88E-0AC87CEC05E6}"/>
               </a:ext>
             </a:extLst>
           </p:cNvPr>
@@ -9758,19 +9755,49 @@
           <a:p>
             <a:r>
               <a:rPr lang="en-US" dirty="0"/>
-              <a:t>To evaluate the performance of the coloring model quantitatively, we propose averaging the L1 and L2 distance (per pixel-channel) between the generated images and the ground truth images</a:t>
-            </a:r>
-          </a:p>
-          <a:p>
+              <a:t>We aim to implement the neural network models in </a:t>
+            </a:r>
+            <a:r>
+              <a:rPr lang="en-US" dirty="0" err="1"/>
+              <a:t>Tensorflow</a:t>
+            </a:r>
             <a:r>
               <a:rPr lang="en-US" dirty="0"/>
-              <a:t>Another evaluation method is to calculate the Perceptual loss. It is critical for the performance of the Generator network</a:t>
-            </a:r>
-          </a:p>
-          <a:p>
+              <a:t> using </a:t>
+            </a:r>
+            <a:r>
+              <a:rPr lang="en-US" dirty="0" err="1"/>
+              <a:t>Jupyter</a:t>
+            </a:r>
             <a:r>
               <a:rPr lang="en-US" dirty="0"/>
-              <a:t>The perceptual loss is defined as the weighted sum of the content loss and the adversarial loss component</a:t>
+              <a:t> Notebook and python</a:t>
+            </a:r>
+          </a:p>
+          <a:p>
+            <a:r>
+              <a:rPr lang="en-US" dirty="0"/>
+              <a:t>As deep learning models require huge computational power for training, we plan to use Google </a:t>
+            </a:r>
+            <a:r>
+              <a:rPr lang="en-US" dirty="0" err="1"/>
+              <a:t>Colab</a:t>
+            </a:r>
+            <a:r>
+              <a:rPr lang="en-US" dirty="0"/>
+              <a:t> which provides a Tesla K80 GPU with memory ranging between 8GB to 16GB</a:t>
+            </a:r>
+          </a:p>
+          <a:p>
+            <a:r>
+              <a:rPr lang="en-US" dirty="0"/>
+              <a:t>The dataset has been scraped off the Hubble Heritage project and Hubble Legacy Archive</a:t>
+            </a:r>
+          </a:p>
+          <a:p>
+            <a:r>
+              <a:rPr lang="en-US" dirty="0"/>
+              <a:t>The processing on the dataset will be done using OpenCV and other image libraries in python and will be fed into the network</a:t>
             </a:r>
           </a:p>
         </p:txBody>
@@ -9780,7 +9807,7 @@
           <p:cNvPr id="4" name="Footer Placeholder 3">
             <a:extLst>
               <a:ext uri="{FF2B5EF4-FFF2-40B4-BE49-F238E27FC236}">
-                <a16:creationId xmlns:a16="http://schemas.microsoft.com/office/drawing/2014/main" id="{F904A597-6303-4E45-9BE2-1E834050B6DF}"/>
+                <a16:creationId xmlns:a16="http://schemas.microsoft.com/office/drawing/2014/main" id="{4DD67FAB-2132-4737-A37B-527D9DF651D1}"/>
               </a:ext>
             </a:extLst>
           </p:cNvPr>
@@ -9800,14 +9827,14 @@
               <a:rPr lang="en-US"/>
               <a:t>Astronomical image colourisation and super-resolution using GANS</a:t>
             </a:r>
-            <a:endParaRPr lang="en-IN"/>
+            <a:endParaRPr lang="en-IN" dirty="0"/>
           </a:p>
         </p:txBody>
       </p:sp>
     </p:spTree>
     <p:extLst>
       <p:ext uri="{BB962C8B-B14F-4D97-AF65-F5344CB8AC3E}">
-        <p14:creationId xmlns:p14="http://schemas.microsoft.com/office/powerpoint/2010/main" val="4289081568"/>
+        <p14:creationId xmlns:p14="http://schemas.microsoft.com/office/powerpoint/2010/main" val="259787384"/>
       </p:ext>
     </p:extLst>
   </p:cSld>
@@ -9851,7 +9878,7 @@
           <p:cNvPr id="2" name="Title 1">
             <a:extLst>
               <a:ext uri="{FF2B5EF4-FFF2-40B4-BE49-F238E27FC236}">
-                <a16:creationId xmlns:a16="http://schemas.microsoft.com/office/drawing/2014/main" id="{515C154E-1383-4623-8BD9-DC1CE79CA7B7}"/>
+                <a16:creationId xmlns:a16="http://schemas.microsoft.com/office/drawing/2014/main" id="{20F02093-8C65-4A66-9FF3-86977B5BB43C}"/>
               </a:ext>
             </a:extLst>
           </p:cNvPr>
@@ -9869,7 +9896,7 @@
           <a:p>
             <a:r>
               <a:rPr lang="en-US" dirty="0"/>
-              <a:t>Efficiency Issues</a:t>
+              <a:t>Performance Parameters</a:t>
             </a:r>
           </a:p>
         </p:txBody>
@@ -9879,7 +9906,7 @@
           <p:cNvPr id="3" name="Content Placeholder 2">
             <a:extLst>
               <a:ext uri="{FF2B5EF4-FFF2-40B4-BE49-F238E27FC236}">
-                <a16:creationId xmlns:a16="http://schemas.microsoft.com/office/drawing/2014/main" id="{4AF4CFE7-2266-41A1-B6EF-966C6526A2AF}"/>
+                <a16:creationId xmlns:a16="http://schemas.microsoft.com/office/drawing/2014/main" id="{570F2C5F-8D2D-4704-A718-EAD3E1D10EC6}"/>
               </a:ext>
             </a:extLst>
           </p:cNvPr>
@@ -9897,37 +9924,19 @@
           <a:p>
             <a:r>
               <a:rPr lang="en-US" dirty="0"/>
-              <a:t>The data gathered had to be scraped off websites such as the Hubble Legacy archive and Hubble main website</a:t>
+              <a:t>To evaluate the performance of the coloring model quantitatively, we propose averaging the L1 and L2 distance (per pixel-channel) between the generated images and the ground truth images</a:t>
             </a:r>
           </a:p>
           <a:p>
             <a:r>
               <a:rPr lang="en-US" dirty="0"/>
-              <a:t>This yielded in more images than were useful. So we focused on a particular section of the sky where we could get the images of galaxy M101</a:t>
+              <a:t>Another evaluation method is to calculate the Perceptual loss. It is critical for the performance of the Generator network</a:t>
             </a:r>
           </a:p>
           <a:p>
             <a:r>
               <a:rPr lang="en-US" dirty="0"/>
-              <a:t>This still yielded in about 400,000 images which had to be manually filtered</a:t>
-            </a:r>
-          </a:p>
-          <a:p>
-            <a:r>
-              <a:rPr lang="en-US" dirty="0"/>
-              <a:t>Even with all the images available, the network training will require huge computational resources to perform efficiently</a:t>
-            </a:r>
-          </a:p>
-          <a:p>
-            <a:r>
-              <a:rPr lang="en-US" dirty="0"/>
-              <a:t>The network parameters exceed the available training data and will require augmentation to avoid overfitting </a:t>
-            </a:r>
-          </a:p>
-          <a:p>
-            <a:r>
-              <a:rPr lang="en-US" dirty="0"/>
-              <a:t>A quantitative evaluation of a GAN is considerably difficult even with the availability of the ground truth images</a:t>
+              <a:t>The perceptual loss is defined as the weighted sum of the content loss and the adversarial loss component</a:t>
             </a:r>
           </a:p>
         </p:txBody>
@@ -9937,7 +9946,7 @@
           <p:cNvPr id="4" name="Footer Placeholder 3">
             <a:extLst>
               <a:ext uri="{FF2B5EF4-FFF2-40B4-BE49-F238E27FC236}">
-                <a16:creationId xmlns:a16="http://schemas.microsoft.com/office/drawing/2014/main" id="{479926B9-6778-4DA9-BCBA-AC30CF378207}"/>
+                <a16:creationId xmlns:a16="http://schemas.microsoft.com/office/drawing/2014/main" id="{F904A597-6303-4E45-9BE2-1E834050B6DF}"/>
               </a:ext>
             </a:extLst>
           </p:cNvPr>
@@ -9964,7 +9973,7 @@
     </p:spTree>
     <p:extLst>
       <p:ext uri="{BB962C8B-B14F-4D97-AF65-F5344CB8AC3E}">
-        <p14:creationId xmlns:p14="http://schemas.microsoft.com/office/powerpoint/2010/main" val="1342927445"/>
+        <p14:creationId xmlns:p14="http://schemas.microsoft.com/office/powerpoint/2010/main" val="4289081568"/>
       </p:ext>
     </p:extLst>
   </p:cSld>
@@ -10008,7 +10017,7 @@
           <p:cNvPr id="2" name="Title 1">
             <a:extLst>
               <a:ext uri="{FF2B5EF4-FFF2-40B4-BE49-F238E27FC236}">
-                <a16:creationId xmlns:a16="http://schemas.microsoft.com/office/drawing/2014/main" id="{1B088865-DEAE-4612-97AF-B61F6AF552E8}"/>
+                <a16:creationId xmlns:a16="http://schemas.microsoft.com/office/drawing/2014/main" id="{515C154E-1383-4623-8BD9-DC1CE79CA7B7}"/>
               </a:ext>
             </a:extLst>
           </p:cNvPr>
@@ -10026,7 +10035,7 @@
           <a:p>
             <a:r>
               <a:rPr lang="en-US" dirty="0"/>
-              <a:t>References</a:t>
+              <a:t>Efficiency Issues</a:t>
             </a:r>
           </a:p>
         </p:txBody>
@@ -10036,7 +10045,7 @@
           <p:cNvPr id="3" name="Content Placeholder 2">
             <a:extLst>
               <a:ext uri="{FF2B5EF4-FFF2-40B4-BE49-F238E27FC236}">
-                <a16:creationId xmlns:a16="http://schemas.microsoft.com/office/drawing/2014/main" id="{EA8DEEA1-8858-40B0-9169-F753007ABA02}"/>
+                <a16:creationId xmlns:a16="http://schemas.microsoft.com/office/drawing/2014/main" id="{4AF4CFE7-2266-41A1-B6EF-966C6526A2AF}"/>
               </a:ext>
             </a:extLst>
           </p:cNvPr>
@@ -10049,291 +10058,42 @@
         </p:nvSpPr>
         <p:spPr/>
         <p:txBody>
-          <a:bodyPr>
-            <a:normAutofit/>
-          </a:bodyPr>
+          <a:bodyPr/>
           <a:lstStyle/>
           <a:p>
             <a:r>
-              <a:rPr lang="en-US" sz="1400" b="0" i="0" u="none" strike="noStrike" baseline="0" dirty="0">
-                <a:latin typeface="Times New Roman" panose="02020603050405020304" pitchFamily="18" charset="0"/>
-                <a:cs typeface="Times New Roman" panose="02020603050405020304" pitchFamily="18" charset="0"/>
-              </a:rPr>
-              <a:t>Cheng, Z., Yang, Q. and Sheng, B. (2016). Deep colorization.</a:t>
-            </a:r>
-          </a:p>
-          <a:p>
-            <a:r>
-              <a:rPr lang="en-US" sz="1400" b="0" i="0" u="none" strike="noStrike" baseline="0" dirty="0">
-                <a:latin typeface="Times New Roman" panose="02020603050405020304" pitchFamily="18" charset="0"/>
-                <a:cs typeface="Times New Roman" panose="02020603050405020304" pitchFamily="18" charset="0"/>
-              </a:rPr>
-              <a:t>Dahl, R. (2016). Automatic colorization.</a:t>
-            </a:r>
-            <a:endParaRPr lang="en-US" sz="1400" dirty="0">
-              <a:latin typeface="Times New Roman" panose="02020603050405020304" pitchFamily="18" charset="0"/>
-              <a:cs typeface="Times New Roman" panose="02020603050405020304" pitchFamily="18" charset="0"/>
-            </a:endParaRPr>
-          </a:p>
-          <a:p>
-            <a:pPr algn="l"/>
-            <a:r>
-              <a:rPr lang="en-US" sz="1400" b="0" i="0" u="none" strike="noStrike" baseline="0" dirty="0">
-                <a:latin typeface="Times New Roman" panose="02020603050405020304" pitchFamily="18" charset="0"/>
-                <a:cs typeface="Times New Roman" panose="02020603050405020304" pitchFamily="18" charset="0"/>
-              </a:rPr>
-              <a:t>Dong, C., Loy, C. C., He, K. and Tang, X. (2014). Learning a deep convolutional network for image super-resolution, </a:t>
-            </a:r>
-            <a:r>
-              <a:rPr lang="en-US" sz="1400" b="0" i="1" u="none" strike="noStrike" baseline="0" dirty="0">
-                <a:latin typeface="Times New Roman" panose="02020603050405020304" pitchFamily="18" charset="0"/>
-                <a:cs typeface="Times New Roman" panose="02020603050405020304" pitchFamily="18" charset="0"/>
-              </a:rPr>
-              <a:t>in</a:t>
-            </a:r>
-            <a:r>
-              <a:rPr lang="en-US" sz="1400" b="0" i="0" u="none" strike="noStrike" baseline="0" dirty="0">
-                <a:latin typeface="Times New Roman" panose="02020603050405020304" pitchFamily="18" charset="0"/>
-                <a:cs typeface="Times New Roman" panose="02020603050405020304" pitchFamily="18" charset="0"/>
-              </a:rPr>
-              <a:t> D. Fleet, T. 	</a:t>
-            </a:r>
-            <a:r>
-              <a:rPr lang="en-US" sz="1400" b="0" i="0" u="none" strike="noStrike" baseline="0" dirty="0" err="1">
-                <a:latin typeface="Times New Roman" panose="02020603050405020304" pitchFamily="18" charset="0"/>
-                <a:cs typeface="Times New Roman" panose="02020603050405020304" pitchFamily="18" charset="0"/>
-              </a:rPr>
-              <a:t>Pajdla</a:t>
-            </a:r>
-            <a:r>
-              <a:rPr lang="en-US" sz="1400" b="0" i="0" u="none" strike="noStrike" baseline="0" dirty="0">
-                <a:latin typeface="Times New Roman" panose="02020603050405020304" pitchFamily="18" charset="0"/>
-                <a:cs typeface="Times New Roman" panose="02020603050405020304" pitchFamily="18" charset="0"/>
-              </a:rPr>
-              <a:t>, B. Schiele and T. </a:t>
-            </a:r>
-            <a:r>
-              <a:rPr lang="en-US" sz="1400" b="0" i="0" u="none" strike="noStrike" baseline="0" dirty="0" err="1">
-                <a:latin typeface="Times New Roman" panose="02020603050405020304" pitchFamily="18" charset="0"/>
-                <a:cs typeface="Times New Roman" panose="02020603050405020304" pitchFamily="18" charset="0"/>
-              </a:rPr>
-              <a:t>Tuytelaars</a:t>
-            </a:r>
-            <a:r>
-              <a:rPr lang="en-US" sz="1400" dirty="0">
-                <a:latin typeface="Times New Roman" panose="02020603050405020304" pitchFamily="18" charset="0"/>
-                <a:cs typeface="Times New Roman" panose="02020603050405020304" pitchFamily="18" charset="0"/>
-              </a:rPr>
-              <a:t> </a:t>
-            </a:r>
-            <a:r>
-              <a:rPr lang="en-US" sz="1400" b="0" i="0" u="none" strike="noStrike" baseline="0" dirty="0">
-                <a:latin typeface="Times New Roman" panose="02020603050405020304" pitchFamily="18" charset="0"/>
-                <a:cs typeface="Times New Roman" panose="02020603050405020304" pitchFamily="18" charset="0"/>
-              </a:rPr>
-              <a:t>(eds), </a:t>
-            </a:r>
-            <a:r>
-              <a:rPr lang="en-US" sz="1400" b="0" i="1" u="none" strike="noStrike" baseline="0" dirty="0">
-                <a:latin typeface="Times New Roman" panose="02020603050405020304" pitchFamily="18" charset="0"/>
-                <a:cs typeface="Times New Roman" panose="02020603050405020304" pitchFamily="18" charset="0"/>
-              </a:rPr>
-              <a:t>Computer Vision – ECCV 2014</a:t>
-            </a:r>
-            <a:r>
-              <a:rPr lang="en-US" sz="1400" b="0" i="0" u="none" strike="noStrike" baseline="0" dirty="0">
-                <a:latin typeface="Times New Roman" panose="02020603050405020304" pitchFamily="18" charset="0"/>
-                <a:cs typeface="Times New Roman" panose="02020603050405020304" pitchFamily="18" charset="0"/>
-              </a:rPr>
-              <a:t>, Springer International Publishing, </a:t>
-            </a:r>
-          </a:p>
-          <a:p>
-            <a:pPr marL="457200" lvl="1" indent="0">
-              <a:buNone/>
-            </a:pPr>
-            <a:r>
-              <a:rPr lang="en-US" sz="1400" dirty="0">
-                <a:latin typeface="Times New Roman" panose="02020603050405020304" pitchFamily="18" charset="0"/>
-                <a:cs typeface="Times New Roman" panose="02020603050405020304" pitchFamily="18" charset="0"/>
-              </a:rPr>
-              <a:t>	</a:t>
-            </a:r>
-            <a:r>
-              <a:rPr lang="en-US" sz="1400" b="0" i="0" u="none" strike="noStrike" baseline="0" dirty="0">
-                <a:latin typeface="Times New Roman" panose="02020603050405020304" pitchFamily="18" charset="0"/>
-                <a:cs typeface="Times New Roman" panose="02020603050405020304" pitchFamily="18" charset="0"/>
-              </a:rPr>
-              <a:t>Cham, pp. 184-199.</a:t>
-            </a:r>
-          </a:p>
-          <a:p>
-            <a:pPr algn="l"/>
-            <a:r>
-              <a:rPr lang="en-US" sz="1400" b="0" i="0" u="none" strike="noStrike" baseline="0" dirty="0">
-                <a:latin typeface="Times New Roman" panose="02020603050405020304" pitchFamily="18" charset="0"/>
-                <a:cs typeface="Times New Roman" panose="02020603050405020304" pitchFamily="18" charset="0"/>
-              </a:rPr>
-              <a:t>Goodfellow, I. J., </a:t>
-            </a:r>
-            <a:r>
-              <a:rPr lang="en-US" sz="1400" b="0" i="0" u="none" strike="noStrike" baseline="0" dirty="0" err="1">
-                <a:latin typeface="Times New Roman" panose="02020603050405020304" pitchFamily="18" charset="0"/>
-                <a:cs typeface="Times New Roman" panose="02020603050405020304" pitchFamily="18" charset="0"/>
-              </a:rPr>
-              <a:t>Pouget</a:t>
-            </a:r>
-            <a:r>
-              <a:rPr lang="en-US" sz="1400" b="0" i="0" u="none" strike="noStrike" baseline="0" dirty="0">
-                <a:latin typeface="Times New Roman" panose="02020603050405020304" pitchFamily="18" charset="0"/>
-                <a:cs typeface="Times New Roman" panose="02020603050405020304" pitchFamily="18" charset="0"/>
-              </a:rPr>
-              <a:t>-Abadie, J., Mirza, M., Xu, B., </a:t>
-            </a:r>
-            <a:r>
-              <a:rPr lang="en-US" sz="1400" b="0" i="0" u="none" strike="noStrike" baseline="0" dirty="0" err="1">
-                <a:latin typeface="Times New Roman" panose="02020603050405020304" pitchFamily="18" charset="0"/>
-                <a:cs typeface="Times New Roman" panose="02020603050405020304" pitchFamily="18" charset="0"/>
-              </a:rPr>
-              <a:t>Warde</a:t>
-            </a:r>
-            <a:r>
-              <a:rPr lang="en-US" sz="1400" b="0" i="0" u="none" strike="noStrike" baseline="0" dirty="0">
-                <a:latin typeface="Times New Roman" panose="02020603050405020304" pitchFamily="18" charset="0"/>
-                <a:cs typeface="Times New Roman" panose="02020603050405020304" pitchFamily="18" charset="0"/>
-              </a:rPr>
-              <a:t>-Farley, D., </a:t>
-            </a:r>
-            <a:r>
-              <a:rPr lang="en-US" sz="1400" b="0" i="0" u="none" strike="noStrike" baseline="0" dirty="0" err="1">
-                <a:latin typeface="Times New Roman" panose="02020603050405020304" pitchFamily="18" charset="0"/>
-                <a:cs typeface="Times New Roman" panose="02020603050405020304" pitchFamily="18" charset="0"/>
-              </a:rPr>
-              <a:t>Ozair</a:t>
-            </a:r>
-            <a:r>
-              <a:rPr lang="en-US" sz="1400" b="0" i="0" u="none" strike="noStrike" baseline="0" dirty="0">
-                <a:latin typeface="Times New Roman" panose="02020603050405020304" pitchFamily="18" charset="0"/>
-                <a:cs typeface="Times New Roman" panose="02020603050405020304" pitchFamily="18" charset="0"/>
-              </a:rPr>
-              <a:t>, S., Courville, A. and  </a:t>
-            </a:r>
-            <a:r>
-              <a:rPr lang="en-US" sz="1400" b="0" i="0" u="none" strike="noStrike" baseline="0" dirty="0" err="1">
-                <a:latin typeface="Times New Roman" panose="02020603050405020304" pitchFamily="18" charset="0"/>
-                <a:cs typeface="Times New Roman" panose="02020603050405020304" pitchFamily="18" charset="0"/>
-              </a:rPr>
-              <a:t>Bengio</a:t>
-            </a:r>
-            <a:r>
-              <a:rPr lang="en-US" sz="1400" b="0" i="0" u="none" strike="noStrike" baseline="0" dirty="0">
-                <a:latin typeface="Times New Roman" panose="02020603050405020304" pitchFamily="18" charset="0"/>
-                <a:cs typeface="Times New Roman" panose="02020603050405020304" pitchFamily="18" charset="0"/>
-              </a:rPr>
-              <a:t>, Y. (2014). </a:t>
-            </a:r>
-            <a:endParaRPr lang="en-US" sz="1400" dirty="0">
-              <a:latin typeface="Times New Roman" panose="02020603050405020304" pitchFamily="18" charset="0"/>
-              <a:cs typeface="Times New Roman" panose="02020603050405020304" pitchFamily="18" charset="0"/>
-            </a:endParaRPr>
-          </a:p>
-          <a:p>
-            <a:pPr marL="457200" lvl="1" indent="0">
-              <a:buNone/>
-            </a:pPr>
-            <a:r>
-              <a:rPr lang="en-US" sz="1400" b="0" i="0" u="none" strike="noStrike" baseline="0" dirty="0">
-                <a:latin typeface="Times New Roman" panose="02020603050405020304" pitchFamily="18" charset="0"/>
-                <a:cs typeface="Times New Roman" panose="02020603050405020304" pitchFamily="18" charset="0"/>
-              </a:rPr>
-              <a:t>	Generative adversarial networks.</a:t>
-            </a:r>
-          </a:p>
-          <a:p>
-            <a:pPr algn="l"/>
-            <a:r>
-              <a:rPr lang="en-US" sz="1400" b="0" i="0" u="none" strike="noStrike" baseline="0" dirty="0">
-                <a:latin typeface="Times New Roman" panose="02020603050405020304" pitchFamily="18" charset="0"/>
-                <a:cs typeface="Times New Roman" panose="02020603050405020304" pitchFamily="18" charset="0"/>
-              </a:rPr>
-              <a:t>He, K., Zhang, X., Ren, S. and Sun, J. (2015). Deep residual learning for image recognition.</a:t>
-            </a:r>
-          </a:p>
-          <a:p>
-            <a:pPr algn="l"/>
-            <a:r>
-              <a:rPr lang="de-DE" sz="1400" b="0" i="0" u="none" strike="noStrike" baseline="0" dirty="0">
-                <a:latin typeface="Times New Roman" panose="02020603050405020304" pitchFamily="18" charset="0"/>
-                <a:cs typeface="Times New Roman" panose="02020603050405020304" pitchFamily="18" charset="0"/>
-              </a:rPr>
-              <a:t>Huang, Y.-C., Tung, Y.-S., Chen, J.-C., Wang, S.-W. and Wu, J.-L. (2005). An </a:t>
-            </a:r>
-            <a:r>
-              <a:rPr lang="en-US" sz="1400" b="0" i="0" u="none" strike="noStrike" baseline="0" dirty="0">
-                <a:latin typeface="Times New Roman" panose="02020603050405020304" pitchFamily="18" charset="0"/>
-                <a:cs typeface="Times New Roman" panose="02020603050405020304" pitchFamily="18" charset="0"/>
-              </a:rPr>
-              <a:t>adaptive edge detection based colorization algorithm and 	its applications, pp. 351–354.</a:t>
-            </a:r>
-          </a:p>
-          <a:p>
-            <a:pPr algn="l"/>
-            <a:r>
-              <a:rPr lang="en-US" sz="1400" b="0" i="0" u="none" strike="noStrike" baseline="0" dirty="0">
-                <a:latin typeface="Times New Roman" panose="02020603050405020304" pitchFamily="18" charset="0"/>
-                <a:cs typeface="Times New Roman" panose="02020603050405020304" pitchFamily="18" charset="0"/>
-              </a:rPr>
-              <a:t>Isola, P., Zhu, J.-Y., Zhou, T. and </a:t>
-            </a:r>
-            <a:r>
-              <a:rPr lang="en-US" sz="1400" b="0" i="0" u="none" strike="noStrike" baseline="0" dirty="0" err="1">
-                <a:latin typeface="Times New Roman" panose="02020603050405020304" pitchFamily="18" charset="0"/>
-                <a:cs typeface="Times New Roman" panose="02020603050405020304" pitchFamily="18" charset="0"/>
-              </a:rPr>
-              <a:t>Efros</a:t>
-            </a:r>
-            <a:r>
-              <a:rPr lang="en-US" sz="1400" b="0" i="0" u="none" strike="noStrike" baseline="0" dirty="0">
-                <a:latin typeface="Times New Roman" panose="02020603050405020304" pitchFamily="18" charset="0"/>
-                <a:cs typeface="Times New Roman" panose="02020603050405020304" pitchFamily="18" charset="0"/>
-              </a:rPr>
-              <a:t>, A. A. (2018). Image-to-image translation with conditional adversarial networks.</a:t>
-            </a:r>
-          </a:p>
-          <a:p>
-            <a:pPr algn="l"/>
-            <a:r>
-              <a:rPr lang="en-US" sz="1400" b="0" i="0" u="none" strike="noStrike" baseline="0" dirty="0" err="1">
-                <a:latin typeface="Times New Roman" panose="02020603050405020304" pitchFamily="18" charset="0"/>
-                <a:cs typeface="Times New Roman" panose="02020603050405020304" pitchFamily="18" charset="0"/>
-              </a:rPr>
-              <a:t>Jianchao</a:t>
-            </a:r>
-            <a:r>
-              <a:rPr lang="en-US" sz="1400" b="0" i="0" u="none" strike="noStrike" baseline="0" dirty="0">
-                <a:latin typeface="Times New Roman" panose="02020603050405020304" pitchFamily="18" charset="0"/>
-                <a:cs typeface="Times New Roman" panose="02020603050405020304" pitchFamily="18" charset="0"/>
-              </a:rPr>
-              <a:t> Yang, Wright, J., Huang, T. and Yi Ma (2008). Image super-resolution as sparse representation of raw image patches, </a:t>
-            </a:r>
-          </a:p>
-          <a:p>
-            <a:pPr marL="457200" lvl="1" indent="0">
-              <a:buNone/>
-            </a:pPr>
-            <a:r>
-              <a:rPr lang="en-US" sz="1400" b="0" i="1" u="none" strike="noStrike" baseline="0" dirty="0">
-                <a:latin typeface="Times New Roman" panose="02020603050405020304" pitchFamily="18" charset="0"/>
-                <a:cs typeface="Times New Roman" panose="02020603050405020304" pitchFamily="18" charset="0"/>
-              </a:rPr>
-              <a:t>	2008 IEEE Conference on Computer Vision and Pattern Recognition</a:t>
-            </a:r>
-            <a:r>
-              <a:rPr lang="en-US" sz="1400" b="0" i="0" u="none" strike="noStrike" baseline="0" dirty="0">
-                <a:latin typeface="Times New Roman" panose="02020603050405020304" pitchFamily="18" charset="0"/>
-                <a:cs typeface="Times New Roman" panose="02020603050405020304" pitchFamily="18" charset="0"/>
-              </a:rPr>
-              <a:t>, pp. 1–8.</a:t>
+              <a:rPr lang="en-US" dirty="0"/>
+              <a:t>The data gathered had to be scraped off websites such as the Hubble Legacy archive and Hubble main website</a:t>
+            </a:r>
+          </a:p>
+          <a:p>
+            <a:r>
+              <a:rPr lang="en-US" dirty="0"/>
+              <a:t>This yielded in more images than were useful. So we focused on a particular section of the sky where we could get the images of galaxy M101</a:t>
+            </a:r>
+          </a:p>
+          <a:p>
+            <a:r>
+              <a:rPr lang="en-US" dirty="0"/>
+              <a:t>This still yielded in about 400,000 images which had to be manually filtered</a:t>
+            </a:r>
+          </a:p>
+          <a:p>
+            <a:r>
+              <a:rPr lang="en-US" dirty="0"/>
+              <a:t>Even with all the images available, the network training will require huge computational resources to perform efficiently</a:t>
+            </a:r>
+          </a:p>
+          <a:p>
+            <a:r>
+              <a:rPr lang="en-US" dirty="0"/>
+              <a:t>The network parameters exceed the available training data and will require augmentation to avoid overfitting </a:t>
+            </a:r>
+          </a:p>
+          <a:p>
+            <a:r>
+              <a:rPr lang="en-US" dirty="0"/>
+              <a:t>A quantitative evaluation of a GAN is considerably difficult even with the availability of the ground truth images</a:t>
             </a:r>
           </a:p>
         </p:txBody>
@@ -10343,7 +10103,7 @@
           <p:cNvPr id="4" name="Footer Placeholder 3">
             <a:extLst>
               <a:ext uri="{FF2B5EF4-FFF2-40B4-BE49-F238E27FC236}">
-                <a16:creationId xmlns:a16="http://schemas.microsoft.com/office/drawing/2014/main" id="{90CF10EA-242A-4F9F-97DC-68619990925C}"/>
+                <a16:creationId xmlns:a16="http://schemas.microsoft.com/office/drawing/2014/main" id="{479926B9-6778-4DA9-BCBA-AC30CF378207}"/>
               </a:ext>
             </a:extLst>
           </p:cNvPr>
@@ -10370,7 +10130,7 @@
     </p:spTree>
     <p:extLst>
       <p:ext uri="{BB962C8B-B14F-4D97-AF65-F5344CB8AC3E}">
-        <p14:creationId xmlns:p14="http://schemas.microsoft.com/office/powerpoint/2010/main" val="3190111597"/>
+        <p14:creationId xmlns:p14="http://schemas.microsoft.com/office/powerpoint/2010/main" val="1342927445"/>
       </p:ext>
     </p:extLst>
   </p:cSld>
@@ -10414,7 +10174,7 @@
           <p:cNvPr id="2" name="Title 1">
             <a:extLst>
               <a:ext uri="{FF2B5EF4-FFF2-40B4-BE49-F238E27FC236}">
-                <a16:creationId xmlns:a16="http://schemas.microsoft.com/office/drawing/2014/main" id="{60013DAE-EE1B-473B-B3B6-648540F8F0E6}"/>
+                <a16:creationId xmlns:a16="http://schemas.microsoft.com/office/drawing/2014/main" id="{1B088865-DEAE-4612-97AF-B61F6AF552E8}"/>
               </a:ext>
             </a:extLst>
           </p:cNvPr>
@@ -10442,7 +10202,7 @@
           <p:cNvPr id="3" name="Content Placeholder 2">
             <a:extLst>
               <a:ext uri="{FF2B5EF4-FFF2-40B4-BE49-F238E27FC236}">
-                <a16:creationId xmlns:a16="http://schemas.microsoft.com/office/drawing/2014/main" id="{6A2C8905-50B5-4EA0-8B9A-E1EE0EB58F40}"/>
+                <a16:creationId xmlns:a16="http://schemas.microsoft.com/office/drawing/2014/main" id="{EA8DEEA1-8858-40B0-9169-F753007ABA02}"/>
               </a:ext>
             </a:extLst>
           </p:cNvPr>
@@ -10456,376 +10216,291 @@
         <p:spPr/>
         <p:txBody>
           <a:bodyPr>
-            <a:normAutofit fontScale="92500" lnSpcReduction="20000"/>
+            <a:normAutofit/>
           </a:bodyPr>
           <a:lstStyle/>
           <a:p>
-            <a:pPr algn="l"/>
             <a:r>
               <a:rPr lang="en-US" sz="1400" b="0" i="0" u="none" strike="noStrike" baseline="0" dirty="0">
                 <a:latin typeface="Times New Roman" panose="02020603050405020304" pitchFamily="18" charset="0"/>
                 <a:cs typeface="Times New Roman" panose="02020603050405020304" pitchFamily="18" charset="0"/>
               </a:rPr>
-              <a:t>Kim, J., Lee, J. K. and Lee, K. M. (2016). Accurate image super-resolution using very deep convolutional networks, </a:t>
-            </a:r>
-          </a:p>
-          <a:p>
-            <a:pPr marL="457200" lvl="1" indent="0">
-              <a:buNone/>
-            </a:pPr>
-            <a:r>
-              <a:rPr lang="en-US" sz="1500" b="0" i="1" u="none" strike="noStrike" baseline="0" dirty="0">
+              <a:t>Cheng, Z., Yang, Q. and Sheng, B. (2016). Deep colorization.</a:t>
+            </a:r>
+          </a:p>
+          <a:p>
+            <a:r>
+              <a:rPr lang="en-US" sz="1400" b="0" i="0" u="none" strike="noStrike" baseline="0" dirty="0">
                 <a:latin typeface="Times New Roman" panose="02020603050405020304" pitchFamily="18" charset="0"/>
                 <a:cs typeface="Times New Roman" panose="02020603050405020304" pitchFamily="18" charset="0"/>
               </a:rPr>
-              <a:t>	2016 IEEE Conference on Computer Vision and Pattern Recognition (CVPR), </a:t>
-            </a:r>
-            <a:r>
-              <a:rPr lang="en-US" sz="1500" b="0" i="0" u="none" strike="noStrike" baseline="0" dirty="0">
+              <a:t>Dahl, R. (2016). Automatic colorization.</a:t>
+            </a:r>
+            <a:endParaRPr lang="en-US" sz="1400" dirty="0">
+              <a:latin typeface="Times New Roman" panose="02020603050405020304" pitchFamily="18" charset="0"/>
+              <a:cs typeface="Times New Roman" panose="02020603050405020304" pitchFamily="18" charset="0"/>
+            </a:endParaRPr>
+          </a:p>
+          <a:p>
+            <a:pPr algn="l"/>
+            <a:r>
+              <a:rPr lang="en-US" sz="1400" b="0" i="0" u="none" strike="noStrike" baseline="0" dirty="0">
                 <a:latin typeface="Times New Roman" panose="02020603050405020304" pitchFamily="18" charset="0"/>
                 <a:cs typeface="Times New Roman" panose="02020603050405020304" pitchFamily="18" charset="0"/>
               </a:rPr>
-              <a:t>pp. 1646–1654.</a:t>
-            </a:r>
-          </a:p>
-          <a:p>
-            <a:pPr algn="l"/>
+              <a:t>Dong, C., Loy, C. C., He, K. and Tang, X. (2014). Learning a deep convolutional network for image super-resolution, </a:t>
+            </a:r>
+            <a:r>
+              <a:rPr lang="en-US" sz="1400" b="0" i="1" u="none" strike="noStrike" baseline="0" dirty="0">
+                <a:latin typeface="Times New Roman" panose="02020603050405020304" pitchFamily="18" charset="0"/>
+                <a:cs typeface="Times New Roman" panose="02020603050405020304" pitchFamily="18" charset="0"/>
+              </a:rPr>
+              <a:t>in</a:t>
+            </a:r>
+            <a:r>
+              <a:rPr lang="en-US" sz="1400" b="0" i="0" u="none" strike="noStrike" baseline="0" dirty="0">
+                <a:latin typeface="Times New Roman" panose="02020603050405020304" pitchFamily="18" charset="0"/>
+                <a:cs typeface="Times New Roman" panose="02020603050405020304" pitchFamily="18" charset="0"/>
+              </a:rPr>
+              <a:t> D. Fleet, T. 	</a:t>
+            </a:r>
             <a:r>
               <a:rPr lang="en-US" sz="1400" b="0" i="0" u="none" strike="noStrike" baseline="0" dirty="0" err="1">
                 <a:latin typeface="Times New Roman" panose="02020603050405020304" pitchFamily="18" charset="0"/>
                 <a:cs typeface="Times New Roman" panose="02020603050405020304" pitchFamily="18" charset="0"/>
               </a:rPr>
-              <a:t>Ledig</a:t>
+              <a:t>Pajdla</a:t>
             </a:r>
             <a:r>
               <a:rPr lang="en-US" sz="1400" b="0" i="0" u="none" strike="noStrike" baseline="0" dirty="0">
                 <a:latin typeface="Times New Roman" panose="02020603050405020304" pitchFamily="18" charset="0"/>
                 <a:cs typeface="Times New Roman" panose="02020603050405020304" pitchFamily="18" charset="0"/>
               </a:rPr>
-              <a:t>, C., Theis, L., </a:t>
+              <a:t>, B. Schiele and T. </a:t>
             </a:r>
             <a:r>
               <a:rPr lang="en-US" sz="1400" b="0" i="0" u="none" strike="noStrike" baseline="0" dirty="0" err="1">
                 <a:latin typeface="Times New Roman" panose="02020603050405020304" pitchFamily="18" charset="0"/>
                 <a:cs typeface="Times New Roman" panose="02020603050405020304" pitchFamily="18" charset="0"/>
               </a:rPr>
-              <a:t>Huszar</a:t>
+              <a:t>Tuytelaars</a:t>
+            </a:r>
+            <a:r>
+              <a:rPr lang="en-US" sz="1400" dirty="0">
+                <a:latin typeface="Times New Roman" panose="02020603050405020304" pitchFamily="18" charset="0"/>
+                <a:cs typeface="Times New Roman" panose="02020603050405020304" pitchFamily="18" charset="0"/>
+              </a:rPr>
+              <a:t> </a:t>
             </a:r>
             <a:r>
               <a:rPr lang="en-US" sz="1400" b="0" i="0" u="none" strike="noStrike" baseline="0" dirty="0">
                 <a:latin typeface="Times New Roman" panose="02020603050405020304" pitchFamily="18" charset="0"/>
                 <a:cs typeface="Times New Roman" panose="02020603050405020304" pitchFamily="18" charset="0"/>
               </a:rPr>
-              <a:t>, F., Caballero, J., Cunningham, A., Acosta, A., Aitken, A., </a:t>
+              <a:t>(eds), </a:t>
+            </a:r>
+            <a:r>
+              <a:rPr lang="en-US" sz="1400" b="0" i="1" u="none" strike="noStrike" baseline="0" dirty="0">
+                <a:latin typeface="Times New Roman" panose="02020603050405020304" pitchFamily="18" charset="0"/>
+                <a:cs typeface="Times New Roman" panose="02020603050405020304" pitchFamily="18" charset="0"/>
+              </a:rPr>
+              <a:t>Computer Vision – ECCV 2014</a:t>
+            </a:r>
+            <a:r>
+              <a:rPr lang="en-US" sz="1400" b="0" i="0" u="none" strike="noStrike" baseline="0" dirty="0">
+                <a:latin typeface="Times New Roman" panose="02020603050405020304" pitchFamily="18" charset="0"/>
+                <a:cs typeface="Times New Roman" panose="02020603050405020304" pitchFamily="18" charset="0"/>
+              </a:rPr>
+              <a:t>, Springer International Publishing, </a:t>
+            </a:r>
+          </a:p>
+          <a:p>
+            <a:pPr marL="457200" lvl="1" indent="0">
+              <a:buNone/>
+            </a:pPr>
+            <a:r>
+              <a:rPr lang="en-US" sz="1400" dirty="0">
+                <a:latin typeface="Times New Roman" panose="02020603050405020304" pitchFamily="18" charset="0"/>
+                <a:cs typeface="Times New Roman" panose="02020603050405020304" pitchFamily="18" charset="0"/>
+              </a:rPr>
+              <a:t>	</a:t>
+            </a:r>
+            <a:r>
+              <a:rPr lang="en-US" sz="1400" b="0" i="0" u="none" strike="noStrike" baseline="0" dirty="0">
+                <a:latin typeface="Times New Roman" panose="02020603050405020304" pitchFamily="18" charset="0"/>
+                <a:cs typeface="Times New Roman" panose="02020603050405020304" pitchFamily="18" charset="0"/>
+              </a:rPr>
+              <a:t>Cham, pp. 184-199.</a:t>
+            </a:r>
+          </a:p>
+          <a:p>
+            <a:pPr algn="l"/>
+            <a:r>
+              <a:rPr lang="en-US" sz="1400" b="0" i="0" u="none" strike="noStrike" baseline="0" dirty="0">
+                <a:latin typeface="Times New Roman" panose="02020603050405020304" pitchFamily="18" charset="0"/>
+                <a:cs typeface="Times New Roman" panose="02020603050405020304" pitchFamily="18" charset="0"/>
+              </a:rPr>
+              <a:t>Goodfellow, I. J., </a:t>
             </a:r>
             <a:r>
               <a:rPr lang="en-US" sz="1400" b="0" i="0" u="none" strike="noStrike" baseline="0" dirty="0" err="1">
                 <a:latin typeface="Times New Roman" panose="02020603050405020304" pitchFamily="18" charset="0"/>
                 <a:cs typeface="Times New Roman" panose="02020603050405020304" pitchFamily="18" charset="0"/>
               </a:rPr>
-              <a:t>Tejani</a:t>
+              <a:t>Pouget</a:t>
             </a:r>
             <a:r>
               <a:rPr lang="en-US" sz="1400" b="0" i="0" u="none" strike="noStrike" baseline="0" dirty="0">
                 <a:latin typeface="Times New Roman" panose="02020603050405020304" pitchFamily="18" charset="0"/>
                 <a:cs typeface="Times New Roman" panose="02020603050405020304" pitchFamily="18" charset="0"/>
               </a:rPr>
-              <a:t>, A., </a:t>
+              <a:t>-Abadie, J., Mirza, M., Xu, B., </a:t>
             </a:r>
             <a:r>
               <a:rPr lang="en-US" sz="1400" b="0" i="0" u="none" strike="noStrike" baseline="0" dirty="0" err="1">
                 <a:latin typeface="Times New Roman" panose="02020603050405020304" pitchFamily="18" charset="0"/>
                 <a:cs typeface="Times New Roman" panose="02020603050405020304" pitchFamily="18" charset="0"/>
               </a:rPr>
-              <a:t>Totz</a:t>
+              <a:t>Warde</a:t>
             </a:r>
             <a:r>
               <a:rPr lang="en-US" sz="1400" b="0" i="0" u="none" strike="noStrike" baseline="0" dirty="0">
                 <a:latin typeface="Times New Roman" panose="02020603050405020304" pitchFamily="18" charset="0"/>
                 <a:cs typeface="Times New Roman" panose="02020603050405020304" pitchFamily="18" charset="0"/>
               </a:rPr>
-              <a:t>, J., Wang, Z. and Shi, W. (2017). </a:t>
-            </a:r>
-          </a:p>
-          <a:p>
-            <a:pPr marL="457200" lvl="1" indent="0">
-              <a:buNone/>
-            </a:pPr>
-            <a:r>
-              <a:rPr lang="en-US" sz="1500" b="0" i="0" u="none" strike="noStrike" baseline="0" dirty="0">
+              <a:t>-Farley, D., </a:t>
+            </a:r>
+            <a:r>
+              <a:rPr lang="en-US" sz="1400" b="0" i="0" u="none" strike="noStrike" baseline="0" dirty="0" err="1">
                 <a:latin typeface="Times New Roman" panose="02020603050405020304" pitchFamily="18" charset="0"/>
                 <a:cs typeface="Times New Roman" panose="02020603050405020304" pitchFamily="18" charset="0"/>
               </a:rPr>
-              <a:t>	Photorealistic single image super-resolution using a generative adversarial network.</a:t>
-            </a:r>
-          </a:p>
-          <a:p>
-            <a:pPr algn="l"/>
+              <a:t>Ozair</a:t>
+            </a:r>
             <a:r>
               <a:rPr lang="en-US" sz="1400" b="0" i="0" u="none" strike="noStrike" baseline="0" dirty="0">
                 <a:latin typeface="Times New Roman" panose="02020603050405020304" pitchFamily="18" charset="0"/>
                 <a:cs typeface="Times New Roman" panose="02020603050405020304" pitchFamily="18" charset="0"/>
               </a:rPr>
-              <a:t>Levin, A., </a:t>
+              <a:t>, S., Courville, A. and  </a:t>
             </a:r>
             <a:r>
               <a:rPr lang="en-US" sz="1400" b="0" i="0" u="none" strike="noStrike" baseline="0" dirty="0" err="1">
                 <a:latin typeface="Times New Roman" panose="02020603050405020304" pitchFamily="18" charset="0"/>
                 <a:cs typeface="Times New Roman" panose="02020603050405020304" pitchFamily="18" charset="0"/>
               </a:rPr>
-              <a:t>Lischinski</a:t>
+              <a:t>Bengio</a:t>
             </a:r>
             <a:r>
               <a:rPr lang="en-US" sz="1400" b="0" i="0" u="none" strike="noStrike" baseline="0" dirty="0">
                 <a:latin typeface="Times New Roman" panose="02020603050405020304" pitchFamily="18" charset="0"/>
                 <a:cs typeface="Times New Roman" panose="02020603050405020304" pitchFamily="18" charset="0"/>
               </a:rPr>
-              <a:t>, D. and Weiss, Y. (2004). Colorization using optimization, </a:t>
-            </a:r>
-            <a:r>
-              <a:rPr lang="sv-SE" sz="1400" b="0" i="1" u="none" strike="noStrike" baseline="0" dirty="0">
-                <a:latin typeface="Times New Roman" panose="02020603050405020304" pitchFamily="18" charset="0"/>
-                <a:cs typeface="Times New Roman" panose="02020603050405020304" pitchFamily="18" charset="0"/>
-              </a:rPr>
-              <a:t>ACM SIGGRAPH 2004 Papers</a:t>
-            </a:r>
-            <a:r>
-              <a:rPr lang="sv-SE" sz="1400" b="0" i="0" u="none" strike="noStrike" baseline="0" dirty="0">
-                <a:latin typeface="Times New Roman" panose="02020603050405020304" pitchFamily="18" charset="0"/>
-                <a:cs typeface="Times New Roman" panose="02020603050405020304" pitchFamily="18" charset="0"/>
-              </a:rPr>
-              <a:t>, pp. 689–694.</a:t>
-            </a:r>
-          </a:p>
-          <a:p>
-            <a:pPr algn="l"/>
+              <a:t>, Y. (2014). </a:t>
+            </a:r>
+            <a:endParaRPr lang="en-US" sz="1400" dirty="0">
+              <a:latin typeface="Times New Roman" panose="02020603050405020304" pitchFamily="18" charset="0"/>
+              <a:cs typeface="Times New Roman" panose="02020603050405020304" pitchFamily="18" charset="0"/>
+            </a:endParaRPr>
+          </a:p>
+          <a:p>
+            <a:pPr marL="457200" lvl="1" indent="0">
+              <a:buNone/>
+            </a:pPr>
             <a:r>
               <a:rPr lang="en-US" sz="1400" b="0" i="0" u="none" strike="noStrike" baseline="0" dirty="0">
                 <a:latin typeface="Times New Roman" panose="02020603050405020304" pitchFamily="18" charset="0"/>
                 <a:cs typeface="Times New Roman" panose="02020603050405020304" pitchFamily="18" charset="0"/>
               </a:rPr>
-              <a:t>Long, J., </a:t>
+              <a:t>	Generative adversarial networks.</a:t>
+            </a:r>
+          </a:p>
+          <a:p>
+            <a:pPr algn="l"/>
+            <a:r>
+              <a:rPr lang="en-US" sz="1400" b="0" i="0" u="none" strike="noStrike" baseline="0" dirty="0">
+                <a:latin typeface="Times New Roman" panose="02020603050405020304" pitchFamily="18" charset="0"/>
+                <a:cs typeface="Times New Roman" panose="02020603050405020304" pitchFamily="18" charset="0"/>
+              </a:rPr>
+              <a:t>He, K., Zhang, X., Ren, S. and Sun, J. (2015). Deep residual learning for image recognition.</a:t>
+            </a:r>
+          </a:p>
+          <a:p>
+            <a:pPr algn="l"/>
+            <a:r>
+              <a:rPr lang="de-DE" sz="1400" b="0" i="0" u="none" strike="noStrike" baseline="0" dirty="0">
+                <a:latin typeface="Times New Roman" panose="02020603050405020304" pitchFamily="18" charset="0"/>
+                <a:cs typeface="Times New Roman" panose="02020603050405020304" pitchFamily="18" charset="0"/>
+              </a:rPr>
+              <a:t>Huang, Y.-C., Tung, Y.-S., Chen, J.-C., Wang, S.-W. and Wu, J.-L. (2005). An </a:t>
+            </a:r>
+            <a:r>
+              <a:rPr lang="en-US" sz="1400" b="0" i="0" u="none" strike="noStrike" baseline="0" dirty="0">
+                <a:latin typeface="Times New Roman" panose="02020603050405020304" pitchFamily="18" charset="0"/>
+                <a:cs typeface="Times New Roman" panose="02020603050405020304" pitchFamily="18" charset="0"/>
+              </a:rPr>
+              <a:t>adaptive edge detection based colorization algorithm and 	its applications, pp. 351–354.</a:t>
+            </a:r>
+          </a:p>
+          <a:p>
+            <a:pPr algn="l"/>
+            <a:r>
+              <a:rPr lang="en-US" sz="1400" b="0" i="0" u="none" strike="noStrike" baseline="0" dirty="0">
+                <a:latin typeface="Times New Roman" panose="02020603050405020304" pitchFamily="18" charset="0"/>
+                <a:cs typeface="Times New Roman" panose="02020603050405020304" pitchFamily="18" charset="0"/>
+              </a:rPr>
+              <a:t>Isola, P., Zhu, J.-Y., Zhou, T. and </a:t>
             </a:r>
             <a:r>
               <a:rPr lang="en-US" sz="1400" b="0" i="0" u="none" strike="noStrike" baseline="0" dirty="0" err="1">
                 <a:latin typeface="Times New Roman" panose="02020603050405020304" pitchFamily="18" charset="0"/>
                 <a:cs typeface="Times New Roman" panose="02020603050405020304" pitchFamily="18" charset="0"/>
               </a:rPr>
-              <a:t>Shelhamer</a:t>
+              <a:t>Efros</a:t>
             </a:r>
             <a:r>
               <a:rPr lang="en-US" sz="1400" b="0" i="0" u="none" strike="noStrike" baseline="0" dirty="0">
                 <a:latin typeface="Times New Roman" panose="02020603050405020304" pitchFamily="18" charset="0"/>
                 <a:cs typeface="Times New Roman" panose="02020603050405020304" pitchFamily="18" charset="0"/>
               </a:rPr>
-              <a:t>, E. and Darrell, T. (2015). Fully convolutional networks for semantic segmentation, </a:t>
-            </a:r>
-          </a:p>
-          <a:p>
-            <a:pPr marL="457200" lvl="1" indent="0">
-              <a:buNone/>
-            </a:pPr>
-            <a:r>
-              <a:rPr lang="en-US" sz="1500" b="0" i="1" u="none" strike="noStrike" baseline="0" dirty="0">
+              <a:t>, A. A. (2018). Image-to-image translation with conditional adversarial networks.</a:t>
+            </a:r>
+          </a:p>
+          <a:p>
+            <a:pPr algn="l"/>
+            <a:r>
+              <a:rPr lang="en-US" sz="1400" b="0" i="0" u="none" strike="noStrike" baseline="0" dirty="0" err="1">
                 <a:latin typeface="Times New Roman" panose="02020603050405020304" pitchFamily="18" charset="0"/>
                 <a:cs typeface="Times New Roman" panose="02020603050405020304" pitchFamily="18" charset="0"/>
               </a:rPr>
-              <a:t>	2015 IEEE Conference on Computer Vision and Pattern Recognition (CVPR), </a:t>
-            </a:r>
-            <a:r>
-              <a:rPr lang="en-US" sz="1500" b="0" i="0" u="none" strike="noStrike" baseline="0" dirty="0">
-                <a:latin typeface="Times New Roman" panose="02020603050405020304" pitchFamily="18" charset="0"/>
-                <a:cs typeface="Times New Roman" panose="02020603050405020304" pitchFamily="18" charset="0"/>
-              </a:rPr>
-              <a:t>pp. 3431–3440</a:t>
-            </a:r>
-            <a:r>
-              <a:rPr lang="en-US" sz="1000" b="0" i="0" u="none" strike="noStrike" baseline="0" dirty="0">
-                <a:latin typeface="Times New Roman" panose="02020603050405020304" pitchFamily="18" charset="0"/>
-                <a:cs typeface="Times New Roman" panose="02020603050405020304" pitchFamily="18" charset="0"/>
-              </a:rPr>
-              <a:t>.</a:t>
-            </a:r>
-          </a:p>
-          <a:p>
-            <a:pPr algn="l"/>
+              <a:t>Jianchao</a:t>
+            </a:r>
             <a:r>
               <a:rPr lang="en-US" sz="1400" b="0" i="0" u="none" strike="noStrike" baseline="0" dirty="0">
                 <a:latin typeface="Times New Roman" panose="02020603050405020304" pitchFamily="18" charset="0"/>
                 <a:cs typeface="Times New Roman" panose="02020603050405020304" pitchFamily="18" charset="0"/>
               </a:rPr>
-              <a:t>Mirza, M. and </a:t>
-            </a:r>
-            <a:r>
-              <a:rPr lang="en-US" sz="1400" b="0" i="0" u="none" strike="noStrike" baseline="0" dirty="0" err="1">
+              <a:t> Yang, Wright, J., Huang, T. and Yi Ma (2008). Image super-resolution as sparse representation of raw image patches, </a:t>
+            </a:r>
+          </a:p>
+          <a:p>
+            <a:pPr marL="457200" lvl="1" indent="0">
+              <a:buNone/>
+            </a:pPr>
+            <a:r>
+              <a:rPr lang="en-US" sz="1400" b="0" i="1" u="none" strike="noStrike" baseline="0" dirty="0">
                 <a:latin typeface="Times New Roman" panose="02020603050405020304" pitchFamily="18" charset="0"/>
                 <a:cs typeface="Times New Roman" panose="02020603050405020304" pitchFamily="18" charset="0"/>
               </a:rPr>
-              <a:t>Osindero</a:t>
+              <a:t>	2008 IEEE Conference on Computer Vision and Pattern Recognition</a:t>
             </a:r>
             <a:r>
               <a:rPr lang="en-US" sz="1400" b="0" i="0" u="none" strike="noStrike" baseline="0" dirty="0">
                 <a:latin typeface="Times New Roman" panose="02020603050405020304" pitchFamily="18" charset="0"/>
                 <a:cs typeface="Times New Roman" panose="02020603050405020304" pitchFamily="18" charset="0"/>
               </a:rPr>
-              <a:t>, S. (2014). Conditional generative adversarial nets.</a:t>
-            </a:r>
-            <a:endParaRPr lang="en-US" sz="1400" dirty="0">
-              <a:latin typeface="Times New Roman" panose="02020603050405020304" pitchFamily="18" charset="0"/>
-              <a:cs typeface="Times New Roman" panose="02020603050405020304" pitchFamily="18" charset="0"/>
-            </a:endParaRPr>
-          </a:p>
-          <a:p>
-            <a:pPr algn="l"/>
-            <a:r>
-              <a:rPr lang="en-US" sz="1400" b="0" i="0" u="none" strike="noStrike" baseline="0" dirty="0">
-                <a:latin typeface="Times New Roman" panose="02020603050405020304" pitchFamily="18" charset="0"/>
-                <a:cs typeface="Times New Roman" panose="02020603050405020304" pitchFamily="18" charset="0"/>
-              </a:rPr>
-              <a:t>Pressman, R. S. (1992). Software Engineering (3rd Ed.): A Practitioner’s Approach, McGraw-Hill, Inc., New York, NY, USA.</a:t>
-            </a:r>
-          </a:p>
-          <a:p>
-            <a:pPr algn="l"/>
-            <a:r>
-              <a:rPr lang="en-US" sz="1500" b="0" i="0" u="none" strike="noStrike" baseline="0" dirty="0">
-                <a:latin typeface="Times New Roman" panose="02020603050405020304" pitchFamily="18" charset="0"/>
-                <a:cs typeface="Times New Roman" panose="02020603050405020304" pitchFamily="18" charset="0"/>
-              </a:rPr>
-              <a:t>Qu, </a:t>
-            </a:r>
-            <a:r>
-              <a:rPr lang="en-US" sz="1500" b="0" i="0" u="none" strike="noStrike" baseline="0" dirty="0" err="1">
-                <a:latin typeface="Times New Roman" panose="02020603050405020304" pitchFamily="18" charset="0"/>
-                <a:cs typeface="Times New Roman" panose="02020603050405020304" pitchFamily="18" charset="0"/>
-              </a:rPr>
-              <a:t>Y.,Wong</a:t>
-            </a:r>
-            <a:r>
-              <a:rPr lang="en-US" sz="1500" b="0" i="0" u="none" strike="noStrike" baseline="0" dirty="0">
-                <a:latin typeface="Times New Roman" panose="02020603050405020304" pitchFamily="18" charset="0"/>
-                <a:cs typeface="Times New Roman" panose="02020603050405020304" pitchFamily="18" charset="0"/>
-              </a:rPr>
-              <a:t>, T.-T. and Heng, P.-A. (2006). Manga colorization, ACM Transactions on Graphics (TOG) 25(3): 1214–1220.</a:t>
-            </a:r>
-          </a:p>
-          <a:p>
-            <a:pPr algn="l"/>
-            <a:r>
-              <a:rPr lang="en-US" sz="1500" b="0" i="0" u="none" strike="noStrike" baseline="0" dirty="0">
-                <a:latin typeface="Times New Roman" panose="02020603050405020304" pitchFamily="18" charset="0"/>
-                <a:cs typeface="Times New Roman" panose="02020603050405020304" pitchFamily="18" charset="0"/>
-              </a:rPr>
-              <a:t>Radford, A., Metz, L. and </a:t>
-            </a:r>
-            <a:r>
-              <a:rPr lang="en-US" sz="1500" b="0" i="0" u="none" strike="noStrike" baseline="0" dirty="0" err="1">
-                <a:latin typeface="Times New Roman" panose="02020603050405020304" pitchFamily="18" charset="0"/>
-                <a:cs typeface="Times New Roman" panose="02020603050405020304" pitchFamily="18" charset="0"/>
-              </a:rPr>
-              <a:t>Chintala</a:t>
-            </a:r>
-            <a:r>
-              <a:rPr lang="en-US" sz="1500" b="0" i="0" u="none" strike="noStrike" baseline="0" dirty="0">
-                <a:latin typeface="Times New Roman" panose="02020603050405020304" pitchFamily="18" charset="0"/>
-                <a:cs typeface="Times New Roman" panose="02020603050405020304" pitchFamily="18" charset="0"/>
-              </a:rPr>
-              <a:t>, S. (2016). Unsupervised representation learning with deep convolutional generative adversarial 	networks.</a:t>
-            </a:r>
-          </a:p>
-          <a:p>
-            <a:pPr algn="l"/>
-            <a:r>
-              <a:rPr lang="en-US" sz="1500" b="0" i="0" u="none" strike="noStrike" baseline="0" dirty="0">
-                <a:latin typeface="Times New Roman" panose="02020603050405020304" pitchFamily="18" charset="0"/>
-                <a:cs typeface="Times New Roman" panose="02020603050405020304" pitchFamily="18" charset="0"/>
-              </a:rPr>
-              <a:t>Shi, W., Caballero, J., </a:t>
-            </a:r>
-            <a:r>
-              <a:rPr lang="en-US" sz="1500" b="0" i="0" u="none" strike="noStrike" baseline="0" dirty="0" err="1">
-                <a:latin typeface="Times New Roman" panose="02020603050405020304" pitchFamily="18" charset="0"/>
-                <a:cs typeface="Times New Roman" panose="02020603050405020304" pitchFamily="18" charset="0"/>
-              </a:rPr>
-              <a:t>Husz´ar</a:t>
-            </a:r>
-            <a:r>
-              <a:rPr lang="en-US" sz="1500" b="0" i="0" u="none" strike="noStrike" baseline="0" dirty="0">
-                <a:latin typeface="Times New Roman" panose="02020603050405020304" pitchFamily="18" charset="0"/>
-                <a:cs typeface="Times New Roman" panose="02020603050405020304" pitchFamily="18" charset="0"/>
-              </a:rPr>
-              <a:t>, F., </a:t>
-            </a:r>
-            <a:r>
-              <a:rPr lang="en-US" sz="1500" b="0" i="0" u="none" strike="noStrike" baseline="0" dirty="0" err="1">
-                <a:latin typeface="Times New Roman" panose="02020603050405020304" pitchFamily="18" charset="0"/>
-                <a:cs typeface="Times New Roman" panose="02020603050405020304" pitchFamily="18" charset="0"/>
-              </a:rPr>
-              <a:t>Totz</a:t>
-            </a:r>
-            <a:r>
-              <a:rPr lang="en-US" sz="1500" b="0" i="0" u="none" strike="noStrike" baseline="0" dirty="0">
-                <a:latin typeface="Times New Roman" panose="02020603050405020304" pitchFamily="18" charset="0"/>
-                <a:cs typeface="Times New Roman" panose="02020603050405020304" pitchFamily="18" charset="0"/>
-              </a:rPr>
-              <a:t>, J., Aitken, A. P., Bishop, R., </a:t>
-            </a:r>
-            <a:r>
-              <a:rPr lang="en-US" sz="1500" b="0" i="0" u="none" strike="noStrike" baseline="0" dirty="0" err="1">
-                <a:latin typeface="Times New Roman" panose="02020603050405020304" pitchFamily="18" charset="0"/>
-                <a:cs typeface="Times New Roman" panose="02020603050405020304" pitchFamily="18" charset="0"/>
-              </a:rPr>
-              <a:t>Rueckert</a:t>
-            </a:r>
-            <a:r>
-              <a:rPr lang="en-US" sz="1500" b="0" i="0" u="none" strike="noStrike" baseline="0" dirty="0">
-                <a:latin typeface="Times New Roman" panose="02020603050405020304" pitchFamily="18" charset="0"/>
-                <a:cs typeface="Times New Roman" panose="02020603050405020304" pitchFamily="18" charset="0"/>
-              </a:rPr>
-              <a:t>, D. and Wang, Z. (2016). </a:t>
-            </a:r>
-          </a:p>
-          <a:p>
-            <a:pPr marL="457200" lvl="1" indent="0">
-              <a:buNone/>
-            </a:pPr>
-            <a:r>
-              <a:rPr lang="en-US" sz="1500" b="0" i="0" u="none" strike="noStrike" baseline="0" dirty="0">
-                <a:latin typeface="Times New Roman" panose="02020603050405020304" pitchFamily="18" charset="0"/>
-                <a:cs typeface="Times New Roman" panose="02020603050405020304" pitchFamily="18" charset="0"/>
-              </a:rPr>
-              <a:t>	Real-time single image and video super-resolution using an efficient sub-pixel convolutional neural network, </a:t>
-            </a:r>
-          </a:p>
-          <a:p>
-            <a:pPr marL="457200" lvl="1" indent="0">
-              <a:buNone/>
-            </a:pPr>
-            <a:r>
-              <a:rPr lang="en-US" sz="1500" dirty="0">
-                <a:latin typeface="Times New Roman" panose="02020603050405020304" pitchFamily="18" charset="0"/>
-                <a:cs typeface="Times New Roman" panose="02020603050405020304" pitchFamily="18" charset="0"/>
-              </a:rPr>
-              <a:t>	</a:t>
-            </a:r>
-            <a:r>
-              <a:rPr lang="en-US" sz="1500" b="0" i="1" u="none" strike="noStrike" baseline="0" dirty="0">
-                <a:latin typeface="Times New Roman" panose="02020603050405020304" pitchFamily="18" charset="0"/>
-                <a:cs typeface="Times New Roman" panose="02020603050405020304" pitchFamily="18" charset="0"/>
-              </a:rPr>
-              <a:t>2016 IEEE Conference on Computer Vision and Pattern Recognition (CVPR),</a:t>
-            </a:r>
-            <a:r>
-              <a:rPr lang="en-US" sz="1500" b="0" i="0" u="none" strike="noStrike" baseline="0" dirty="0">
-                <a:latin typeface="Times New Roman" panose="02020603050405020304" pitchFamily="18" charset="0"/>
-                <a:cs typeface="Times New Roman" panose="02020603050405020304" pitchFamily="18" charset="0"/>
-              </a:rPr>
-              <a:t> pp. 1874–1883.</a:t>
-            </a:r>
-            <a:endParaRPr lang="en-US" sz="1500" dirty="0">
-              <a:latin typeface="Times New Roman" panose="02020603050405020304" pitchFamily="18" charset="0"/>
-              <a:cs typeface="Times New Roman" panose="02020603050405020304" pitchFamily="18" charset="0"/>
-            </a:endParaRPr>
+              <a:t>, pp. 1–8.</a:t>
+            </a:r>
           </a:p>
         </p:txBody>
       </p:sp>
@@ -10834,7 +10509,7 @@
           <p:cNvPr id="4" name="Footer Placeholder 3">
             <a:extLst>
               <a:ext uri="{FF2B5EF4-FFF2-40B4-BE49-F238E27FC236}">
-                <a16:creationId xmlns:a16="http://schemas.microsoft.com/office/drawing/2014/main" id="{478E4A7B-00AC-4117-8CCF-32F4EA319662}"/>
+                <a16:creationId xmlns:a16="http://schemas.microsoft.com/office/drawing/2014/main" id="{90CF10EA-242A-4F9F-97DC-68619990925C}"/>
               </a:ext>
             </a:extLst>
           </p:cNvPr>
@@ -10861,7 +10536,7 @@
     </p:spTree>
     <p:extLst>
       <p:ext uri="{BB962C8B-B14F-4D97-AF65-F5344CB8AC3E}">
-        <p14:creationId xmlns:p14="http://schemas.microsoft.com/office/powerpoint/2010/main" val="604998426"/>
+        <p14:creationId xmlns:p14="http://schemas.microsoft.com/office/powerpoint/2010/main" val="3190111597"/>
       </p:ext>
     </p:extLst>
   </p:cSld>
@@ -11227,6 +10902,497 @@
           <p:cNvPr id="2" name="Title 1">
             <a:extLst>
               <a:ext uri="{FF2B5EF4-FFF2-40B4-BE49-F238E27FC236}">
+                <a16:creationId xmlns:a16="http://schemas.microsoft.com/office/drawing/2014/main" id="{60013DAE-EE1B-473B-B3B6-648540F8F0E6}"/>
+              </a:ext>
+            </a:extLst>
+          </p:cNvPr>
+          <p:cNvSpPr>
+            <a:spLocks noGrp="1"/>
+          </p:cNvSpPr>
+          <p:nvPr>
+            <p:ph type="title"/>
+          </p:nvPr>
+        </p:nvSpPr>
+        <p:spPr/>
+        <p:txBody>
+          <a:bodyPr/>
+          <a:lstStyle/>
+          <a:p>
+            <a:r>
+              <a:rPr lang="en-US" dirty="0"/>
+              <a:t>References</a:t>
+            </a:r>
+          </a:p>
+        </p:txBody>
+      </p:sp>
+      <p:sp>
+        <p:nvSpPr>
+          <p:cNvPr id="3" name="Content Placeholder 2">
+            <a:extLst>
+              <a:ext uri="{FF2B5EF4-FFF2-40B4-BE49-F238E27FC236}">
+                <a16:creationId xmlns:a16="http://schemas.microsoft.com/office/drawing/2014/main" id="{6A2C8905-50B5-4EA0-8B9A-E1EE0EB58F40}"/>
+              </a:ext>
+            </a:extLst>
+          </p:cNvPr>
+          <p:cNvSpPr>
+            <a:spLocks noGrp="1"/>
+          </p:cNvSpPr>
+          <p:nvPr>
+            <p:ph idx="1"/>
+          </p:nvPr>
+        </p:nvSpPr>
+        <p:spPr/>
+        <p:txBody>
+          <a:bodyPr>
+            <a:normAutofit fontScale="92500" lnSpcReduction="20000"/>
+          </a:bodyPr>
+          <a:lstStyle/>
+          <a:p>
+            <a:pPr algn="l"/>
+            <a:r>
+              <a:rPr lang="en-US" sz="1400" b="0" i="0" u="none" strike="noStrike" baseline="0" dirty="0">
+                <a:latin typeface="Times New Roman" panose="02020603050405020304" pitchFamily="18" charset="0"/>
+                <a:cs typeface="Times New Roman" panose="02020603050405020304" pitchFamily="18" charset="0"/>
+              </a:rPr>
+              <a:t>Kim, J., Lee, J. K. and Lee, K. M. (2016). Accurate image super-resolution using very deep convolutional networks, </a:t>
+            </a:r>
+          </a:p>
+          <a:p>
+            <a:pPr marL="457200" lvl="1" indent="0">
+              <a:buNone/>
+            </a:pPr>
+            <a:r>
+              <a:rPr lang="en-US" sz="1500" b="0" i="1" u="none" strike="noStrike" baseline="0" dirty="0">
+                <a:latin typeface="Times New Roman" panose="02020603050405020304" pitchFamily="18" charset="0"/>
+                <a:cs typeface="Times New Roman" panose="02020603050405020304" pitchFamily="18" charset="0"/>
+              </a:rPr>
+              <a:t>	2016 IEEE Conference on Computer Vision and Pattern Recognition (CVPR), </a:t>
+            </a:r>
+            <a:r>
+              <a:rPr lang="en-US" sz="1500" b="0" i="0" u="none" strike="noStrike" baseline="0" dirty="0">
+                <a:latin typeface="Times New Roman" panose="02020603050405020304" pitchFamily="18" charset="0"/>
+                <a:cs typeface="Times New Roman" panose="02020603050405020304" pitchFamily="18" charset="0"/>
+              </a:rPr>
+              <a:t>pp. 1646–1654.</a:t>
+            </a:r>
+          </a:p>
+          <a:p>
+            <a:pPr algn="l"/>
+            <a:r>
+              <a:rPr lang="en-US" sz="1400" b="0" i="0" u="none" strike="noStrike" baseline="0" dirty="0" err="1">
+                <a:latin typeface="Times New Roman" panose="02020603050405020304" pitchFamily="18" charset="0"/>
+                <a:cs typeface="Times New Roman" panose="02020603050405020304" pitchFamily="18" charset="0"/>
+              </a:rPr>
+              <a:t>Ledig</a:t>
+            </a:r>
+            <a:r>
+              <a:rPr lang="en-US" sz="1400" b="0" i="0" u="none" strike="noStrike" baseline="0" dirty="0">
+                <a:latin typeface="Times New Roman" panose="02020603050405020304" pitchFamily="18" charset="0"/>
+                <a:cs typeface="Times New Roman" panose="02020603050405020304" pitchFamily="18" charset="0"/>
+              </a:rPr>
+              <a:t>, C., Theis, L., </a:t>
+            </a:r>
+            <a:r>
+              <a:rPr lang="en-US" sz="1400" b="0" i="0" u="none" strike="noStrike" baseline="0" dirty="0" err="1">
+                <a:latin typeface="Times New Roman" panose="02020603050405020304" pitchFamily="18" charset="0"/>
+                <a:cs typeface="Times New Roman" panose="02020603050405020304" pitchFamily="18" charset="0"/>
+              </a:rPr>
+              <a:t>Huszar</a:t>
+            </a:r>
+            <a:r>
+              <a:rPr lang="en-US" sz="1400" b="0" i="0" u="none" strike="noStrike" baseline="0" dirty="0">
+                <a:latin typeface="Times New Roman" panose="02020603050405020304" pitchFamily="18" charset="0"/>
+                <a:cs typeface="Times New Roman" panose="02020603050405020304" pitchFamily="18" charset="0"/>
+              </a:rPr>
+              <a:t>, F., Caballero, J., Cunningham, A., Acosta, A., Aitken, A., </a:t>
+            </a:r>
+            <a:r>
+              <a:rPr lang="en-US" sz="1400" b="0" i="0" u="none" strike="noStrike" baseline="0" dirty="0" err="1">
+                <a:latin typeface="Times New Roman" panose="02020603050405020304" pitchFamily="18" charset="0"/>
+                <a:cs typeface="Times New Roman" panose="02020603050405020304" pitchFamily="18" charset="0"/>
+              </a:rPr>
+              <a:t>Tejani</a:t>
+            </a:r>
+            <a:r>
+              <a:rPr lang="en-US" sz="1400" b="0" i="0" u="none" strike="noStrike" baseline="0" dirty="0">
+                <a:latin typeface="Times New Roman" panose="02020603050405020304" pitchFamily="18" charset="0"/>
+                <a:cs typeface="Times New Roman" panose="02020603050405020304" pitchFamily="18" charset="0"/>
+              </a:rPr>
+              <a:t>, A., </a:t>
+            </a:r>
+            <a:r>
+              <a:rPr lang="en-US" sz="1400" b="0" i="0" u="none" strike="noStrike" baseline="0" dirty="0" err="1">
+                <a:latin typeface="Times New Roman" panose="02020603050405020304" pitchFamily="18" charset="0"/>
+                <a:cs typeface="Times New Roman" panose="02020603050405020304" pitchFamily="18" charset="0"/>
+              </a:rPr>
+              <a:t>Totz</a:t>
+            </a:r>
+            <a:r>
+              <a:rPr lang="en-US" sz="1400" b="0" i="0" u="none" strike="noStrike" baseline="0" dirty="0">
+                <a:latin typeface="Times New Roman" panose="02020603050405020304" pitchFamily="18" charset="0"/>
+                <a:cs typeface="Times New Roman" panose="02020603050405020304" pitchFamily="18" charset="0"/>
+              </a:rPr>
+              <a:t>, J., Wang, Z. and Shi, W. (2017). </a:t>
+            </a:r>
+          </a:p>
+          <a:p>
+            <a:pPr marL="457200" lvl="1" indent="0">
+              <a:buNone/>
+            </a:pPr>
+            <a:r>
+              <a:rPr lang="en-US" sz="1500" b="0" i="0" u="none" strike="noStrike" baseline="0" dirty="0">
+                <a:latin typeface="Times New Roman" panose="02020603050405020304" pitchFamily="18" charset="0"/>
+                <a:cs typeface="Times New Roman" panose="02020603050405020304" pitchFamily="18" charset="0"/>
+              </a:rPr>
+              <a:t>	Photorealistic single image super-resolution using a generative adversarial network.</a:t>
+            </a:r>
+          </a:p>
+          <a:p>
+            <a:pPr algn="l"/>
+            <a:r>
+              <a:rPr lang="en-US" sz="1400" b="0" i="0" u="none" strike="noStrike" baseline="0" dirty="0">
+                <a:latin typeface="Times New Roman" panose="02020603050405020304" pitchFamily="18" charset="0"/>
+                <a:cs typeface="Times New Roman" panose="02020603050405020304" pitchFamily="18" charset="0"/>
+              </a:rPr>
+              <a:t>Levin, A., </a:t>
+            </a:r>
+            <a:r>
+              <a:rPr lang="en-US" sz="1400" b="0" i="0" u="none" strike="noStrike" baseline="0" dirty="0" err="1">
+                <a:latin typeface="Times New Roman" panose="02020603050405020304" pitchFamily="18" charset="0"/>
+                <a:cs typeface="Times New Roman" panose="02020603050405020304" pitchFamily="18" charset="0"/>
+              </a:rPr>
+              <a:t>Lischinski</a:t>
+            </a:r>
+            <a:r>
+              <a:rPr lang="en-US" sz="1400" b="0" i="0" u="none" strike="noStrike" baseline="0" dirty="0">
+                <a:latin typeface="Times New Roman" panose="02020603050405020304" pitchFamily="18" charset="0"/>
+                <a:cs typeface="Times New Roman" panose="02020603050405020304" pitchFamily="18" charset="0"/>
+              </a:rPr>
+              <a:t>, D. and Weiss, Y. (2004). Colorization using optimization, </a:t>
+            </a:r>
+            <a:r>
+              <a:rPr lang="sv-SE" sz="1400" b="0" i="1" u="none" strike="noStrike" baseline="0" dirty="0">
+                <a:latin typeface="Times New Roman" panose="02020603050405020304" pitchFamily="18" charset="0"/>
+                <a:cs typeface="Times New Roman" panose="02020603050405020304" pitchFamily="18" charset="0"/>
+              </a:rPr>
+              <a:t>ACM SIGGRAPH 2004 Papers</a:t>
+            </a:r>
+            <a:r>
+              <a:rPr lang="sv-SE" sz="1400" b="0" i="0" u="none" strike="noStrike" baseline="0" dirty="0">
+                <a:latin typeface="Times New Roman" panose="02020603050405020304" pitchFamily="18" charset="0"/>
+                <a:cs typeface="Times New Roman" panose="02020603050405020304" pitchFamily="18" charset="0"/>
+              </a:rPr>
+              <a:t>, pp. 689–694.</a:t>
+            </a:r>
+          </a:p>
+          <a:p>
+            <a:pPr algn="l"/>
+            <a:r>
+              <a:rPr lang="en-US" sz="1400" b="0" i="0" u="none" strike="noStrike" baseline="0" dirty="0">
+                <a:latin typeface="Times New Roman" panose="02020603050405020304" pitchFamily="18" charset="0"/>
+                <a:cs typeface="Times New Roman" panose="02020603050405020304" pitchFamily="18" charset="0"/>
+              </a:rPr>
+              <a:t>Long, J., </a:t>
+            </a:r>
+            <a:r>
+              <a:rPr lang="en-US" sz="1400" b="0" i="0" u="none" strike="noStrike" baseline="0" dirty="0" err="1">
+                <a:latin typeface="Times New Roman" panose="02020603050405020304" pitchFamily="18" charset="0"/>
+                <a:cs typeface="Times New Roman" panose="02020603050405020304" pitchFamily="18" charset="0"/>
+              </a:rPr>
+              <a:t>Shelhamer</a:t>
+            </a:r>
+            <a:r>
+              <a:rPr lang="en-US" sz="1400" b="0" i="0" u="none" strike="noStrike" baseline="0" dirty="0">
+                <a:latin typeface="Times New Roman" panose="02020603050405020304" pitchFamily="18" charset="0"/>
+                <a:cs typeface="Times New Roman" panose="02020603050405020304" pitchFamily="18" charset="0"/>
+              </a:rPr>
+              <a:t>, E. and Darrell, T. (2015). Fully convolutional networks for semantic segmentation, </a:t>
+            </a:r>
+          </a:p>
+          <a:p>
+            <a:pPr marL="457200" lvl="1" indent="0">
+              <a:buNone/>
+            </a:pPr>
+            <a:r>
+              <a:rPr lang="en-US" sz="1500" b="0" i="1" u="none" strike="noStrike" baseline="0" dirty="0">
+                <a:latin typeface="Times New Roman" panose="02020603050405020304" pitchFamily="18" charset="0"/>
+                <a:cs typeface="Times New Roman" panose="02020603050405020304" pitchFamily="18" charset="0"/>
+              </a:rPr>
+              <a:t>	2015 IEEE Conference on Computer Vision and Pattern Recognition (CVPR), </a:t>
+            </a:r>
+            <a:r>
+              <a:rPr lang="en-US" sz="1500" b="0" i="0" u="none" strike="noStrike" baseline="0" dirty="0">
+                <a:latin typeface="Times New Roman" panose="02020603050405020304" pitchFamily="18" charset="0"/>
+                <a:cs typeface="Times New Roman" panose="02020603050405020304" pitchFamily="18" charset="0"/>
+              </a:rPr>
+              <a:t>pp. 3431–3440</a:t>
+            </a:r>
+            <a:r>
+              <a:rPr lang="en-US" sz="1000" b="0" i="0" u="none" strike="noStrike" baseline="0" dirty="0">
+                <a:latin typeface="Times New Roman" panose="02020603050405020304" pitchFamily="18" charset="0"/>
+                <a:cs typeface="Times New Roman" panose="02020603050405020304" pitchFamily="18" charset="0"/>
+              </a:rPr>
+              <a:t>.</a:t>
+            </a:r>
+          </a:p>
+          <a:p>
+            <a:pPr algn="l"/>
+            <a:r>
+              <a:rPr lang="en-US" sz="1400" b="0" i="0" u="none" strike="noStrike" baseline="0" dirty="0">
+                <a:latin typeface="Times New Roman" panose="02020603050405020304" pitchFamily="18" charset="0"/>
+                <a:cs typeface="Times New Roman" panose="02020603050405020304" pitchFamily="18" charset="0"/>
+              </a:rPr>
+              <a:t>Mirza, M. and </a:t>
+            </a:r>
+            <a:r>
+              <a:rPr lang="en-US" sz="1400" b="0" i="0" u="none" strike="noStrike" baseline="0" dirty="0" err="1">
+                <a:latin typeface="Times New Roman" panose="02020603050405020304" pitchFamily="18" charset="0"/>
+                <a:cs typeface="Times New Roman" panose="02020603050405020304" pitchFamily="18" charset="0"/>
+              </a:rPr>
+              <a:t>Osindero</a:t>
+            </a:r>
+            <a:r>
+              <a:rPr lang="en-US" sz="1400" b="0" i="0" u="none" strike="noStrike" baseline="0" dirty="0">
+                <a:latin typeface="Times New Roman" panose="02020603050405020304" pitchFamily="18" charset="0"/>
+                <a:cs typeface="Times New Roman" panose="02020603050405020304" pitchFamily="18" charset="0"/>
+              </a:rPr>
+              <a:t>, S. (2014). Conditional generative adversarial nets.</a:t>
+            </a:r>
+            <a:endParaRPr lang="en-US" sz="1400" dirty="0">
+              <a:latin typeface="Times New Roman" panose="02020603050405020304" pitchFamily="18" charset="0"/>
+              <a:cs typeface="Times New Roman" panose="02020603050405020304" pitchFamily="18" charset="0"/>
+            </a:endParaRPr>
+          </a:p>
+          <a:p>
+            <a:pPr algn="l"/>
+            <a:r>
+              <a:rPr lang="en-US" sz="1400" b="0" i="0" u="none" strike="noStrike" baseline="0" dirty="0">
+                <a:latin typeface="Times New Roman" panose="02020603050405020304" pitchFamily="18" charset="0"/>
+                <a:cs typeface="Times New Roman" panose="02020603050405020304" pitchFamily="18" charset="0"/>
+              </a:rPr>
+              <a:t>Pressman, R. S. (1992). Software Engineering (3rd Ed.): A Practitioner’s Approach, McGraw-Hill, Inc., New York, NY, USA.</a:t>
+            </a:r>
+          </a:p>
+          <a:p>
+            <a:pPr algn="l"/>
+            <a:r>
+              <a:rPr lang="en-US" sz="1500" b="0" i="0" u="none" strike="noStrike" baseline="0" dirty="0">
+                <a:latin typeface="Times New Roman" panose="02020603050405020304" pitchFamily="18" charset="0"/>
+                <a:cs typeface="Times New Roman" panose="02020603050405020304" pitchFamily="18" charset="0"/>
+              </a:rPr>
+              <a:t>Qu, </a:t>
+            </a:r>
+            <a:r>
+              <a:rPr lang="en-US" sz="1500" b="0" i="0" u="none" strike="noStrike" baseline="0" dirty="0" err="1">
+                <a:latin typeface="Times New Roman" panose="02020603050405020304" pitchFamily="18" charset="0"/>
+                <a:cs typeface="Times New Roman" panose="02020603050405020304" pitchFamily="18" charset="0"/>
+              </a:rPr>
+              <a:t>Y.,Wong</a:t>
+            </a:r>
+            <a:r>
+              <a:rPr lang="en-US" sz="1500" b="0" i="0" u="none" strike="noStrike" baseline="0" dirty="0">
+                <a:latin typeface="Times New Roman" panose="02020603050405020304" pitchFamily="18" charset="0"/>
+                <a:cs typeface="Times New Roman" panose="02020603050405020304" pitchFamily="18" charset="0"/>
+              </a:rPr>
+              <a:t>, T.-T. and Heng, P.-A. (2006). Manga colorization, ACM Transactions on Graphics (TOG) 25(3): 1214–1220.</a:t>
+            </a:r>
+          </a:p>
+          <a:p>
+            <a:pPr algn="l"/>
+            <a:r>
+              <a:rPr lang="en-US" sz="1500" b="0" i="0" u="none" strike="noStrike" baseline="0" dirty="0">
+                <a:latin typeface="Times New Roman" panose="02020603050405020304" pitchFamily="18" charset="0"/>
+                <a:cs typeface="Times New Roman" panose="02020603050405020304" pitchFamily="18" charset="0"/>
+              </a:rPr>
+              <a:t>Radford, A., Metz, L. and </a:t>
+            </a:r>
+            <a:r>
+              <a:rPr lang="en-US" sz="1500" b="0" i="0" u="none" strike="noStrike" baseline="0" dirty="0" err="1">
+                <a:latin typeface="Times New Roman" panose="02020603050405020304" pitchFamily="18" charset="0"/>
+                <a:cs typeface="Times New Roman" panose="02020603050405020304" pitchFamily="18" charset="0"/>
+              </a:rPr>
+              <a:t>Chintala</a:t>
+            </a:r>
+            <a:r>
+              <a:rPr lang="en-US" sz="1500" b="0" i="0" u="none" strike="noStrike" baseline="0" dirty="0">
+                <a:latin typeface="Times New Roman" panose="02020603050405020304" pitchFamily="18" charset="0"/>
+                <a:cs typeface="Times New Roman" panose="02020603050405020304" pitchFamily="18" charset="0"/>
+              </a:rPr>
+              <a:t>, S. (2016). Unsupervised representation learning with deep convolutional generative adversarial 	networks.</a:t>
+            </a:r>
+          </a:p>
+          <a:p>
+            <a:pPr algn="l"/>
+            <a:r>
+              <a:rPr lang="en-US" sz="1500" b="0" i="0" u="none" strike="noStrike" baseline="0" dirty="0">
+                <a:latin typeface="Times New Roman" panose="02020603050405020304" pitchFamily="18" charset="0"/>
+                <a:cs typeface="Times New Roman" panose="02020603050405020304" pitchFamily="18" charset="0"/>
+              </a:rPr>
+              <a:t>Shi, W., Caballero, J., </a:t>
+            </a:r>
+            <a:r>
+              <a:rPr lang="en-US" sz="1500" b="0" i="0" u="none" strike="noStrike" baseline="0" dirty="0" err="1">
+                <a:latin typeface="Times New Roman" panose="02020603050405020304" pitchFamily="18" charset="0"/>
+                <a:cs typeface="Times New Roman" panose="02020603050405020304" pitchFamily="18" charset="0"/>
+              </a:rPr>
+              <a:t>Husz´ar</a:t>
+            </a:r>
+            <a:r>
+              <a:rPr lang="en-US" sz="1500" b="0" i="0" u="none" strike="noStrike" baseline="0" dirty="0">
+                <a:latin typeface="Times New Roman" panose="02020603050405020304" pitchFamily="18" charset="0"/>
+                <a:cs typeface="Times New Roman" panose="02020603050405020304" pitchFamily="18" charset="0"/>
+              </a:rPr>
+              <a:t>, F., </a:t>
+            </a:r>
+            <a:r>
+              <a:rPr lang="en-US" sz="1500" b="0" i="0" u="none" strike="noStrike" baseline="0" dirty="0" err="1">
+                <a:latin typeface="Times New Roman" panose="02020603050405020304" pitchFamily="18" charset="0"/>
+                <a:cs typeface="Times New Roman" panose="02020603050405020304" pitchFamily="18" charset="0"/>
+              </a:rPr>
+              <a:t>Totz</a:t>
+            </a:r>
+            <a:r>
+              <a:rPr lang="en-US" sz="1500" b="0" i="0" u="none" strike="noStrike" baseline="0" dirty="0">
+                <a:latin typeface="Times New Roman" panose="02020603050405020304" pitchFamily="18" charset="0"/>
+                <a:cs typeface="Times New Roman" panose="02020603050405020304" pitchFamily="18" charset="0"/>
+              </a:rPr>
+              <a:t>, J., Aitken, A. P., Bishop, R., </a:t>
+            </a:r>
+            <a:r>
+              <a:rPr lang="en-US" sz="1500" b="0" i="0" u="none" strike="noStrike" baseline="0" dirty="0" err="1">
+                <a:latin typeface="Times New Roman" panose="02020603050405020304" pitchFamily="18" charset="0"/>
+                <a:cs typeface="Times New Roman" panose="02020603050405020304" pitchFamily="18" charset="0"/>
+              </a:rPr>
+              <a:t>Rueckert</a:t>
+            </a:r>
+            <a:r>
+              <a:rPr lang="en-US" sz="1500" b="0" i="0" u="none" strike="noStrike" baseline="0" dirty="0">
+                <a:latin typeface="Times New Roman" panose="02020603050405020304" pitchFamily="18" charset="0"/>
+                <a:cs typeface="Times New Roman" panose="02020603050405020304" pitchFamily="18" charset="0"/>
+              </a:rPr>
+              <a:t>, D. and Wang, Z. (2016). </a:t>
+            </a:r>
+          </a:p>
+          <a:p>
+            <a:pPr marL="457200" lvl="1" indent="0">
+              <a:buNone/>
+            </a:pPr>
+            <a:r>
+              <a:rPr lang="en-US" sz="1500" b="0" i="0" u="none" strike="noStrike" baseline="0" dirty="0">
+                <a:latin typeface="Times New Roman" panose="02020603050405020304" pitchFamily="18" charset="0"/>
+                <a:cs typeface="Times New Roman" panose="02020603050405020304" pitchFamily="18" charset="0"/>
+              </a:rPr>
+              <a:t>	Real-time single image and video super-resolution using an efficient sub-pixel convolutional neural network, </a:t>
+            </a:r>
+          </a:p>
+          <a:p>
+            <a:pPr marL="457200" lvl="1" indent="0">
+              <a:buNone/>
+            </a:pPr>
+            <a:r>
+              <a:rPr lang="en-US" sz="1500" dirty="0">
+                <a:latin typeface="Times New Roman" panose="02020603050405020304" pitchFamily="18" charset="0"/>
+                <a:cs typeface="Times New Roman" panose="02020603050405020304" pitchFamily="18" charset="0"/>
+              </a:rPr>
+              <a:t>	</a:t>
+            </a:r>
+            <a:r>
+              <a:rPr lang="en-US" sz="1500" b="0" i="1" u="none" strike="noStrike" baseline="0" dirty="0">
+                <a:latin typeface="Times New Roman" panose="02020603050405020304" pitchFamily="18" charset="0"/>
+                <a:cs typeface="Times New Roman" panose="02020603050405020304" pitchFamily="18" charset="0"/>
+              </a:rPr>
+              <a:t>2016 IEEE Conference on Computer Vision and Pattern Recognition (CVPR),</a:t>
+            </a:r>
+            <a:r>
+              <a:rPr lang="en-US" sz="1500" b="0" i="0" u="none" strike="noStrike" baseline="0" dirty="0">
+                <a:latin typeface="Times New Roman" panose="02020603050405020304" pitchFamily="18" charset="0"/>
+                <a:cs typeface="Times New Roman" panose="02020603050405020304" pitchFamily="18" charset="0"/>
+              </a:rPr>
+              <a:t> pp. 1874–1883.</a:t>
+            </a:r>
+            <a:endParaRPr lang="en-US" sz="1500" dirty="0">
+              <a:latin typeface="Times New Roman" panose="02020603050405020304" pitchFamily="18" charset="0"/>
+              <a:cs typeface="Times New Roman" panose="02020603050405020304" pitchFamily="18" charset="0"/>
+            </a:endParaRPr>
+          </a:p>
+        </p:txBody>
+      </p:sp>
+      <p:sp>
+        <p:nvSpPr>
+          <p:cNvPr id="4" name="Footer Placeholder 3">
+            <a:extLst>
+              <a:ext uri="{FF2B5EF4-FFF2-40B4-BE49-F238E27FC236}">
+                <a16:creationId xmlns:a16="http://schemas.microsoft.com/office/drawing/2014/main" id="{478E4A7B-00AC-4117-8CCF-32F4EA319662}"/>
+              </a:ext>
+            </a:extLst>
+          </p:cNvPr>
+          <p:cNvSpPr>
+            <a:spLocks noGrp="1"/>
+          </p:cNvSpPr>
+          <p:nvPr>
+            <p:ph type="ftr" sz="quarter" idx="11"/>
+          </p:nvPr>
+        </p:nvSpPr>
+        <p:spPr/>
+        <p:txBody>
+          <a:bodyPr/>
+          <a:lstStyle/>
+          <a:p>
+            <a:r>
+              <a:rPr lang="en-US"/>
+              <a:t>Astronomical image colourisation and super-resolution using GANS</a:t>
+            </a:r>
+            <a:endParaRPr lang="en-IN"/>
+          </a:p>
+        </p:txBody>
+      </p:sp>
+    </p:spTree>
+    <p:extLst>
+      <p:ext uri="{BB962C8B-B14F-4D97-AF65-F5344CB8AC3E}">
+        <p14:creationId xmlns:p14="http://schemas.microsoft.com/office/powerpoint/2010/main" val="604998426"/>
+      </p:ext>
+    </p:extLst>
+  </p:cSld>
+  <p:clrMapOvr>
+    <a:masterClrMapping/>
+  </p:clrMapOvr>
+  <mc:AlternateContent xmlns:mc="http://schemas.openxmlformats.org/markup-compatibility/2006" xmlns:p14="http://schemas.microsoft.com/office/powerpoint/2010/main">
+    <mc:Choice Requires="p14">
+      <p:transition spd="med" p14:dur="700">
+        <p:fade/>
+      </p:transition>
+    </mc:Choice>
+    <mc:Fallback xmlns="">
+      <p:transition spd="med">
+        <p:fade/>
+      </p:transition>
+    </mc:Fallback>
+  </mc:AlternateContent>
+</p:sld>
+</file>
+
+<file path=ppt/slides/slide31.xml><?xml version="1.0" encoding="utf-8"?>
+<p:sld xmlns:a="http://schemas.openxmlformats.org/drawingml/2006/main" xmlns:r="http://schemas.openxmlformats.org/officeDocument/2006/relationships" xmlns:p="http://schemas.openxmlformats.org/presentationml/2006/main">
+  <p:cSld>
+    <p:spTree>
+      <p:nvGrpSpPr>
+        <p:cNvPr id="1" name=""/>
+        <p:cNvGrpSpPr/>
+        <p:nvPr/>
+      </p:nvGrpSpPr>
+      <p:grpSpPr>
+        <a:xfrm>
+          <a:off x="0" y="0"/>
+          <a:ext cx="0" cy="0"/>
+          <a:chOff x="0" y="0"/>
+          <a:chExt cx="0" cy="0"/>
+        </a:xfrm>
+      </p:grpSpPr>
+      <p:sp>
+        <p:nvSpPr>
+          <p:cNvPr id="2" name="Title 1">
+            <a:extLst>
+              <a:ext uri="{FF2B5EF4-FFF2-40B4-BE49-F238E27FC236}">
                 <a16:creationId xmlns:a16="http://schemas.microsoft.com/office/drawing/2014/main" id="{9830E956-2FFC-48BF-8208-EB43E244E3AD}"/>
               </a:ext>
             </a:extLst>
@@ -11666,7 +11832,7 @@
 </p:sld>
 </file>
 
-<file path=ppt/slides/slide31.xml><?xml version="1.0" encoding="utf-8"?>
+<file path=ppt/slides/slide32.xml><?xml version="1.0" encoding="utf-8"?>
 <p:sld xmlns:a="http://schemas.openxmlformats.org/drawingml/2006/main" xmlns:r="http://schemas.openxmlformats.org/officeDocument/2006/relationships" xmlns:p="http://schemas.openxmlformats.org/presentationml/2006/main">
   <p:cSld>
     <p:spTree>
@@ -11762,7 +11928,7 @@
 </p:sld>
 </file>
 
-<file path=ppt/slides/slide32.xml><?xml version="1.0" encoding="utf-8"?>
+<file path=ppt/slides/slide33.xml><?xml version="1.0" encoding="utf-8"?>
 <p:sld xmlns:a="http://schemas.openxmlformats.org/drawingml/2006/main" xmlns:r="http://schemas.openxmlformats.org/officeDocument/2006/relationships" xmlns:p="http://schemas.openxmlformats.org/presentationml/2006/main">
   <p:cSld>
     <p:spTree>
@@ -11885,7 +12051,7 @@
 </p:sld>
 </file>
 
-<file path=ppt/slides/slide33.xml><?xml version="1.0" encoding="utf-8"?>
+<file path=ppt/slides/slide34.xml><?xml version="1.0" encoding="utf-8"?>
 <p:sld xmlns:a="http://schemas.openxmlformats.org/drawingml/2006/main" xmlns:r="http://schemas.openxmlformats.org/officeDocument/2006/relationships" xmlns:p="http://schemas.openxmlformats.org/presentationml/2006/main">
   <p:cSld>
     <p:spTree>
@@ -12139,7 +12305,7 @@
 </p:sld>
 </file>
 
-<file path=ppt/slides/slide34.xml><?xml version="1.0" encoding="utf-8"?>
+<file path=ppt/slides/slide35.xml><?xml version="1.0" encoding="utf-8"?>
 <p:sld xmlns:a="http://schemas.openxmlformats.org/drawingml/2006/main" xmlns:r="http://schemas.openxmlformats.org/officeDocument/2006/relationships" xmlns:p="http://schemas.openxmlformats.org/presentationml/2006/main">
   <p:cSld>
     <p:spTree>
@@ -14113,6 +14279,15 @@
 </file>
 
 <file path=customXml/item1.xml><?xml version="1.0" encoding="utf-8"?>
+<?mso-contentType ?>
+<FormTemplates xmlns="http://schemas.microsoft.com/sharepoint/v3/contenttype/forms">
+  <Display>DocumentLibraryForm</Display>
+  <Edit>AssetEditForm</Edit>
+  <New>DocumentLibraryForm</New>
+</FormTemplates>
+</file>
+
+<file path=customXml/item2.xml><?xml version="1.0" encoding="utf-8"?>
 <p:properties xmlns:p="http://schemas.microsoft.com/office/2006/metadata/properties" xmlns:xsi="http://www.w3.org/2001/XMLSchema-instance" xmlns:pc="http://schemas.microsoft.com/office/infopath/2007/PartnerControls">
   <documentManagement>
     <APDescription xmlns="4873beb7-5857-4685-be1f-d57550cc96cc" xsi:nil="true"/>
@@ -14236,15 +14411,6 @@
     <UANotes xmlns="4873beb7-5857-4685-be1f-d57550cc96cc" xsi:nil="true"/>
   </documentManagement>
 </p:properties>
-</file>
-
-<file path=customXml/item2.xml><?xml version="1.0" encoding="utf-8"?>
-<?mso-contentType ?>
-<FormTemplates xmlns="http://schemas.microsoft.com/sharepoint/v3/contenttype/forms">
-  <Display>DocumentLibraryForm</Display>
-  <Edit>AssetEditForm</Edit>
-  <New>DocumentLibraryForm</New>
-</FormTemplates>
 </file>
 
 <file path=customXml/item3.xml><?xml version="1.0" encoding="utf-8"?>
@@ -15288,6 +15454,14 @@
 </file>
 
 <file path=customXml/itemProps1.xml><?xml version="1.0" encoding="utf-8"?>
+<ds:datastoreItem xmlns:ds="http://schemas.openxmlformats.org/officeDocument/2006/customXml" ds:itemID="{561E720F-F05D-4536-9C34-0CFCED65D3B7}">
+  <ds:schemaRefs>
+    <ds:schemaRef ds:uri="http://schemas.microsoft.com/sharepoint/v3/contenttype/forms"/>
+  </ds:schemaRefs>
+</ds:datastoreItem>
+</file>
+
+<file path=customXml/itemProps2.xml><?xml version="1.0" encoding="utf-8"?>
 <ds:datastoreItem xmlns:ds="http://schemas.openxmlformats.org/officeDocument/2006/customXml" ds:itemID="{8CDDBB83-77C1-4099-A0AA-289882E745E2}">
   <ds:schemaRefs>
     <ds:schemaRef ds:uri="http://purl.org/dc/terms/"/>
@@ -15299,14 +15473,6 @@
     <ds:schemaRef ds:uri="http://schemas.microsoft.com/office/infopath/2007/PartnerControls"/>
     <ds:schemaRef ds:uri="http://schemas.microsoft.com/office/2006/metadata/properties"/>
     <ds:schemaRef ds:uri="http://www.w3.org/XML/1998/namespace"/>
-  </ds:schemaRefs>
-</ds:datastoreItem>
-</file>
-
-<file path=customXml/itemProps2.xml><?xml version="1.0" encoding="utf-8"?>
-<ds:datastoreItem xmlns:ds="http://schemas.openxmlformats.org/officeDocument/2006/customXml" ds:itemID="{561E720F-F05D-4536-9C34-0CFCED65D3B7}">
-  <ds:schemaRefs>
-    <ds:schemaRef ds:uri="http://schemas.microsoft.com/sharepoint/v3/contenttype/forms"/>
   </ds:schemaRefs>
 </ds:datastoreItem>
 </file>

</xml_diff>

<commit_message>
The prof is now brown
</commit_message>
<xml_diff>
--- a/Presentation/Stage_1/stage_1_presentation.pptx
+++ b/Presentation/Stage_1/stage_1_presentation.pptx
@@ -5121,28 +5121,12 @@
               <a:t>Internal Guide: </a:t>
             </a:r>
             <a:r>
-              <a:rPr lang="en-IN" dirty="0">
-                <a:solidFill>
-                  <a:srgbClr val="000000"/>
-                </a:solidFill>
-              </a:rPr>
-              <a:t>Prof.</a:t>
-            </a:r>
-            <a:r>
-              <a:rPr lang="en-IN" b="1" dirty="0">
-                <a:solidFill>
-                  <a:srgbClr val="000000"/>
-                </a:solidFill>
-              </a:rPr>
-              <a:t> </a:t>
-            </a:r>
-            <a:r>
-              <a:rPr lang="en-IN" sz="1800" dirty="0" err="1"/>
-              <a:t>Dr.</a:t>
+              <a:rPr lang="en-IN" sz="1800"/>
+              <a:t>Prof. Dr</a:t>
             </a:r>
             <a:r>
               <a:rPr lang="en-IN" sz="1800" dirty="0"/>
-              <a:t> S. M. </a:t>
+              <a:t>. S. M. </a:t>
             </a:r>
             <a:r>
               <a:rPr lang="en-IN" sz="1800" dirty="0" err="1"/>
@@ -14153,6 +14137,15 @@
 </file>
 
 <file path=customXml/item1.xml><?xml version="1.0" encoding="utf-8"?>
+<?mso-contentType ?>
+<FormTemplates xmlns="http://schemas.microsoft.com/sharepoint/v3/contenttype/forms">
+  <Display>DocumentLibraryForm</Display>
+  <Edit>AssetEditForm</Edit>
+  <New>DocumentLibraryForm</New>
+</FormTemplates>
+</file>
+
+<file path=customXml/item2.xml><?xml version="1.0" encoding="utf-8"?>
 <p:properties xmlns:p="http://schemas.microsoft.com/office/2006/metadata/properties" xmlns:xsi="http://www.w3.org/2001/XMLSchema-instance" xmlns:pc="http://schemas.microsoft.com/office/infopath/2007/PartnerControls">
   <documentManagement>
     <APDescription xmlns="4873beb7-5857-4685-be1f-d57550cc96cc" xsi:nil="true"/>
@@ -14276,15 +14269,6 @@
     <UANotes xmlns="4873beb7-5857-4685-be1f-d57550cc96cc" xsi:nil="true"/>
   </documentManagement>
 </p:properties>
-</file>
-
-<file path=customXml/item2.xml><?xml version="1.0" encoding="utf-8"?>
-<?mso-contentType ?>
-<FormTemplates xmlns="http://schemas.microsoft.com/sharepoint/v3/contenttype/forms">
-  <Display>DocumentLibraryForm</Display>
-  <Edit>AssetEditForm</Edit>
-  <New>DocumentLibraryForm</New>
-</FormTemplates>
 </file>
 
 <file path=customXml/item3.xml><?xml version="1.0" encoding="utf-8"?>
@@ -15328,6 +15312,14 @@
 </file>
 
 <file path=customXml/itemProps1.xml><?xml version="1.0" encoding="utf-8"?>
+<ds:datastoreItem xmlns:ds="http://schemas.openxmlformats.org/officeDocument/2006/customXml" ds:itemID="{561E720F-F05D-4536-9C34-0CFCED65D3B7}">
+  <ds:schemaRefs>
+    <ds:schemaRef ds:uri="http://schemas.microsoft.com/sharepoint/v3/contenttype/forms"/>
+  </ds:schemaRefs>
+</ds:datastoreItem>
+</file>
+
+<file path=customXml/itemProps2.xml><?xml version="1.0" encoding="utf-8"?>
 <ds:datastoreItem xmlns:ds="http://schemas.openxmlformats.org/officeDocument/2006/customXml" ds:itemID="{8CDDBB83-77C1-4099-A0AA-289882E745E2}">
   <ds:schemaRefs>
     <ds:schemaRef ds:uri="http://purl.org/dc/terms/"/>
@@ -15339,14 +15331,6 @@
     <ds:schemaRef ds:uri="http://schemas.microsoft.com/office/infopath/2007/PartnerControls"/>
     <ds:schemaRef ds:uri="http://schemas.microsoft.com/office/2006/metadata/properties"/>
     <ds:schemaRef ds:uri="http://www.w3.org/XML/1998/namespace"/>
-  </ds:schemaRefs>
-</ds:datastoreItem>
-</file>
-
-<file path=customXml/itemProps2.xml><?xml version="1.0" encoding="utf-8"?>
-<ds:datastoreItem xmlns:ds="http://schemas.openxmlformats.org/officeDocument/2006/customXml" ds:itemID="{561E720F-F05D-4536-9C34-0CFCED65D3B7}">
-  <ds:schemaRefs>
-    <ds:schemaRef ds:uri="http://schemas.microsoft.com/sharepoint/v3/contenttype/forms"/>
   </ds:schemaRefs>
 </ds:datastoreItem>
 </file>

</xml_diff>

<commit_message>
Added black contents and then colored them
</commit_message>
<xml_diff>
--- a/Presentation/Stage_1/stage_1_presentation.pptx
+++ b/Presentation/Stage_1/stage_1_presentation.pptx
@@ -8401,12 +8401,6 @@
           <a:p>
             <a:r>
               <a:rPr lang="en-US" sz="2000" dirty="0"/>
-              <a:t>System will consists of L2 loss which is a function of the Euclidean distance between the pixel’s blurred color channel value in the target and predicted image.</a:t>
-            </a:r>
-          </a:p>
-          <a:p>
-            <a:r>
-              <a:rPr lang="en-US" sz="2000" dirty="0"/>
               <a:t>Generative Adversarial Networks use a minimax loss which is different than the L2 loss as it will choose a color to ﬁll an area rather than averaging. This is similar to a classiﬁcation based approach.</a:t>
             </a:r>
           </a:p>
@@ -8483,6 +8477,150 @@
           </a:ln>
         </p:spPr>
       </p:pic>
+      <p:pic>
+        <p:nvPicPr>
+          <p:cNvPr id="3" name="Picture 2">
+            <a:extLst>
+              <a:ext uri="{FF2B5EF4-FFF2-40B4-BE49-F238E27FC236}">
+                <a16:creationId xmlns:a16="http://schemas.microsoft.com/office/drawing/2014/main" id="{ECA1C287-13F9-427B-82E7-3647FAA1F87C}"/>
+              </a:ext>
+            </a:extLst>
+          </p:cNvPr>
+          <p:cNvPicPr>
+            <a:picLocks noChangeAspect="1"/>
+          </p:cNvPicPr>
+          <p:nvPr/>
+        </p:nvPicPr>
+        <p:blipFill>
+          <a:blip r:embed="rId3">
+            <a:extLst>
+              <a:ext uri="{28A0092B-C50C-407E-A947-70E740481C1C}">
+                <a14:useLocalDpi xmlns:a14="http://schemas.microsoft.com/office/drawing/2010/main" val="0"/>
+              </a:ext>
+            </a:extLst>
+          </a:blip>
+          <a:stretch>
+            <a:fillRect/>
+          </a:stretch>
+        </p:blipFill>
+        <p:spPr>
+          <a:xfrm>
+            <a:off x="2131380" y="3429000"/>
+            <a:ext cx="2396231" cy="2396231"/>
+          </a:xfrm>
+          <a:prstGeom prst="rect">
+            <a:avLst/>
+          </a:prstGeom>
+        </p:spPr>
+      </p:pic>
+      <p:sp>
+        <p:nvSpPr>
+          <p:cNvPr id="8" name="TextBox 7">
+            <a:extLst>
+              <a:ext uri="{FF2B5EF4-FFF2-40B4-BE49-F238E27FC236}">
+                <a16:creationId xmlns:a16="http://schemas.microsoft.com/office/drawing/2014/main" id="{B77EA0D7-2069-4486-8C70-20866B363FA1}"/>
+              </a:ext>
+            </a:extLst>
+          </p:cNvPr>
+          <p:cNvSpPr txBox="1"/>
+          <p:nvPr/>
+        </p:nvSpPr>
+        <p:spPr>
+          <a:xfrm>
+            <a:off x="2148765" y="5864165"/>
+            <a:ext cx="2361459" cy="246221"/>
+          </a:xfrm>
+          <a:prstGeom prst="rect">
+            <a:avLst/>
+          </a:prstGeom>
+          <a:noFill/>
+        </p:spPr>
+        <p:txBody>
+          <a:bodyPr wrap="square" rtlCol="0">
+            <a:spAutoFit/>
+          </a:bodyPr>
+          <a:lstStyle/>
+          <a:p>
+            <a:pPr algn="ctr"/>
+            <a:r>
+              <a:rPr lang="en-US" sz="1000" dirty="0"/>
+              <a:t>Fig 10a: Black &amp; White image</a:t>
+            </a:r>
+          </a:p>
+        </p:txBody>
+      </p:sp>
+      <p:pic>
+        <p:nvPicPr>
+          <p:cNvPr id="7" name="Picture 6">
+            <a:extLst>
+              <a:ext uri="{FF2B5EF4-FFF2-40B4-BE49-F238E27FC236}">
+                <a16:creationId xmlns:a16="http://schemas.microsoft.com/office/drawing/2014/main" id="{D4510493-790C-488A-A0A9-678B6677DD90}"/>
+              </a:ext>
+            </a:extLst>
+          </p:cNvPr>
+          <p:cNvPicPr>
+            <a:picLocks noChangeAspect="1"/>
+          </p:cNvPicPr>
+          <p:nvPr/>
+        </p:nvPicPr>
+        <p:blipFill>
+          <a:blip r:embed="rId4">
+            <a:extLst>
+              <a:ext uri="{28A0092B-C50C-407E-A947-70E740481C1C}">
+                <a14:useLocalDpi xmlns:a14="http://schemas.microsoft.com/office/drawing/2010/main" val="0"/>
+              </a:ext>
+            </a:extLst>
+          </a:blip>
+          <a:stretch>
+            <a:fillRect/>
+          </a:stretch>
+        </p:blipFill>
+        <p:spPr>
+          <a:xfrm>
+            <a:off x="6994052" y="3428999"/>
+            <a:ext cx="2396231" cy="2396231"/>
+          </a:xfrm>
+          <a:prstGeom prst="rect">
+            <a:avLst/>
+          </a:prstGeom>
+        </p:spPr>
+      </p:pic>
+      <p:sp>
+        <p:nvSpPr>
+          <p:cNvPr id="11" name="TextBox 10">
+            <a:extLst>
+              <a:ext uri="{FF2B5EF4-FFF2-40B4-BE49-F238E27FC236}">
+                <a16:creationId xmlns:a16="http://schemas.microsoft.com/office/drawing/2014/main" id="{6794D269-983C-4D32-931F-AF1DEA2E63A6}"/>
+              </a:ext>
+            </a:extLst>
+          </p:cNvPr>
+          <p:cNvSpPr txBox="1"/>
+          <p:nvPr/>
+        </p:nvSpPr>
+        <p:spPr>
+          <a:xfrm>
+            <a:off x="7011437" y="5864165"/>
+            <a:ext cx="2361459" cy="246221"/>
+          </a:xfrm>
+          <a:prstGeom prst="rect">
+            <a:avLst/>
+          </a:prstGeom>
+          <a:noFill/>
+        </p:spPr>
+        <p:txBody>
+          <a:bodyPr wrap="square" rtlCol="0">
+            <a:spAutoFit/>
+          </a:bodyPr>
+          <a:lstStyle/>
+          <a:p>
+            <a:pPr algn="ctr"/>
+            <a:r>
+              <a:rPr lang="en-US" sz="1000" dirty="0"/>
+              <a:t>Fig 10a: Colorized output</a:t>
+            </a:r>
+          </a:p>
+        </p:txBody>
+      </p:sp>
     </p:spTree>
     <p:extLst>
       <p:ext uri="{BB962C8B-B14F-4D97-AF65-F5344CB8AC3E}">
@@ -8636,6 +8774,150 @@
           </a:ln>
         </p:spPr>
       </p:pic>
+      <p:pic>
+        <p:nvPicPr>
+          <p:cNvPr id="3" name="Picture 2">
+            <a:extLst>
+              <a:ext uri="{FF2B5EF4-FFF2-40B4-BE49-F238E27FC236}">
+                <a16:creationId xmlns:a16="http://schemas.microsoft.com/office/drawing/2014/main" id="{22A3FE03-16E4-4072-902F-BD64C0F451EE}"/>
+              </a:ext>
+            </a:extLst>
+          </p:cNvPr>
+          <p:cNvPicPr>
+            <a:picLocks noChangeAspect="1"/>
+          </p:cNvPicPr>
+          <p:nvPr/>
+        </p:nvPicPr>
+        <p:blipFill>
+          <a:blip r:embed="rId3">
+            <a:extLst>
+              <a:ext uri="{28A0092B-C50C-407E-A947-70E740481C1C}">
+                <a14:useLocalDpi xmlns:a14="http://schemas.microsoft.com/office/drawing/2010/main" val="0"/>
+              </a:ext>
+            </a:extLst>
+          </a:blip>
+          <a:stretch>
+            <a:fillRect/>
+          </a:stretch>
+        </p:blipFill>
+        <p:spPr>
+          <a:xfrm>
+            <a:off x="2663301" y="3097752"/>
+            <a:ext cx="2160048" cy="2160048"/>
+          </a:xfrm>
+          <a:prstGeom prst="rect">
+            <a:avLst/>
+          </a:prstGeom>
+        </p:spPr>
+      </p:pic>
+      <p:sp>
+        <p:nvSpPr>
+          <p:cNvPr id="8" name="TextBox 7">
+            <a:extLst>
+              <a:ext uri="{FF2B5EF4-FFF2-40B4-BE49-F238E27FC236}">
+                <a16:creationId xmlns:a16="http://schemas.microsoft.com/office/drawing/2014/main" id="{20E8342F-61DB-4032-B194-2FC85BDC7A5D}"/>
+              </a:ext>
+            </a:extLst>
+          </p:cNvPr>
+          <p:cNvSpPr txBox="1"/>
+          <p:nvPr/>
+        </p:nvSpPr>
+        <p:spPr>
+          <a:xfrm>
+            <a:off x="2562595" y="5441950"/>
+            <a:ext cx="2361459" cy="246221"/>
+          </a:xfrm>
+          <a:prstGeom prst="rect">
+            <a:avLst/>
+          </a:prstGeom>
+          <a:noFill/>
+        </p:spPr>
+        <p:txBody>
+          <a:bodyPr wrap="square" rtlCol="0">
+            <a:spAutoFit/>
+          </a:bodyPr>
+          <a:lstStyle/>
+          <a:p>
+            <a:pPr algn="ctr"/>
+            <a:r>
+              <a:rPr lang="en-US" sz="1000" dirty="0"/>
+              <a:t>Fig 11a: Blurred image</a:t>
+            </a:r>
+          </a:p>
+        </p:txBody>
+      </p:sp>
+      <p:pic>
+        <p:nvPicPr>
+          <p:cNvPr id="7" name="Picture 6">
+            <a:extLst>
+              <a:ext uri="{FF2B5EF4-FFF2-40B4-BE49-F238E27FC236}">
+                <a16:creationId xmlns:a16="http://schemas.microsoft.com/office/drawing/2014/main" id="{CC4965A1-32C6-447C-ABF2-7D9ABF5E85E3}"/>
+              </a:ext>
+            </a:extLst>
+          </p:cNvPr>
+          <p:cNvPicPr>
+            <a:picLocks noChangeAspect="1"/>
+          </p:cNvPicPr>
+          <p:nvPr/>
+        </p:nvPicPr>
+        <p:blipFill>
+          <a:blip r:embed="rId4">
+            <a:extLst>
+              <a:ext uri="{28A0092B-C50C-407E-A947-70E740481C1C}">
+                <a14:useLocalDpi xmlns:a14="http://schemas.microsoft.com/office/drawing/2010/main" val="0"/>
+              </a:ext>
+            </a:extLst>
+          </a:blip>
+          <a:stretch>
+            <a:fillRect/>
+          </a:stretch>
+        </p:blipFill>
+        <p:spPr>
+          <a:xfrm>
+            <a:off x="6573288" y="3097752"/>
+            <a:ext cx="2160048" cy="2160048"/>
+          </a:xfrm>
+          <a:prstGeom prst="rect">
+            <a:avLst/>
+          </a:prstGeom>
+        </p:spPr>
+      </p:pic>
+      <p:sp>
+        <p:nvSpPr>
+          <p:cNvPr id="11" name="TextBox 10">
+            <a:extLst>
+              <a:ext uri="{FF2B5EF4-FFF2-40B4-BE49-F238E27FC236}">
+                <a16:creationId xmlns:a16="http://schemas.microsoft.com/office/drawing/2014/main" id="{4BFB96CE-2652-4488-815B-D148D544E7C0}"/>
+              </a:ext>
+            </a:extLst>
+          </p:cNvPr>
+          <p:cNvSpPr txBox="1"/>
+          <p:nvPr/>
+        </p:nvSpPr>
+        <p:spPr>
+          <a:xfrm>
+            <a:off x="6472582" y="5415870"/>
+            <a:ext cx="2361459" cy="246221"/>
+          </a:xfrm>
+          <a:prstGeom prst="rect">
+            <a:avLst/>
+          </a:prstGeom>
+          <a:noFill/>
+        </p:spPr>
+        <p:txBody>
+          <a:bodyPr wrap="square" rtlCol="0">
+            <a:spAutoFit/>
+          </a:bodyPr>
+          <a:lstStyle/>
+          <a:p>
+            <a:pPr algn="ctr"/>
+            <a:r>
+              <a:rPr lang="en-US" sz="1000" dirty="0"/>
+              <a:t>Fig 11a: Upscaled output</a:t>
+            </a:r>
+          </a:p>
+        </p:txBody>
+      </p:sp>
     </p:spTree>
     <p:extLst>
       <p:ext uri="{BB962C8B-B14F-4D97-AF65-F5344CB8AC3E}">
@@ -12426,21 +12708,8 @@
             </a:r>
             <a:r>
               <a:rPr lang="en-US" dirty="0"/>
-              <a:t>, </a:t>
-            </a:r>
-            <a:r>
-              <a:rPr lang="en-US" dirty="0" err="1"/>
-              <a:t>sklearn</a:t>
-            </a:r>
-            <a:r>
-              <a:rPr lang="en-US" dirty="0"/>
-              <a:t>, plotting libraries, </a:t>
-            </a:r>
-            <a:r>
-              <a:rPr lang="en-US" dirty="0" err="1"/>
-              <a:t>openCV</a:t>
-            </a:r>
-            <a:endParaRPr lang="en-US" dirty="0"/>
+              <a:t>, Sci-kit learn, plotting libraries, OpenCV</a:t>
+            </a:r>
           </a:p>
           <a:p>
             <a:endParaRPr lang="en-US" dirty="0"/>
@@ -14137,15 +14406,6 @@
 </file>
 
 <file path=customXml/item1.xml><?xml version="1.0" encoding="utf-8"?>
-<?mso-contentType ?>
-<FormTemplates xmlns="http://schemas.microsoft.com/sharepoint/v3/contenttype/forms">
-  <Display>DocumentLibraryForm</Display>
-  <Edit>AssetEditForm</Edit>
-  <New>DocumentLibraryForm</New>
-</FormTemplates>
-</file>
-
-<file path=customXml/item2.xml><?xml version="1.0" encoding="utf-8"?>
 <p:properties xmlns:p="http://schemas.microsoft.com/office/2006/metadata/properties" xmlns:xsi="http://www.w3.org/2001/XMLSchema-instance" xmlns:pc="http://schemas.microsoft.com/office/infopath/2007/PartnerControls">
   <documentManagement>
     <APDescription xmlns="4873beb7-5857-4685-be1f-d57550cc96cc" xsi:nil="true"/>
@@ -14269,6 +14529,15 @@
     <UANotes xmlns="4873beb7-5857-4685-be1f-d57550cc96cc" xsi:nil="true"/>
   </documentManagement>
 </p:properties>
+</file>
+
+<file path=customXml/item2.xml><?xml version="1.0" encoding="utf-8"?>
+<?mso-contentType ?>
+<FormTemplates xmlns="http://schemas.microsoft.com/sharepoint/v3/contenttype/forms">
+  <Display>DocumentLibraryForm</Display>
+  <Edit>AssetEditForm</Edit>
+  <New>DocumentLibraryForm</New>
+</FormTemplates>
 </file>
 
 <file path=customXml/item3.xml><?xml version="1.0" encoding="utf-8"?>
@@ -15312,14 +15581,6 @@
 </file>
 
 <file path=customXml/itemProps1.xml><?xml version="1.0" encoding="utf-8"?>
-<ds:datastoreItem xmlns:ds="http://schemas.openxmlformats.org/officeDocument/2006/customXml" ds:itemID="{561E720F-F05D-4536-9C34-0CFCED65D3B7}">
-  <ds:schemaRefs>
-    <ds:schemaRef ds:uri="http://schemas.microsoft.com/sharepoint/v3/contenttype/forms"/>
-  </ds:schemaRefs>
-</ds:datastoreItem>
-</file>
-
-<file path=customXml/itemProps2.xml><?xml version="1.0" encoding="utf-8"?>
 <ds:datastoreItem xmlns:ds="http://schemas.openxmlformats.org/officeDocument/2006/customXml" ds:itemID="{8CDDBB83-77C1-4099-A0AA-289882E745E2}">
   <ds:schemaRefs>
     <ds:schemaRef ds:uri="http://purl.org/dc/terms/"/>
@@ -15331,6 +15592,14 @@
     <ds:schemaRef ds:uri="http://schemas.microsoft.com/office/infopath/2007/PartnerControls"/>
     <ds:schemaRef ds:uri="http://schemas.microsoft.com/office/2006/metadata/properties"/>
     <ds:schemaRef ds:uri="http://www.w3.org/XML/1998/namespace"/>
+  </ds:schemaRefs>
+</ds:datastoreItem>
+</file>
+
+<file path=customXml/itemProps2.xml><?xml version="1.0" encoding="utf-8"?>
+<ds:datastoreItem xmlns:ds="http://schemas.openxmlformats.org/officeDocument/2006/customXml" ds:itemID="{561E720F-F05D-4536-9C34-0CFCED65D3B7}">
+  <ds:schemaRefs>
+    <ds:schemaRef ds:uri="http://schemas.microsoft.com/sharepoint/v3/contenttype/forms"/>
   </ds:schemaRefs>
 </ds:datastoreItem>
 </file>

</xml_diff>

<commit_message>
Requirement and Problem switched
</commit_message>
<xml_diff>
--- a/Presentation/Stage_1/stage_1_presentation.pptx
+++ b/Presentation/Stage_1/stage_1_presentation.pptx
@@ -14,8 +14,8 @@
     <p:sldId id="256" r:id="rId5"/>
     <p:sldId id="269" r:id="rId6"/>
     <p:sldId id="257" r:id="rId7"/>
-    <p:sldId id="298" r:id="rId8"/>
-    <p:sldId id="270" r:id="rId9"/>
+    <p:sldId id="270" r:id="rId8"/>
+    <p:sldId id="298" r:id="rId9"/>
     <p:sldId id="271" r:id="rId10"/>
     <p:sldId id="272" r:id="rId11"/>
     <p:sldId id="273" r:id="rId12"/>
@@ -12592,269 +12592,6 @@
       </p:grpSpPr>
       <p:sp>
         <p:nvSpPr>
-          <p:cNvPr id="2" name="Title 1">
-            <a:extLst>
-              <a:ext uri="{FF2B5EF4-FFF2-40B4-BE49-F238E27FC236}">
-                <a16:creationId xmlns:a16="http://schemas.microsoft.com/office/drawing/2014/main" id="{A8225520-1A32-49DC-A480-998582E3C0C5}"/>
-              </a:ext>
-            </a:extLst>
-          </p:cNvPr>
-          <p:cNvSpPr>
-            <a:spLocks noGrp="1"/>
-          </p:cNvSpPr>
-          <p:nvPr>
-            <p:ph type="title"/>
-          </p:nvPr>
-        </p:nvSpPr>
-        <p:spPr/>
-        <p:txBody>
-          <a:bodyPr/>
-          <a:lstStyle/>
-          <a:p>
-            <a:r>
-              <a:rPr lang="en-US" dirty="0"/>
-              <a:t>Requirement Specifications</a:t>
-            </a:r>
-          </a:p>
-        </p:txBody>
-      </p:sp>
-      <p:sp>
-        <p:nvSpPr>
-          <p:cNvPr id="3" name="Content Placeholder 2">
-            <a:extLst>
-              <a:ext uri="{FF2B5EF4-FFF2-40B4-BE49-F238E27FC236}">
-                <a16:creationId xmlns:a16="http://schemas.microsoft.com/office/drawing/2014/main" id="{B335F153-55A5-4162-94E2-F9899DEB42A3}"/>
-              </a:ext>
-            </a:extLst>
-          </p:cNvPr>
-          <p:cNvSpPr>
-            <a:spLocks noGrp="1"/>
-          </p:cNvSpPr>
-          <p:nvPr>
-            <p:ph idx="1"/>
-          </p:nvPr>
-        </p:nvSpPr>
-        <p:spPr/>
-        <p:txBody>
-          <a:bodyPr/>
-          <a:lstStyle/>
-          <a:p>
-            <a:r>
-              <a:rPr lang="en-US" dirty="0"/>
-              <a:t>The following table showcases the minimum hardware requirements:</a:t>
-            </a:r>
-          </a:p>
-          <a:p>
-            <a:endParaRPr lang="en-US" dirty="0"/>
-          </a:p>
-          <a:p>
-            <a:endParaRPr lang="en-US" dirty="0"/>
-          </a:p>
-          <a:p>
-            <a:endParaRPr lang="en-US" dirty="0"/>
-          </a:p>
-          <a:p>
-            <a:endParaRPr lang="en-US" dirty="0"/>
-          </a:p>
-          <a:p>
-            <a:r>
-              <a:rPr lang="en-US" dirty="0"/>
-              <a:t>The following are the software requirements:</a:t>
-            </a:r>
-          </a:p>
-          <a:p>
-            <a:pPr lvl="1"/>
-            <a:r>
-              <a:rPr lang="en-US" dirty="0"/>
-              <a:t>Operating System: Windows/Linux</a:t>
-            </a:r>
-          </a:p>
-          <a:p>
-            <a:pPr lvl="1"/>
-            <a:r>
-              <a:rPr lang="en-US" dirty="0"/>
-              <a:t>IDE: </a:t>
-            </a:r>
-            <a:r>
-              <a:rPr lang="en-US" dirty="0" err="1"/>
-              <a:t>Jupyter</a:t>
-            </a:r>
-            <a:r>
-              <a:rPr lang="en-US" dirty="0"/>
-              <a:t> Notebook</a:t>
-            </a:r>
-          </a:p>
-          <a:p>
-            <a:pPr lvl="1"/>
-            <a:r>
-              <a:rPr lang="en-US" dirty="0"/>
-              <a:t>Programming Languages: python3, </a:t>
-            </a:r>
-            <a:r>
-              <a:rPr lang="en-US" dirty="0" err="1"/>
-              <a:t>javascript</a:t>
-            </a:r>
-            <a:endParaRPr lang="en-US" dirty="0"/>
-          </a:p>
-          <a:p>
-            <a:pPr lvl="1"/>
-            <a:r>
-              <a:rPr lang="en-US" dirty="0"/>
-              <a:t>Frameworks: Node.js, </a:t>
-            </a:r>
-            <a:r>
-              <a:rPr lang="en-US" dirty="0" err="1"/>
-              <a:t>Tensorflow</a:t>
-            </a:r>
-            <a:r>
-              <a:rPr lang="en-US" dirty="0"/>
-              <a:t>, Sci-kit learn, plotting libraries, OpenCV</a:t>
-            </a:r>
-          </a:p>
-          <a:p>
-            <a:endParaRPr lang="en-US" dirty="0"/>
-          </a:p>
-        </p:txBody>
-      </p:sp>
-      <p:sp>
-        <p:nvSpPr>
-          <p:cNvPr id="4" name="Footer Placeholder 3">
-            <a:extLst>
-              <a:ext uri="{FF2B5EF4-FFF2-40B4-BE49-F238E27FC236}">
-                <a16:creationId xmlns:a16="http://schemas.microsoft.com/office/drawing/2014/main" id="{819AB2B2-5795-4B43-9E83-DBBD42E31F21}"/>
-              </a:ext>
-            </a:extLst>
-          </p:cNvPr>
-          <p:cNvSpPr>
-            <a:spLocks noGrp="1"/>
-          </p:cNvSpPr>
-          <p:nvPr>
-            <p:ph type="ftr" sz="quarter" idx="11"/>
-          </p:nvPr>
-        </p:nvSpPr>
-        <p:spPr/>
-        <p:txBody>
-          <a:bodyPr/>
-          <a:lstStyle/>
-          <a:p>
-            <a:r>
-              <a:rPr lang="en-US"/>
-              <a:t>Astronomical image colourisation and super-resolution using GANS</a:t>
-            </a:r>
-            <a:endParaRPr lang="en-IN"/>
-          </a:p>
-        </p:txBody>
-      </p:sp>
-      <p:sp>
-        <p:nvSpPr>
-          <p:cNvPr id="7" name="TextBox 6">
-            <a:extLst>
-              <a:ext uri="{FF2B5EF4-FFF2-40B4-BE49-F238E27FC236}">
-                <a16:creationId xmlns:a16="http://schemas.microsoft.com/office/drawing/2014/main" id="{131B2BEC-23AB-4EEB-B493-690C12ED095E}"/>
-              </a:ext>
-            </a:extLst>
-          </p:cNvPr>
-          <p:cNvSpPr txBox="1"/>
-          <p:nvPr/>
-        </p:nvSpPr>
-        <p:spPr>
-          <a:xfrm>
-            <a:off x="4731798" y="5852732"/>
-            <a:ext cx="2920753" cy="246221"/>
-          </a:xfrm>
-          <a:prstGeom prst="rect">
-            <a:avLst/>
-          </a:prstGeom>
-          <a:noFill/>
-        </p:spPr>
-        <p:txBody>
-          <a:bodyPr wrap="square" rtlCol="0">
-            <a:spAutoFit/>
-          </a:bodyPr>
-          <a:lstStyle/>
-          <a:p>
-            <a:pPr algn="ctr"/>
-            <a:r>
-              <a:rPr lang="en-US" sz="1000" dirty="0"/>
-              <a:t>Table 1: Hardware Requirements</a:t>
-            </a:r>
-          </a:p>
-        </p:txBody>
-      </p:sp>
-      <p:pic>
-        <p:nvPicPr>
-          <p:cNvPr id="9" name="Picture 8">
-            <a:extLst>
-              <a:ext uri="{FF2B5EF4-FFF2-40B4-BE49-F238E27FC236}">
-                <a16:creationId xmlns:a16="http://schemas.microsoft.com/office/drawing/2014/main" id="{D4A9D9FA-FE81-44DA-8AAF-937566B0DBBA}"/>
-              </a:ext>
-            </a:extLst>
-          </p:cNvPr>
-          <p:cNvPicPr>
-            <a:picLocks noChangeAspect="1"/>
-          </p:cNvPicPr>
-          <p:nvPr/>
-        </p:nvPicPr>
-        <p:blipFill>
-          <a:blip r:embed="rId2"/>
-          <a:stretch>
-            <a:fillRect/>
-          </a:stretch>
-        </p:blipFill>
-        <p:spPr>
-          <a:xfrm>
-            <a:off x="1374055" y="2145095"/>
-            <a:ext cx="8945223" cy="1581371"/>
-          </a:xfrm>
-          <a:prstGeom prst="rect">
-            <a:avLst/>
-          </a:prstGeom>
-        </p:spPr>
-      </p:pic>
-    </p:spTree>
-    <p:extLst>
-      <p:ext uri="{BB962C8B-B14F-4D97-AF65-F5344CB8AC3E}">
-        <p14:creationId xmlns:p14="http://schemas.microsoft.com/office/powerpoint/2010/main" val="1715567951"/>
-      </p:ext>
-    </p:extLst>
-  </p:cSld>
-  <p:clrMapOvr>
-    <a:masterClrMapping/>
-  </p:clrMapOvr>
-  <mc:AlternateContent xmlns:mc="http://schemas.openxmlformats.org/markup-compatibility/2006" xmlns:p14="http://schemas.microsoft.com/office/powerpoint/2010/main">
-    <mc:Choice Requires="p14">
-      <p:transition spd="med" p14:dur="700">
-        <p:fade/>
-      </p:transition>
-    </mc:Choice>
-    <mc:Fallback xmlns="">
-      <p:transition spd="med">
-        <p:fade/>
-      </p:transition>
-    </mc:Fallback>
-  </mc:AlternateContent>
-</p:sld>
-</file>
-
-<file path=ppt/slides/slide5.xml><?xml version="1.0" encoding="utf-8"?>
-<p:sld xmlns:a="http://schemas.openxmlformats.org/drawingml/2006/main" xmlns:r="http://schemas.openxmlformats.org/officeDocument/2006/relationships" xmlns:p="http://schemas.openxmlformats.org/presentationml/2006/main">
-  <p:cSld>
-    <p:spTree>
-      <p:nvGrpSpPr>
-        <p:cNvPr id="1" name=""/>
-        <p:cNvGrpSpPr/>
-        <p:nvPr/>
-      </p:nvGrpSpPr>
-      <p:grpSpPr>
-        <a:xfrm>
-          <a:off x="0" y="0"/>
-          <a:ext cx="0" cy="0"/>
-          <a:chOff x="0" y="0"/>
-          <a:chExt cx="0" cy="0"/>
-        </a:xfrm>
-      </p:grpSpPr>
-      <p:sp>
-        <p:nvSpPr>
           <p:cNvPr id="13" name="Title 12"/>
           <p:cNvSpPr>
             <a:spLocks noGrp="1"/>
@@ -13010,6 +12747,269 @@
     <p:extLst>
       <p:ext uri="{BB962C8B-B14F-4D97-AF65-F5344CB8AC3E}">
         <p14:creationId xmlns:p14="http://schemas.microsoft.com/office/powerpoint/2010/main" val="2942683675"/>
+      </p:ext>
+    </p:extLst>
+  </p:cSld>
+  <p:clrMapOvr>
+    <a:masterClrMapping/>
+  </p:clrMapOvr>
+  <mc:AlternateContent xmlns:mc="http://schemas.openxmlformats.org/markup-compatibility/2006" xmlns:p14="http://schemas.microsoft.com/office/powerpoint/2010/main">
+    <mc:Choice Requires="p14">
+      <p:transition spd="med" p14:dur="700">
+        <p:fade/>
+      </p:transition>
+    </mc:Choice>
+    <mc:Fallback xmlns="">
+      <p:transition spd="med">
+        <p:fade/>
+      </p:transition>
+    </mc:Fallback>
+  </mc:AlternateContent>
+</p:sld>
+</file>
+
+<file path=ppt/slides/slide5.xml><?xml version="1.0" encoding="utf-8"?>
+<p:sld xmlns:a="http://schemas.openxmlformats.org/drawingml/2006/main" xmlns:r="http://schemas.openxmlformats.org/officeDocument/2006/relationships" xmlns:p="http://schemas.openxmlformats.org/presentationml/2006/main">
+  <p:cSld>
+    <p:spTree>
+      <p:nvGrpSpPr>
+        <p:cNvPr id="1" name=""/>
+        <p:cNvGrpSpPr/>
+        <p:nvPr/>
+      </p:nvGrpSpPr>
+      <p:grpSpPr>
+        <a:xfrm>
+          <a:off x="0" y="0"/>
+          <a:ext cx="0" cy="0"/>
+          <a:chOff x="0" y="0"/>
+          <a:chExt cx="0" cy="0"/>
+        </a:xfrm>
+      </p:grpSpPr>
+      <p:sp>
+        <p:nvSpPr>
+          <p:cNvPr id="2" name="Title 1">
+            <a:extLst>
+              <a:ext uri="{FF2B5EF4-FFF2-40B4-BE49-F238E27FC236}">
+                <a16:creationId xmlns:a16="http://schemas.microsoft.com/office/drawing/2014/main" id="{A8225520-1A32-49DC-A480-998582E3C0C5}"/>
+              </a:ext>
+            </a:extLst>
+          </p:cNvPr>
+          <p:cNvSpPr>
+            <a:spLocks noGrp="1"/>
+          </p:cNvSpPr>
+          <p:nvPr>
+            <p:ph type="title"/>
+          </p:nvPr>
+        </p:nvSpPr>
+        <p:spPr/>
+        <p:txBody>
+          <a:bodyPr/>
+          <a:lstStyle/>
+          <a:p>
+            <a:r>
+              <a:rPr lang="en-US" dirty="0"/>
+              <a:t>Requirement Specifications</a:t>
+            </a:r>
+          </a:p>
+        </p:txBody>
+      </p:sp>
+      <p:sp>
+        <p:nvSpPr>
+          <p:cNvPr id="3" name="Content Placeholder 2">
+            <a:extLst>
+              <a:ext uri="{FF2B5EF4-FFF2-40B4-BE49-F238E27FC236}">
+                <a16:creationId xmlns:a16="http://schemas.microsoft.com/office/drawing/2014/main" id="{B335F153-55A5-4162-94E2-F9899DEB42A3}"/>
+              </a:ext>
+            </a:extLst>
+          </p:cNvPr>
+          <p:cNvSpPr>
+            <a:spLocks noGrp="1"/>
+          </p:cNvSpPr>
+          <p:nvPr>
+            <p:ph idx="1"/>
+          </p:nvPr>
+        </p:nvSpPr>
+        <p:spPr/>
+        <p:txBody>
+          <a:bodyPr/>
+          <a:lstStyle/>
+          <a:p>
+            <a:r>
+              <a:rPr lang="en-US" dirty="0"/>
+              <a:t>The following table showcases the minimum hardware requirements:</a:t>
+            </a:r>
+          </a:p>
+          <a:p>
+            <a:endParaRPr lang="en-US" dirty="0"/>
+          </a:p>
+          <a:p>
+            <a:endParaRPr lang="en-US" dirty="0"/>
+          </a:p>
+          <a:p>
+            <a:endParaRPr lang="en-US" dirty="0"/>
+          </a:p>
+          <a:p>
+            <a:endParaRPr lang="en-US" dirty="0"/>
+          </a:p>
+          <a:p>
+            <a:r>
+              <a:rPr lang="en-US" dirty="0"/>
+              <a:t>The following are the software requirements:</a:t>
+            </a:r>
+          </a:p>
+          <a:p>
+            <a:pPr lvl="1"/>
+            <a:r>
+              <a:rPr lang="en-US" dirty="0"/>
+              <a:t>Operating System: Windows/Linux</a:t>
+            </a:r>
+          </a:p>
+          <a:p>
+            <a:pPr lvl="1"/>
+            <a:r>
+              <a:rPr lang="en-US" dirty="0"/>
+              <a:t>IDE: </a:t>
+            </a:r>
+            <a:r>
+              <a:rPr lang="en-US" dirty="0" err="1"/>
+              <a:t>Jupyter</a:t>
+            </a:r>
+            <a:r>
+              <a:rPr lang="en-US" dirty="0"/>
+              <a:t> Notebook</a:t>
+            </a:r>
+          </a:p>
+          <a:p>
+            <a:pPr lvl="1"/>
+            <a:r>
+              <a:rPr lang="en-US" dirty="0"/>
+              <a:t>Programming Languages: python3, </a:t>
+            </a:r>
+            <a:r>
+              <a:rPr lang="en-US" dirty="0" err="1"/>
+              <a:t>javascript</a:t>
+            </a:r>
+            <a:endParaRPr lang="en-US" dirty="0"/>
+          </a:p>
+          <a:p>
+            <a:pPr lvl="1"/>
+            <a:r>
+              <a:rPr lang="en-US" dirty="0"/>
+              <a:t>Frameworks: Node.js, </a:t>
+            </a:r>
+            <a:r>
+              <a:rPr lang="en-US" dirty="0" err="1"/>
+              <a:t>Tensorflow</a:t>
+            </a:r>
+            <a:r>
+              <a:rPr lang="en-US" dirty="0"/>
+              <a:t>, Sci-kit learn, plotting libraries, OpenCV</a:t>
+            </a:r>
+          </a:p>
+          <a:p>
+            <a:endParaRPr lang="en-US" dirty="0"/>
+          </a:p>
+        </p:txBody>
+      </p:sp>
+      <p:sp>
+        <p:nvSpPr>
+          <p:cNvPr id="4" name="Footer Placeholder 3">
+            <a:extLst>
+              <a:ext uri="{FF2B5EF4-FFF2-40B4-BE49-F238E27FC236}">
+                <a16:creationId xmlns:a16="http://schemas.microsoft.com/office/drawing/2014/main" id="{819AB2B2-5795-4B43-9E83-DBBD42E31F21}"/>
+              </a:ext>
+            </a:extLst>
+          </p:cNvPr>
+          <p:cNvSpPr>
+            <a:spLocks noGrp="1"/>
+          </p:cNvSpPr>
+          <p:nvPr>
+            <p:ph type="ftr" sz="quarter" idx="11"/>
+          </p:nvPr>
+        </p:nvSpPr>
+        <p:spPr/>
+        <p:txBody>
+          <a:bodyPr/>
+          <a:lstStyle/>
+          <a:p>
+            <a:r>
+              <a:rPr lang="en-US"/>
+              <a:t>Astronomical image colourisation and super-resolution using GANS</a:t>
+            </a:r>
+            <a:endParaRPr lang="en-IN"/>
+          </a:p>
+        </p:txBody>
+      </p:sp>
+      <p:sp>
+        <p:nvSpPr>
+          <p:cNvPr id="7" name="TextBox 6">
+            <a:extLst>
+              <a:ext uri="{FF2B5EF4-FFF2-40B4-BE49-F238E27FC236}">
+                <a16:creationId xmlns:a16="http://schemas.microsoft.com/office/drawing/2014/main" id="{131B2BEC-23AB-4EEB-B493-690C12ED095E}"/>
+              </a:ext>
+            </a:extLst>
+          </p:cNvPr>
+          <p:cNvSpPr txBox="1"/>
+          <p:nvPr/>
+        </p:nvSpPr>
+        <p:spPr>
+          <a:xfrm>
+            <a:off x="4731798" y="5852732"/>
+            <a:ext cx="2920753" cy="246221"/>
+          </a:xfrm>
+          <a:prstGeom prst="rect">
+            <a:avLst/>
+          </a:prstGeom>
+          <a:noFill/>
+        </p:spPr>
+        <p:txBody>
+          <a:bodyPr wrap="square" rtlCol="0">
+            <a:spAutoFit/>
+          </a:bodyPr>
+          <a:lstStyle/>
+          <a:p>
+            <a:pPr algn="ctr"/>
+            <a:r>
+              <a:rPr lang="en-US" sz="1000" dirty="0"/>
+              <a:t>Table 1: Hardware Requirements</a:t>
+            </a:r>
+          </a:p>
+        </p:txBody>
+      </p:sp>
+      <p:pic>
+        <p:nvPicPr>
+          <p:cNvPr id="9" name="Picture 8">
+            <a:extLst>
+              <a:ext uri="{FF2B5EF4-FFF2-40B4-BE49-F238E27FC236}">
+                <a16:creationId xmlns:a16="http://schemas.microsoft.com/office/drawing/2014/main" id="{D4A9D9FA-FE81-44DA-8AAF-937566B0DBBA}"/>
+              </a:ext>
+            </a:extLst>
+          </p:cNvPr>
+          <p:cNvPicPr>
+            <a:picLocks noChangeAspect="1"/>
+          </p:cNvPicPr>
+          <p:nvPr/>
+        </p:nvPicPr>
+        <p:blipFill>
+          <a:blip r:embed="rId2"/>
+          <a:stretch>
+            <a:fillRect/>
+          </a:stretch>
+        </p:blipFill>
+        <p:spPr>
+          <a:xfrm>
+            <a:off x="1374055" y="2145095"/>
+            <a:ext cx="8945223" cy="1581371"/>
+          </a:xfrm>
+          <a:prstGeom prst="rect">
+            <a:avLst/>
+          </a:prstGeom>
+        </p:spPr>
+      </p:pic>
+    </p:spTree>
+    <p:extLst>
+      <p:ext uri="{BB962C8B-B14F-4D97-AF65-F5344CB8AC3E}">
+        <p14:creationId xmlns:p14="http://schemas.microsoft.com/office/powerpoint/2010/main" val="1715567951"/>
       </p:ext>
     </p:extLst>
   </p:cSld>
@@ -14406,6 +14406,15 @@
 </file>
 
 <file path=customXml/item1.xml><?xml version="1.0" encoding="utf-8"?>
+<?mso-contentType ?>
+<FormTemplates xmlns="http://schemas.microsoft.com/sharepoint/v3/contenttype/forms">
+  <Display>DocumentLibraryForm</Display>
+  <Edit>AssetEditForm</Edit>
+  <New>DocumentLibraryForm</New>
+</FormTemplates>
+</file>
+
+<file path=customXml/item2.xml><?xml version="1.0" encoding="utf-8"?>
 <p:properties xmlns:p="http://schemas.microsoft.com/office/2006/metadata/properties" xmlns:xsi="http://www.w3.org/2001/XMLSchema-instance" xmlns:pc="http://schemas.microsoft.com/office/infopath/2007/PartnerControls">
   <documentManagement>
     <APDescription xmlns="4873beb7-5857-4685-be1f-d57550cc96cc" xsi:nil="true"/>
@@ -14529,15 +14538,6 @@
     <UANotes xmlns="4873beb7-5857-4685-be1f-d57550cc96cc" xsi:nil="true"/>
   </documentManagement>
 </p:properties>
-</file>
-
-<file path=customXml/item2.xml><?xml version="1.0" encoding="utf-8"?>
-<?mso-contentType ?>
-<FormTemplates xmlns="http://schemas.microsoft.com/sharepoint/v3/contenttype/forms">
-  <Display>DocumentLibraryForm</Display>
-  <Edit>AssetEditForm</Edit>
-  <New>DocumentLibraryForm</New>
-</FormTemplates>
 </file>
 
 <file path=customXml/item3.xml><?xml version="1.0" encoding="utf-8"?>
@@ -15581,6 +15581,14 @@
 </file>
 
 <file path=customXml/itemProps1.xml><?xml version="1.0" encoding="utf-8"?>
+<ds:datastoreItem xmlns:ds="http://schemas.openxmlformats.org/officeDocument/2006/customXml" ds:itemID="{561E720F-F05D-4536-9C34-0CFCED65D3B7}">
+  <ds:schemaRefs>
+    <ds:schemaRef ds:uri="http://schemas.microsoft.com/sharepoint/v3/contenttype/forms"/>
+  </ds:schemaRefs>
+</ds:datastoreItem>
+</file>
+
+<file path=customXml/itemProps2.xml><?xml version="1.0" encoding="utf-8"?>
 <ds:datastoreItem xmlns:ds="http://schemas.openxmlformats.org/officeDocument/2006/customXml" ds:itemID="{8CDDBB83-77C1-4099-A0AA-289882E745E2}">
   <ds:schemaRefs>
     <ds:schemaRef ds:uri="http://purl.org/dc/terms/"/>
@@ -15592,14 +15600,6 @@
     <ds:schemaRef ds:uri="http://schemas.microsoft.com/office/infopath/2007/PartnerControls"/>
     <ds:schemaRef ds:uri="http://schemas.microsoft.com/office/2006/metadata/properties"/>
     <ds:schemaRef ds:uri="http://www.w3.org/XML/1998/namespace"/>
-  </ds:schemaRefs>
-</ds:datastoreItem>
-</file>
-
-<file path=customXml/itemProps2.xml><?xml version="1.0" encoding="utf-8"?>
-<ds:datastoreItem xmlns:ds="http://schemas.openxmlformats.org/officeDocument/2006/customXml" ds:itemID="{561E720F-F05D-4536-9C34-0CFCED65D3B7}">
-  <ds:schemaRefs>
-    <ds:schemaRef ds:uri="http://schemas.microsoft.com/sharepoint/v3/contenttype/forms"/>
   </ds:schemaRefs>
 </ds:datastoreItem>
 </file>

</xml_diff>

<commit_message>
Stage 2 report & presentation (#47)
* Deleted redundancies

* Added a lot of things, don't remember all

* Additions to chapter: Software testing

* Added a bunch of things, again, don't expect me to remember all

* Bunch of stuff

* Finalized

* Final

* Removed capitalism
</commit_message>
<xml_diff>
--- a/Presentation/Stage_1/stage_1_presentation.pptx
+++ b/Presentation/Stage_1/stage_1_presentation.pptx
@@ -249,7 +249,7 @@
             <a:fld id="{23CEAAF3-9831-450B-8D59-2C09DB96C8FC}" type="datetimeFigureOut">
               <a:rPr lang="en-US"/>
               <a:pPr/>
-              <a:t>4/28/2021</a:t>
+              <a:t>6/21/2021</a:t>
             </a:fld>
             <a:endParaRPr/>
           </a:p>
@@ -416,7 +416,7 @@
             <a:fld id="{2D50CD79-FC16-4410-AB61-17F26E6D3BC8}" type="datetimeFigureOut">
               <a:rPr lang="en-US"/>
               <a:pPr/>
-              <a:t>4/28/2021</a:t>
+              <a:t>6/21/2021</a:t>
             </a:fld>
             <a:endParaRPr/>
           </a:p>
@@ -1059,7 +1059,7 @@
           <a:p>
             <a:fld id="{4DB8E721-DBA2-46A4-A068-33C426CA229C}" type="datetime1">
               <a:rPr lang="en-US" smtClean="0"/>
-              <a:t>4/28/2021</a:t>
+              <a:t>6/21/2021</a:t>
             </a:fld>
             <a:endParaRPr lang="en-US" dirty="0"/>
           </a:p>
@@ -1356,7 +1356,7 @@
           <a:p>
             <a:fld id="{9BD8A829-5AC1-4274-B641-92F1458069F1}" type="datetime1">
               <a:rPr lang="en-US" smtClean="0"/>
-              <a:t>4/28/2021</a:t>
+              <a:t>6/21/2021</a:t>
             </a:fld>
             <a:endParaRPr/>
           </a:p>
@@ -1543,7 +1543,7 @@
           <a:p>
             <a:fld id="{D00D14CF-06C6-4555-A47C-9AF6E504D0B7}" type="datetime1">
               <a:rPr lang="en-US" smtClean="0"/>
-              <a:t>4/28/2021</a:t>
+              <a:t>6/21/2021</a:t>
             </a:fld>
             <a:endParaRPr/>
           </a:p>
@@ -1740,7 +1740,7 @@
           <a:p>
             <a:fld id="{47F2B9D1-1C28-433D-BFF1-054F3D4A9D18}" type="datetime1">
               <a:rPr lang="en-US" smtClean="0"/>
-              <a:t>4/28/2021</a:t>
+              <a:t>6/21/2021</a:t>
             </a:fld>
             <a:endParaRPr/>
           </a:p>
@@ -2014,7 +2014,7 @@
           <a:p>
             <a:fld id="{17A19894-EF04-4A47-BB3C-15A90271CEB4}" type="datetime1">
               <a:rPr lang="en-US" smtClean="0"/>
-              <a:t>4/28/2021</a:t>
+              <a:t>6/21/2021</a:t>
             </a:fld>
             <a:endParaRPr/>
           </a:p>
@@ -3048,7 +3048,7 @@
           <a:p>
             <a:fld id="{E3EDC469-C953-453C-B6B4-7F17CBC04FEC}" type="datetime1">
               <a:rPr lang="en-US" smtClean="0"/>
-              <a:t>4/28/2021</a:t>
+              <a:t>6/21/2021</a:t>
             </a:fld>
             <a:endParaRPr/>
           </a:p>
@@ -3326,7 +3326,7 @@
           <a:p>
             <a:fld id="{CEF7B5AE-BEEE-45C0-BC11-249345FA77D8}" type="datetime1">
               <a:rPr lang="en-US" smtClean="0"/>
-              <a:t>4/28/2021</a:t>
+              <a:t>6/21/2021</a:t>
             </a:fld>
             <a:endParaRPr/>
           </a:p>
@@ -3711,7 +3711,7 @@
           <a:p>
             <a:fld id="{4301166D-EE12-4FE6-B62D-4975FDA4BA26}" type="datetime1">
               <a:rPr lang="en-US" smtClean="0"/>
-              <a:t>4/28/2021</a:t>
+              <a:t>6/21/2021</a:t>
             </a:fld>
             <a:endParaRPr/>
           </a:p>
@@ -3846,7 +3846,7 @@
           <a:p>
             <a:fld id="{1F5ED45D-6110-4BC9-BDC4-E0842E441380}" type="datetime1">
               <a:rPr lang="en-US" smtClean="0"/>
-              <a:t>4/28/2021</a:t>
+              <a:t>6/21/2021</a:t>
             </a:fld>
             <a:endParaRPr/>
           </a:p>
@@ -3958,7 +3958,7 @@
           <a:p>
             <a:fld id="{83EDDA2D-0339-4200-907C-00E500E72A81}" type="datetime1">
               <a:rPr lang="en-US" smtClean="0"/>
-              <a:t>4/28/2021</a:t>
+              <a:t>6/21/2021</a:t>
             </a:fld>
             <a:endParaRPr/>
           </a:p>
@@ -4254,7 +4254,7 @@
           <a:p>
             <a:fld id="{4107C91A-2CAA-418D-AD53-C399D4491290}" type="datetime1">
               <a:rPr lang="en-US" smtClean="0"/>
-              <a:t>4/28/2021</a:t>
+              <a:t>6/21/2021</a:t>
             </a:fld>
             <a:endParaRPr/>
           </a:p>
@@ -4484,7 +4484,7 @@
           <a:p>
             <a:fld id="{FC9EA989-7826-467F-A84F-F4180D527E13}" type="datetime1">
               <a:rPr lang="en-US" smtClean="0"/>
-              <a:t>4/28/2021</a:t>
+              <a:t>6/21/2021</a:t>
             </a:fld>
             <a:endParaRPr lang="en-US"/>
           </a:p>
@@ -11581,7 +11581,7 @@
         <p:spPr/>
         <p:txBody>
           <a:bodyPr>
-            <a:normAutofit/>
+            <a:normAutofit lnSpcReduction="10000"/>
           </a:bodyPr>
           <a:lstStyle/>
           <a:p>
@@ -11916,6 +11916,75 @@
                 <a:cs typeface="Times New Roman" panose="02020603050405020304" pitchFamily="18" charset="0"/>
               </a:rPr>
               <a:t>, A. A. (2018). Generative visual manipulation on the natural image manifold.</a:t>
+            </a:r>
+          </a:p>
+          <a:p>
+            <a:pPr algn="l"/>
+            <a:r>
+              <a:rPr lang="en-US" sz="1400" b="0" i="0" u="none" strike="noStrike" baseline="0" dirty="0" err="1">
+                <a:latin typeface="Times New Roman" panose="02020603050405020304" pitchFamily="18" charset="0"/>
+                <a:cs typeface="Times New Roman" panose="02020603050405020304" pitchFamily="18" charset="0"/>
+              </a:rPr>
+              <a:t>Arjovsky</a:t>
+            </a:r>
+            <a:r>
+              <a:rPr lang="en-US" sz="1400" b="0" i="0" u="none" strike="noStrike" baseline="0" dirty="0">
+                <a:latin typeface="Times New Roman" panose="02020603050405020304" pitchFamily="18" charset="0"/>
+                <a:cs typeface="Times New Roman" panose="02020603050405020304" pitchFamily="18" charset="0"/>
+              </a:rPr>
+              <a:t>, M., </a:t>
+            </a:r>
+            <a:r>
+              <a:rPr lang="en-US" sz="1400" b="0" i="0" u="none" strike="noStrike" baseline="0" dirty="0" err="1">
+                <a:latin typeface="Times New Roman" panose="02020603050405020304" pitchFamily="18" charset="0"/>
+                <a:cs typeface="Times New Roman" panose="02020603050405020304" pitchFamily="18" charset="0"/>
+              </a:rPr>
+              <a:t>Chintala</a:t>
+            </a:r>
+            <a:r>
+              <a:rPr lang="en-US" sz="1400" b="0" i="0" u="none" strike="noStrike" baseline="0" dirty="0">
+                <a:latin typeface="Times New Roman" panose="02020603050405020304" pitchFamily="18" charset="0"/>
+                <a:cs typeface="Times New Roman" panose="02020603050405020304" pitchFamily="18" charset="0"/>
+              </a:rPr>
+              <a:t>, S. and </a:t>
+            </a:r>
+            <a:r>
+              <a:rPr lang="en-US" sz="1400" b="0" i="0" u="none" strike="noStrike" baseline="0" dirty="0" err="1">
+                <a:latin typeface="Times New Roman" panose="02020603050405020304" pitchFamily="18" charset="0"/>
+                <a:cs typeface="Times New Roman" panose="02020603050405020304" pitchFamily="18" charset="0"/>
+              </a:rPr>
+              <a:t>Bottou</a:t>
+            </a:r>
+            <a:r>
+              <a:rPr lang="en-US" sz="1400" b="0" i="0" u="none" strike="noStrike" baseline="0" dirty="0">
+                <a:latin typeface="Times New Roman" panose="02020603050405020304" pitchFamily="18" charset="0"/>
+                <a:cs typeface="Times New Roman" panose="02020603050405020304" pitchFamily="18" charset="0"/>
+              </a:rPr>
+              <a:t>, L. (2017). Wasserstein </a:t>
+            </a:r>
+            <a:r>
+              <a:rPr lang="en-US" sz="1400" b="0" i="0" u="none" strike="noStrike" baseline="0" dirty="0" err="1">
+                <a:latin typeface="Times New Roman" panose="02020603050405020304" pitchFamily="18" charset="0"/>
+                <a:cs typeface="Times New Roman" panose="02020603050405020304" pitchFamily="18" charset="0"/>
+              </a:rPr>
+              <a:t>gan</a:t>
+            </a:r>
+            <a:r>
+              <a:rPr lang="en-US" sz="1400" b="0" i="0" u="none" strike="noStrike" baseline="0" dirty="0">
+                <a:latin typeface="Times New Roman" panose="02020603050405020304" pitchFamily="18" charset="0"/>
+                <a:cs typeface="Times New Roman" panose="02020603050405020304" pitchFamily="18" charset="0"/>
+              </a:rPr>
+              <a:t>.</a:t>
+            </a:r>
+          </a:p>
+          <a:p>
+            <a:pPr algn="l"/>
+            <a:r>
+              <a:rPr lang="en-US" sz="1400" b="0" i="0" u="none" strike="noStrike" baseline="0" dirty="0">
+                <a:latin typeface="Times New Roman" panose="02020603050405020304" pitchFamily="18" charset="0"/>
+                <a:cs typeface="Times New Roman" panose="02020603050405020304" pitchFamily="18" charset="0"/>
+              </a:rPr>
+              <a:t>Yu, J., Fan, Y., Yang, J., Xu, N., Wang, Z., Wang, X. and Huang, T. (2018). Wide activation for efficient and accurate image super-resolution</a:t>
             </a:r>
             <a:endParaRPr lang="en-US" sz="1400" i="1" dirty="0">
               <a:latin typeface="Times New Roman" panose="02020603050405020304" pitchFamily="18" charset="0"/>
@@ -14412,141 +14481,6 @@
 </file>
 
 <file path=customXml/item1.xml><?xml version="1.0" encoding="utf-8"?>
-<p:properties xmlns:p="http://schemas.microsoft.com/office/2006/metadata/properties" xmlns:xsi="http://www.w3.org/2001/XMLSchema-instance" xmlns:pc="http://schemas.microsoft.com/office/infopath/2007/PartnerControls">
-  <documentManagement>
-    <APDescription xmlns="4873beb7-5857-4685-be1f-d57550cc96cc" xsi:nil="true"/>
-    <AssetExpire xmlns="4873beb7-5857-4685-be1f-d57550cc96cc">2029-01-01T08:00:00+00:00</AssetExpire>
-    <CampaignTagsTaxHTField0 xmlns="4873beb7-5857-4685-be1f-d57550cc96cc">
-      <Terms xmlns="http://schemas.microsoft.com/office/infopath/2007/PartnerControls"/>
-    </CampaignTagsTaxHTField0>
-    <IntlLangReviewDate xmlns="4873beb7-5857-4685-be1f-d57550cc96cc" xsi:nil="true"/>
-    <TPFriendlyName xmlns="4873beb7-5857-4685-be1f-d57550cc96cc" xsi:nil="true"/>
-    <IntlLangReview xmlns="4873beb7-5857-4685-be1f-d57550cc96cc">false</IntlLangReview>
-    <LocLastLocAttemptVersionLookup xmlns="4873beb7-5857-4685-be1f-d57550cc96cc">855024</LocLastLocAttemptVersionLookup>
-    <PolicheckWords xmlns="4873beb7-5857-4685-be1f-d57550cc96cc" xsi:nil="true"/>
-    <SubmitterId xmlns="4873beb7-5857-4685-be1f-d57550cc96cc" xsi:nil="true"/>
-    <AcquiredFrom xmlns="4873beb7-5857-4685-be1f-d57550cc96cc">Internal MS</AcquiredFrom>
-    <EditorialStatus xmlns="4873beb7-5857-4685-be1f-d57550cc96cc">Complete</EditorialStatus>
-    <Markets xmlns="4873beb7-5857-4685-be1f-d57550cc96cc"/>
-    <OriginAsset xmlns="4873beb7-5857-4685-be1f-d57550cc96cc" xsi:nil="true"/>
-    <AssetStart xmlns="4873beb7-5857-4685-be1f-d57550cc96cc">2012-08-31T08:50:00+00:00</AssetStart>
-    <FriendlyTitle xmlns="4873beb7-5857-4685-be1f-d57550cc96cc" xsi:nil="true"/>
-    <MarketSpecific xmlns="4873beb7-5857-4685-be1f-d57550cc96cc">false</MarketSpecific>
-    <TPNamespace xmlns="4873beb7-5857-4685-be1f-d57550cc96cc" xsi:nil="true"/>
-    <PublishStatusLookup xmlns="4873beb7-5857-4685-be1f-d57550cc96cc">
-      <Value>1616423</Value>
-    </PublishStatusLookup>
-    <APAuthor xmlns="4873beb7-5857-4685-be1f-d57550cc96cc">
-      <UserInfo>
-        <DisplayName>REDMOND\kristaa</DisplayName>
-        <AccountId>136</AccountId>
-        <AccountType/>
-      </UserInfo>
-    </APAuthor>
-    <TPCommandLine xmlns="4873beb7-5857-4685-be1f-d57550cc96cc" xsi:nil="true"/>
-    <IntlLangReviewer xmlns="4873beb7-5857-4685-be1f-d57550cc96cc" xsi:nil="true"/>
-    <OpenTemplate xmlns="4873beb7-5857-4685-be1f-d57550cc96cc">true</OpenTemplate>
-    <CSXSubmissionDate xmlns="4873beb7-5857-4685-be1f-d57550cc96cc" xsi:nil="true"/>
-    <TaxCatchAll xmlns="4873beb7-5857-4685-be1f-d57550cc96cc"/>
-    <Manager xmlns="4873beb7-5857-4685-be1f-d57550cc96cc" xsi:nil="true"/>
-    <NumericId xmlns="4873beb7-5857-4685-be1f-d57550cc96cc" xsi:nil="true"/>
-    <ParentAssetId xmlns="4873beb7-5857-4685-be1f-d57550cc96cc" xsi:nil="true"/>
-    <OriginalSourceMarket xmlns="4873beb7-5857-4685-be1f-d57550cc96cc" xsi:nil="true"/>
-    <ApprovalStatus xmlns="4873beb7-5857-4685-be1f-d57550cc96cc">InProgress</ApprovalStatus>
-    <TPComponent xmlns="4873beb7-5857-4685-be1f-d57550cc96cc" xsi:nil="true"/>
-    <EditorialTags xmlns="4873beb7-5857-4685-be1f-d57550cc96cc" xsi:nil="true"/>
-    <TPExecutable xmlns="4873beb7-5857-4685-be1f-d57550cc96cc" xsi:nil="true"/>
-    <TPLaunchHelpLink xmlns="4873beb7-5857-4685-be1f-d57550cc96cc" xsi:nil="true"/>
-    <LocComments xmlns="4873beb7-5857-4685-be1f-d57550cc96cc" xsi:nil="true"/>
-    <LocRecommendedHandoff xmlns="4873beb7-5857-4685-be1f-d57550cc96cc" xsi:nil="true"/>
-    <SourceTitle xmlns="4873beb7-5857-4685-be1f-d57550cc96cc" xsi:nil="true"/>
-    <CSXUpdate xmlns="4873beb7-5857-4685-be1f-d57550cc96cc">false</CSXUpdate>
-    <IntlLocPriority xmlns="4873beb7-5857-4685-be1f-d57550cc96cc" xsi:nil="true"/>
-    <UAProjectedTotalWords xmlns="4873beb7-5857-4685-be1f-d57550cc96cc" xsi:nil="true"/>
-    <AssetType xmlns="4873beb7-5857-4685-be1f-d57550cc96cc">TP</AssetType>
-    <MachineTranslated xmlns="4873beb7-5857-4685-be1f-d57550cc96cc">false</MachineTranslated>
-    <OutputCachingOn xmlns="4873beb7-5857-4685-be1f-d57550cc96cc">false</OutputCachingOn>
-    <TemplateStatus xmlns="4873beb7-5857-4685-be1f-d57550cc96cc">Complete</TemplateStatus>
-    <IsSearchable xmlns="4873beb7-5857-4685-be1f-d57550cc96cc">true</IsSearchable>
-    <ContentItem xmlns="4873beb7-5857-4685-be1f-d57550cc96cc" xsi:nil="true"/>
-    <HandoffToMSDN xmlns="4873beb7-5857-4685-be1f-d57550cc96cc" xsi:nil="true"/>
-    <ShowIn xmlns="4873beb7-5857-4685-be1f-d57550cc96cc">Show everywhere</ShowIn>
-    <ThumbnailAssetId xmlns="4873beb7-5857-4685-be1f-d57550cc96cc" xsi:nil="true"/>
-    <UALocComments xmlns="4873beb7-5857-4685-be1f-d57550cc96cc" xsi:nil="true"/>
-    <UALocRecommendation xmlns="4873beb7-5857-4685-be1f-d57550cc96cc">Localize</UALocRecommendation>
-    <LastModifiedDateTime xmlns="4873beb7-5857-4685-be1f-d57550cc96cc" xsi:nil="true"/>
-    <LegacyData xmlns="4873beb7-5857-4685-be1f-d57550cc96cc" xsi:nil="true"/>
-    <LocManualTestRequired xmlns="4873beb7-5857-4685-be1f-d57550cc96cc">false</LocManualTestRequired>
-    <LocMarketGroupTiers2 xmlns="4873beb7-5857-4685-be1f-d57550cc96cc" xsi:nil="true"/>
-    <ClipArtFilename xmlns="4873beb7-5857-4685-be1f-d57550cc96cc" xsi:nil="true"/>
-    <TPApplication xmlns="4873beb7-5857-4685-be1f-d57550cc96cc" xsi:nil="true"/>
-    <CSXHash xmlns="4873beb7-5857-4685-be1f-d57550cc96cc" xsi:nil="true"/>
-    <DirectSourceMarket xmlns="4873beb7-5857-4685-be1f-d57550cc96cc" xsi:nil="true"/>
-    <PrimaryImageGen xmlns="4873beb7-5857-4685-be1f-d57550cc96cc">true</PrimaryImageGen>
-    <PlannedPubDate xmlns="4873beb7-5857-4685-be1f-d57550cc96cc" xsi:nil="true"/>
-    <CSXSubmissionMarket xmlns="4873beb7-5857-4685-be1f-d57550cc96cc" xsi:nil="true"/>
-    <Downloads xmlns="4873beb7-5857-4685-be1f-d57550cc96cc">0</Downloads>
-    <ArtSampleDocs xmlns="4873beb7-5857-4685-be1f-d57550cc96cc" xsi:nil="true"/>
-    <TrustLevel xmlns="4873beb7-5857-4685-be1f-d57550cc96cc">1 Microsoft Managed Content</TrustLevel>
-    <BlockPublish xmlns="4873beb7-5857-4685-be1f-d57550cc96cc">false</BlockPublish>
-    <TPLaunchHelpLinkType xmlns="4873beb7-5857-4685-be1f-d57550cc96cc">Template</TPLaunchHelpLinkType>
-    <LocalizationTagsTaxHTField0 xmlns="4873beb7-5857-4685-be1f-d57550cc96cc">
-      <Terms xmlns="http://schemas.microsoft.com/office/infopath/2007/PartnerControls"/>
-    </LocalizationTagsTaxHTField0>
-    <BusinessGroup xmlns="4873beb7-5857-4685-be1f-d57550cc96cc" xsi:nil="true"/>
-    <Providers xmlns="4873beb7-5857-4685-be1f-d57550cc96cc" xsi:nil="true"/>
-    <TemplateTemplateType xmlns="4873beb7-5857-4685-be1f-d57550cc96cc">PowerPoint Presentation Template</TemplateTemplateType>
-    <TimesCloned xmlns="4873beb7-5857-4685-be1f-d57550cc96cc" xsi:nil="true"/>
-    <TPAppVersion xmlns="4873beb7-5857-4685-be1f-d57550cc96cc" xsi:nil="true"/>
-    <VoteCount xmlns="4873beb7-5857-4685-be1f-d57550cc96cc" xsi:nil="true"/>
-    <AverageRating xmlns="4873beb7-5857-4685-be1f-d57550cc96cc" xsi:nil="true"/>
-    <FeatureTagsTaxHTField0 xmlns="4873beb7-5857-4685-be1f-d57550cc96cc">
-      <Terms xmlns="http://schemas.microsoft.com/office/infopath/2007/PartnerControls"/>
-    </FeatureTagsTaxHTField0>
-    <Provider xmlns="4873beb7-5857-4685-be1f-d57550cc96cc" xsi:nil="true"/>
-    <UACurrentWords xmlns="4873beb7-5857-4685-be1f-d57550cc96cc" xsi:nil="true"/>
-    <AssetId xmlns="4873beb7-5857-4685-be1f-d57550cc96cc">TP103431361</AssetId>
-    <TPClientViewer xmlns="4873beb7-5857-4685-be1f-d57550cc96cc" xsi:nil="true"/>
-    <DSATActionTaken xmlns="4873beb7-5857-4685-be1f-d57550cc96cc" xsi:nil="true"/>
-    <APEditor xmlns="4873beb7-5857-4685-be1f-d57550cc96cc">
-      <UserInfo>
-        <DisplayName/>
-        <AccountId xsi:nil="true"/>
-        <AccountType/>
-      </UserInfo>
-    </APEditor>
-    <TPInstallLocation xmlns="4873beb7-5857-4685-be1f-d57550cc96cc" xsi:nil="true"/>
-    <OOCacheId xmlns="4873beb7-5857-4685-be1f-d57550cc96cc" xsi:nil="true"/>
-    <IsDeleted xmlns="4873beb7-5857-4685-be1f-d57550cc96cc">false</IsDeleted>
-    <PublishTargets xmlns="4873beb7-5857-4685-be1f-d57550cc96cc">OfficeOnlineVNext</PublishTargets>
-    <ApprovalLog xmlns="4873beb7-5857-4685-be1f-d57550cc96cc" xsi:nil="true"/>
-    <BugNumber xmlns="4873beb7-5857-4685-be1f-d57550cc96cc" xsi:nil="true"/>
-    <CrawlForDependencies xmlns="4873beb7-5857-4685-be1f-d57550cc96cc">false</CrawlForDependencies>
-    <InternalTagsTaxHTField0 xmlns="4873beb7-5857-4685-be1f-d57550cc96cc">
-      <Terms xmlns="http://schemas.microsoft.com/office/infopath/2007/PartnerControls"/>
-    </InternalTagsTaxHTField0>
-    <LastHandOff xmlns="4873beb7-5857-4685-be1f-d57550cc96cc" xsi:nil="true"/>
-    <Milestone xmlns="4873beb7-5857-4685-be1f-d57550cc96cc" xsi:nil="true"/>
-    <OriginalRelease xmlns="4873beb7-5857-4685-be1f-d57550cc96cc">15</OriginalRelease>
-    <RecommendationsModifier xmlns="4873beb7-5857-4685-be1f-d57550cc96cc" xsi:nil="true"/>
-    <ScenarioTagsTaxHTField0 xmlns="4873beb7-5857-4685-be1f-d57550cc96cc">
-      <Terms xmlns="http://schemas.microsoft.com/office/infopath/2007/PartnerControls"/>
-    </ScenarioTagsTaxHTField0>
-    <UANotes xmlns="4873beb7-5857-4685-be1f-d57550cc96cc" xsi:nil="true"/>
-  </documentManagement>
-</p:properties>
-</file>
-
-<file path=customXml/item2.xml><?xml version="1.0" encoding="utf-8"?>
-<?mso-contentType ?>
-<FormTemplates xmlns="http://schemas.microsoft.com/sharepoint/v3/contenttype/forms">
-  <Display>DocumentLibraryForm</Display>
-  <Edit>AssetEditForm</Edit>
-  <New>DocumentLibraryForm</New>
-</FormTemplates>
-</file>
-
-<file path=customXml/item3.xml><?xml version="1.0" encoding="utf-8"?>
 <ct:contentTypeSchema xmlns:ct="http://schemas.microsoft.com/office/2006/metadata/contentType" xmlns:ma="http://schemas.microsoft.com/office/2006/metadata/properties/metaAttributes" ct:_="" ma:_="" ma:contentTypeName="TemplateFile" ma:contentTypeID="0x0101006EDDDB5EE6D98C44930B742096920B300400F5B6D36B3EF94B4E9A635CDF2A18F5B8" ma:contentTypeVersion="72" ma:contentTypeDescription="Create a new document." ma:contentTypeScope="" ma:versionID="a23e56308344d904b51738559c3d67c9">
   <xsd:schema xmlns:xsd="http://www.w3.org/2001/XMLSchema" xmlns:xs="http://www.w3.org/2001/XMLSchema" xmlns:p="http://schemas.microsoft.com/office/2006/metadata/properties" xmlns:ns2="4873beb7-5857-4685-be1f-d57550cc96cc" targetNamespace="http://schemas.microsoft.com/office/2006/metadata/properties" ma:root="true" ma:fieldsID="cd0908cc4600e77bf5da051303e00c8d" ns2:_="">
     <xsd:import namespace="4873beb7-5857-4685-be1f-d57550cc96cc"/>
@@ -15586,31 +15520,142 @@
 </ct:contentTypeSchema>
 </file>
 
-<file path=customXml/itemProps1.xml><?xml version="1.0" encoding="utf-8"?>
-<ds:datastoreItem xmlns:ds="http://schemas.openxmlformats.org/officeDocument/2006/customXml" ds:itemID="{8CDDBB83-77C1-4099-A0AA-289882E745E2}">
-  <ds:schemaRefs>
-    <ds:schemaRef ds:uri="http://purl.org/dc/terms/"/>
-    <ds:schemaRef ds:uri="http://purl.org/dc/dcmitype/"/>
-    <ds:schemaRef ds:uri="4873beb7-5857-4685-be1f-d57550cc96cc"/>
-    <ds:schemaRef ds:uri="http://schemas.openxmlformats.org/package/2006/metadata/core-properties"/>
-    <ds:schemaRef ds:uri="http://purl.org/dc/elements/1.1/"/>
-    <ds:schemaRef ds:uri="http://schemas.microsoft.com/office/2006/documentManagement/types"/>
-    <ds:schemaRef ds:uri="http://schemas.microsoft.com/office/infopath/2007/PartnerControls"/>
-    <ds:schemaRef ds:uri="http://schemas.microsoft.com/office/2006/metadata/properties"/>
-    <ds:schemaRef ds:uri="http://www.w3.org/XML/1998/namespace"/>
-  </ds:schemaRefs>
-</ds:datastoreItem>
+<file path=customXml/item2.xml><?xml version="1.0" encoding="utf-8"?>
+<?mso-contentType ?>
+<FormTemplates xmlns="http://schemas.microsoft.com/sharepoint/v3/contenttype/forms">
+  <Display>DocumentLibraryForm</Display>
+  <Edit>AssetEditForm</Edit>
+  <New>DocumentLibraryForm</New>
+</FormTemplates>
 </file>
 
-<file path=customXml/itemProps2.xml><?xml version="1.0" encoding="utf-8"?>
-<ds:datastoreItem xmlns:ds="http://schemas.openxmlformats.org/officeDocument/2006/customXml" ds:itemID="{561E720F-F05D-4536-9C34-0CFCED65D3B7}">
-  <ds:schemaRefs>
-    <ds:schemaRef ds:uri="http://schemas.microsoft.com/sharepoint/v3/contenttype/forms"/>
-  </ds:schemaRefs>
-</ds:datastoreItem>
+<file path=customXml/item3.xml><?xml version="1.0" encoding="utf-8"?>
+<p:properties xmlns:p="http://schemas.microsoft.com/office/2006/metadata/properties" xmlns:xsi="http://www.w3.org/2001/XMLSchema-instance" xmlns:pc="http://schemas.microsoft.com/office/infopath/2007/PartnerControls">
+  <documentManagement>
+    <APDescription xmlns="4873beb7-5857-4685-be1f-d57550cc96cc" xsi:nil="true"/>
+    <AssetExpire xmlns="4873beb7-5857-4685-be1f-d57550cc96cc">2029-01-01T08:00:00+00:00</AssetExpire>
+    <CampaignTagsTaxHTField0 xmlns="4873beb7-5857-4685-be1f-d57550cc96cc">
+      <Terms xmlns="http://schemas.microsoft.com/office/infopath/2007/PartnerControls"/>
+    </CampaignTagsTaxHTField0>
+    <IntlLangReviewDate xmlns="4873beb7-5857-4685-be1f-d57550cc96cc" xsi:nil="true"/>
+    <TPFriendlyName xmlns="4873beb7-5857-4685-be1f-d57550cc96cc" xsi:nil="true"/>
+    <IntlLangReview xmlns="4873beb7-5857-4685-be1f-d57550cc96cc">false</IntlLangReview>
+    <LocLastLocAttemptVersionLookup xmlns="4873beb7-5857-4685-be1f-d57550cc96cc">855024</LocLastLocAttemptVersionLookup>
+    <PolicheckWords xmlns="4873beb7-5857-4685-be1f-d57550cc96cc" xsi:nil="true"/>
+    <SubmitterId xmlns="4873beb7-5857-4685-be1f-d57550cc96cc" xsi:nil="true"/>
+    <AcquiredFrom xmlns="4873beb7-5857-4685-be1f-d57550cc96cc">Internal MS</AcquiredFrom>
+    <EditorialStatus xmlns="4873beb7-5857-4685-be1f-d57550cc96cc">Complete</EditorialStatus>
+    <Markets xmlns="4873beb7-5857-4685-be1f-d57550cc96cc"/>
+    <OriginAsset xmlns="4873beb7-5857-4685-be1f-d57550cc96cc" xsi:nil="true"/>
+    <AssetStart xmlns="4873beb7-5857-4685-be1f-d57550cc96cc">2012-08-31T08:50:00+00:00</AssetStart>
+    <FriendlyTitle xmlns="4873beb7-5857-4685-be1f-d57550cc96cc" xsi:nil="true"/>
+    <MarketSpecific xmlns="4873beb7-5857-4685-be1f-d57550cc96cc">false</MarketSpecific>
+    <TPNamespace xmlns="4873beb7-5857-4685-be1f-d57550cc96cc" xsi:nil="true"/>
+    <PublishStatusLookup xmlns="4873beb7-5857-4685-be1f-d57550cc96cc">
+      <Value>1616423</Value>
+    </PublishStatusLookup>
+    <APAuthor xmlns="4873beb7-5857-4685-be1f-d57550cc96cc">
+      <UserInfo>
+        <DisplayName>REDMOND\kristaa</DisplayName>
+        <AccountId>136</AccountId>
+        <AccountType/>
+      </UserInfo>
+    </APAuthor>
+    <TPCommandLine xmlns="4873beb7-5857-4685-be1f-d57550cc96cc" xsi:nil="true"/>
+    <IntlLangReviewer xmlns="4873beb7-5857-4685-be1f-d57550cc96cc" xsi:nil="true"/>
+    <OpenTemplate xmlns="4873beb7-5857-4685-be1f-d57550cc96cc">true</OpenTemplate>
+    <CSXSubmissionDate xmlns="4873beb7-5857-4685-be1f-d57550cc96cc" xsi:nil="true"/>
+    <TaxCatchAll xmlns="4873beb7-5857-4685-be1f-d57550cc96cc"/>
+    <Manager xmlns="4873beb7-5857-4685-be1f-d57550cc96cc" xsi:nil="true"/>
+    <NumericId xmlns="4873beb7-5857-4685-be1f-d57550cc96cc" xsi:nil="true"/>
+    <ParentAssetId xmlns="4873beb7-5857-4685-be1f-d57550cc96cc" xsi:nil="true"/>
+    <OriginalSourceMarket xmlns="4873beb7-5857-4685-be1f-d57550cc96cc" xsi:nil="true"/>
+    <ApprovalStatus xmlns="4873beb7-5857-4685-be1f-d57550cc96cc">InProgress</ApprovalStatus>
+    <TPComponent xmlns="4873beb7-5857-4685-be1f-d57550cc96cc" xsi:nil="true"/>
+    <EditorialTags xmlns="4873beb7-5857-4685-be1f-d57550cc96cc" xsi:nil="true"/>
+    <TPExecutable xmlns="4873beb7-5857-4685-be1f-d57550cc96cc" xsi:nil="true"/>
+    <TPLaunchHelpLink xmlns="4873beb7-5857-4685-be1f-d57550cc96cc" xsi:nil="true"/>
+    <LocComments xmlns="4873beb7-5857-4685-be1f-d57550cc96cc" xsi:nil="true"/>
+    <LocRecommendedHandoff xmlns="4873beb7-5857-4685-be1f-d57550cc96cc" xsi:nil="true"/>
+    <SourceTitle xmlns="4873beb7-5857-4685-be1f-d57550cc96cc" xsi:nil="true"/>
+    <CSXUpdate xmlns="4873beb7-5857-4685-be1f-d57550cc96cc">false</CSXUpdate>
+    <IntlLocPriority xmlns="4873beb7-5857-4685-be1f-d57550cc96cc" xsi:nil="true"/>
+    <UAProjectedTotalWords xmlns="4873beb7-5857-4685-be1f-d57550cc96cc" xsi:nil="true"/>
+    <AssetType xmlns="4873beb7-5857-4685-be1f-d57550cc96cc">TP</AssetType>
+    <MachineTranslated xmlns="4873beb7-5857-4685-be1f-d57550cc96cc">false</MachineTranslated>
+    <OutputCachingOn xmlns="4873beb7-5857-4685-be1f-d57550cc96cc">false</OutputCachingOn>
+    <TemplateStatus xmlns="4873beb7-5857-4685-be1f-d57550cc96cc">Complete</TemplateStatus>
+    <IsSearchable xmlns="4873beb7-5857-4685-be1f-d57550cc96cc">true</IsSearchable>
+    <ContentItem xmlns="4873beb7-5857-4685-be1f-d57550cc96cc" xsi:nil="true"/>
+    <HandoffToMSDN xmlns="4873beb7-5857-4685-be1f-d57550cc96cc" xsi:nil="true"/>
+    <ShowIn xmlns="4873beb7-5857-4685-be1f-d57550cc96cc">Show everywhere</ShowIn>
+    <ThumbnailAssetId xmlns="4873beb7-5857-4685-be1f-d57550cc96cc" xsi:nil="true"/>
+    <UALocComments xmlns="4873beb7-5857-4685-be1f-d57550cc96cc" xsi:nil="true"/>
+    <UALocRecommendation xmlns="4873beb7-5857-4685-be1f-d57550cc96cc">Localize</UALocRecommendation>
+    <LastModifiedDateTime xmlns="4873beb7-5857-4685-be1f-d57550cc96cc" xsi:nil="true"/>
+    <LegacyData xmlns="4873beb7-5857-4685-be1f-d57550cc96cc" xsi:nil="true"/>
+    <LocManualTestRequired xmlns="4873beb7-5857-4685-be1f-d57550cc96cc">false</LocManualTestRequired>
+    <LocMarketGroupTiers2 xmlns="4873beb7-5857-4685-be1f-d57550cc96cc" xsi:nil="true"/>
+    <ClipArtFilename xmlns="4873beb7-5857-4685-be1f-d57550cc96cc" xsi:nil="true"/>
+    <TPApplication xmlns="4873beb7-5857-4685-be1f-d57550cc96cc" xsi:nil="true"/>
+    <CSXHash xmlns="4873beb7-5857-4685-be1f-d57550cc96cc" xsi:nil="true"/>
+    <DirectSourceMarket xmlns="4873beb7-5857-4685-be1f-d57550cc96cc" xsi:nil="true"/>
+    <PrimaryImageGen xmlns="4873beb7-5857-4685-be1f-d57550cc96cc">true</PrimaryImageGen>
+    <PlannedPubDate xmlns="4873beb7-5857-4685-be1f-d57550cc96cc" xsi:nil="true"/>
+    <CSXSubmissionMarket xmlns="4873beb7-5857-4685-be1f-d57550cc96cc" xsi:nil="true"/>
+    <Downloads xmlns="4873beb7-5857-4685-be1f-d57550cc96cc">0</Downloads>
+    <ArtSampleDocs xmlns="4873beb7-5857-4685-be1f-d57550cc96cc" xsi:nil="true"/>
+    <TrustLevel xmlns="4873beb7-5857-4685-be1f-d57550cc96cc">1 Microsoft Managed Content</TrustLevel>
+    <BlockPublish xmlns="4873beb7-5857-4685-be1f-d57550cc96cc">false</BlockPublish>
+    <TPLaunchHelpLinkType xmlns="4873beb7-5857-4685-be1f-d57550cc96cc">Template</TPLaunchHelpLinkType>
+    <LocalizationTagsTaxHTField0 xmlns="4873beb7-5857-4685-be1f-d57550cc96cc">
+      <Terms xmlns="http://schemas.microsoft.com/office/infopath/2007/PartnerControls"/>
+    </LocalizationTagsTaxHTField0>
+    <BusinessGroup xmlns="4873beb7-5857-4685-be1f-d57550cc96cc" xsi:nil="true"/>
+    <Providers xmlns="4873beb7-5857-4685-be1f-d57550cc96cc" xsi:nil="true"/>
+    <TemplateTemplateType xmlns="4873beb7-5857-4685-be1f-d57550cc96cc">PowerPoint Presentation Template</TemplateTemplateType>
+    <TimesCloned xmlns="4873beb7-5857-4685-be1f-d57550cc96cc" xsi:nil="true"/>
+    <TPAppVersion xmlns="4873beb7-5857-4685-be1f-d57550cc96cc" xsi:nil="true"/>
+    <VoteCount xmlns="4873beb7-5857-4685-be1f-d57550cc96cc" xsi:nil="true"/>
+    <AverageRating xmlns="4873beb7-5857-4685-be1f-d57550cc96cc" xsi:nil="true"/>
+    <FeatureTagsTaxHTField0 xmlns="4873beb7-5857-4685-be1f-d57550cc96cc">
+      <Terms xmlns="http://schemas.microsoft.com/office/infopath/2007/PartnerControls"/>
+    </FeatureTagsTaxHTField0>
+    <Provider xmlns="4873beb7-5857-4685-be1f-d57550cc96cc" xsi:nil="true"/>
+    <UACurrentWords xmlns="4873beb7-5857-4685-be1f-d57550cc96cc" xsi:nil="true"/>
+    <AssetId xmlns="4873beb7-5857-4685-be1f-d57550cc96cc">TP103431361</AssetId>
+    <TPClientViewer xmlns="4873beb7-5857-4685-be1f-d57550cc96cc" xsi:nil="true"/>
+    <DSATActionTaken xmlns="4873beb7-5857-4685-be1f-d57550cc96cc" xsi:nil="true"/>
+    <APEditor xmlns="4873beb7-5857-4685-be1f-d57550cc96cc">
+      <UserInfo>
+        <DisplayName/>
+        <AccountId xsi:nil="true"/>
+        <AccountType/>
+      </UserInfo>
+    </APEditor>
+    <TPInstallLocation xmlns="4873beb7-5857-4685-be1f-d57550cc96cc" xsi:nil="true"/>
+    <OOCacheId xmlns="4873beb7-5857-4685-be1f-d57550cc96cc" xsi:nil="true"/>
+    <IsDeleted xmlns="4873beb7-5857-4685-be1f-d57550cc96cc">false</IsDeleted>
+    <PublishTargets xmlns="4873beb7-5857-4685-be1f-d57550cc96cc">OfficeOnlineVNext</PublishTargets>
+    <ApprovalLog xmlns="4873beb7-5857-4685-be1f-d57550cc96cc" xsi:nil="true"/>
+    <BugNumber xmlns="4873beb7-5857-4685-be1f-d57550cc96cc" xsi:nil="true"/>
+    <CrawlForDependencies xmlns="4873beb7-5857-4685-be1f-d57550cc96cc">false</CrawlForDependencies>
+    <InternalTagsTaxHTField0 xmlns="4873beb7-5857-4685-be1f-d57550cc96cc">
+      <Terms xmlns="http://schemas.microsoft.com/office/infopath/2007/PartnerControls"/>
+    </InternalTagsTaxHTField0>
+    <LastHandOff xmlns="4873beb7-5857-4685-be1f-d57550cc96cc" xsi:nil="true"/>
+    <Milestone xmlns="4873beb7-5857-4685-be1f-d57550cc96cc" xsi:nil="true"/>
+    <OriginalRelease xmlns="4873beb7-5857-4685-be1f-d57550cc96cc">15</OriginalRelease>
+    <RecommendationsModifier xmlns="4873beb7-5857-4685-be1f-d57550cc96cc" xsi:nil="true"/>
+    <ScenarioTagsTaxHTField0 xmlns="4873beb7-5857-4685-be1f-d57550cc96cc">
+      <Terms xmlns="http://schemas.microsoft.com/office/infopath/2007/PartnerControls"/>
+    </ScenarioTagsTaxHTField0>
+    <UANotes xmlns="4873beb7-5857-4685-be1f-d57550cc96cc" xsi:nil="true"/>
+  </documentManagement>
+</p:properties>
 </file>
 
-<file path=customXml/itemProps3.xml><?xml version="1.0" encoding="utf-8"?>
+<file path=customXml/itemProps1.xml><?xml version="1.0" encoding="utf-8"?>
 <ds:datastoreItem xmlns:ds="http://schemas.openxmlformats.org/officeDocument/2006/customXml" ds:itemID="{28C8B9CA-0273-4370-889A-FC05DA5C2FA5}">
   <ds:schemaRefs>
     <ds:schemaRef ds:uri="http://schemas.microsoft.com/office/2006/metadata/contentType"/>
@@ -15626,4 +15671,28 @@
     <ds:schemaRef ds:uri="http://schemas.microsoft.com/internal/obd"/>
   </ds:schemaRefs>
 </ds:datastoreItem>
+</file>
+
+<file path=customXml/itemProps2.xml><?xml version="1.0" encoding="utf-8"?>
+<ds:datastoreItem xmlns:ds="http://schemas.openxmlformats.org/officeDocument/2006/customXml" ds:itemID="{561E720F-F05D-4536-9C34-0CFCED65D3B7}">
+  <ds:schemaRefs>
+    <ds:schemaRef ds:uri="http://schemas.microsoft.com/sharepoint/v3/contenttype/forms"/>
+  </ds:schemaRefs>
+</ds:datastoreItem>
+</file>
+
+<file path=customXml/itemProps3.xml><?xml version="1.0" encoding="utf-8"?>
+<ds:datastoreItem xmlns:ds="http://schemas.openxmlformats.org/officeDocument/2006/customXml" ds:itemID="{8CDDBB83-77C1-4099-A0AA-289882E745E2}">
+  <ds:schemaRefs>
+    <ds:schemaRef ds:uri="http://purl.org/dc/terms/"/>
+    <ds:schemaRef ds:uri="http://purl.org/dc/dcmitype/"/>
+    <ds:schemaRef ds:uri="4873beb7-5857-4685-be1f-d57550cc96cc"/>
+    <ds:schemaRef ds:uri="http://schemas.openxmlformats.org/package/2006/metadata/core-properties"/>
+    <ds:schemaRef ds:uri="http://purl.org/dc/elements/1.1/"/>
+    <ds:schemaRef ds:uri="http://schemas.microsoft.com/office/2006/documentManagement/types"/>
+    <ds:schemaRef ds:uri="http://schemas.microsoft.com/office/infopath/2007/PartnerControls"/>
+    <ds:schemaRef ds:uri="http://schemas.microsoft.com/office/2006/metadata/properties"/>
+    <ds:schemaRef ds:uri="http://www.w3.org/XML/1998/namespace"/>
+  </ds:schemaRefs>
+</ds:datastoreItem>
 </file>
</xml_diff>